<commit_message>
Added Space Invaders as Game 1
</commit_message>
<xml_diff>
--- a/Supporting Items/Images/DrinkPoint PowerPoint.pptx
+++ b/Supporting Items/Images/DrinkPoint PowerPoint.pptx
@@ -254,7 +254,7 @@
           <a:p>
             <a:fld id="{9E764FE3-7391-B940-9C10-F64F800F0F41}" type="datetimeFigureOut">
               <a:rPr lang="en-US" smtClean="0"/>
-              <a:t>6/10/16</a:t>
+              <a:t>6/13/16</a:t>
             </a:fld>
             <a:endParaRPr lang="en-US"/>
           </a:p>
@@ -424,7 +424,7 @@
           <a:p>
             <a:fld id="{9E764FE3-7391-B940-9C10-F64F800F0F41}" type="datetimeFigureOut">
               <a:rPr lang="en-US" smtClean="0"/>
-              <a:t>6/10/16</a:t>
+              <a:t>6/13/16</a:t>
             </a:fld>
             <a:endParaRPr lang="en-US"/>
           </a:p>
@@ -604,7 +604,7 @@
           <a:p>
             <a:fld id="{9E764FE3-7391-B940-9C10-F64F800F0F41}" type="datetimeFigureOut">
               <a:rPr lang="en-US" smtClean="0"/>
-              <a:t>6/10/16</a:t>
+              <a:t>6/13/16</a:t>
             </a:fld>
             <a:endParaRPr lang="en-US"/>
           </a:p>
@@ -774,7 +774,7 @@
           <a:p>
             <a:fld id="{9E764FE3-7391-B940-9C10-F64F800F0F41}" type="datetimeFigureOut">
               <a:rPr lang="en-US" smtClean="0"/>
-              <a:t>6/10/16</a:t>
+              <a:t>6/13/16</a:t>
             </a:fld>
             <a:endParaRPr lang="en-US"/>
           </a:p>
@@ -1020,7 +1020,7 @@
           <a:p>
             <a:fld id="{9E764FE3-7391-B940-9C10-F64F800F0F41}" type="datetimeFigureOut">
               <a:rPr lang="en-US" smtClean="0"/>
-              <a:t>6/10/16</a:t>
+              <a:t>6/13/16</a:t>
             </a:fld>
             <a:endParaRPr lang="en-US"/>
           </a:p>
@@ -1252,7 +1252,7 @@
           <a:p>
             <a:fld id="{9E764FE3-7391-B940-9C10-F64F800F0F41}" type="datetimeFigureOut">
               <a:rPr lang="en-US" smtClean="0"/>
-              <a:t>6/10/16</a:t>
+              <a:t>6/13/16</a:t>
             </a:fld>
             <a:endParaRPr lang="en-US"/>
           </a:p>
@@ -1619,7 +1619,7 @@
           <a:p>
             <a:fld id="{9E764FE3-7391-B940-9C10-F64F800F0F41}" type="datetimeFigureOut">
               <a:rPr lang="en-US" smtClean="0"/>
-              <a:t>6/10/16</a:t>
+              <a:t>6/13/16</a:t>
             </a:fld>
             <a:endParaRPr lang="en-US"/>
           </a:p>
@@ -1737,7 +1737,7 @@
           <a:p>
             <a:fld id="{9E764FE3-7391-B940-9C10-F64F800F0F41}" type="datetimeFigureOut">
               <a:rPr lang="en-US" smtClean="0"/>
-              <a:t>6/10/16</a:t>
+              <a:t>6/13/16</a:t>
             </a:fld>
             <a:endParaRPr lang="en-US"/>
           </a:p>
@@ -1832,7 +1832,7 @@
           <a:p>
             <a:fld id="{9E764FE3-7391-B940-9C10-F64F800F0F41}" type="datetimeFigureOut">
               <a:rPr lang="en-US" smtClean="0"/>
-              <a:t>6/10/16</a:t>
+              <a:t>6/13/16</a:t>
             </a:fld>
             <a:endParaRPr lang="en-US"/>
           </a:p>
@@ -2109,7 +2109,7 @@
           <a:p>
             <a:fld id="{9E764FE3-7391-B940-9C10-F64F800F0F41}" type="datetimeFigureOut">
               <a:rPr lang="en-US" smtClean="0"/>
-              <a:t>6/10/16</a:t>
+              <a:t>6/13/16</a:t>
             </a:fld>
             <a:endParaRPr lang="en-US"/>
           </a:p>
@@ -2362,7 +2362,7 @@
           <a:p>
             <a:fld id="{9E764FE3-7391-B940-9C10-F64F800F0F41}" type="datetimeFigureOut">
               <a:rPr lang="en-US" smtClean="0"/>
-              <a:t>6/10/16</a:t>
+              <a:t>6/13/16</a:t>
             </a:fld>
             <a:endParaRPr lang="en-US"/>
           </a:p>
@@ -2575,7 +2575,7 @@
           <a:p>
             <a:fld id="{9E764FE3-7391-B940-9C10-F64F800F0F41}" type="datetimeFigureOut">
               <a:rPr lang="en-US" smtClean="0"/>
-              <a:t>6/10/16</a:t>
+              <a:t>6/13/16</a:t>
             </a:fld>
             <a:endParaRPr lang="en-US"/>
           </a:p>
@@ -2966,6 +2966,14 @@
 <file path=ppt/slides/slide1.xml><?xml version="1.0" encoding="utf-8"?>
 <p:sld xmlns:a="http://schemas.openxmlformats.org/drawingml/2006/main" xmlns:r="http://schemas.openxmlformats.org/officeDocument/2006/relationships" xmlns:p="http://schemas.openxmlformats.org/presentationml/2006/main">
   <p:cSld>
+    <p:bg>
+      <p:bgPr>
+        <a:solidFill>
+          <a:schemeClr val="tx1"/>
+        </a:solidFill>
+        <a:effectLst/>
+      </p:bgPr>
+    </p:bg>
     <p:spTree>
       <p:nvGrpSpPr>
         <p:cNvPr id="1" name=""/>
@@ -3002,8 +3010,526 @@
         </p:blipFill>
         <p:spPr>
           <a:xfrm>
-            <a:off x="5181600" y="2514600"/>
+            <a:off x="8293100" y="397933"/>
             <a:ext cx="1828800" cy="1828800"/>
+          </a:xfrm>
+          <a:prstGeom prst="rect">
+            <a:avLst/>
+          </a:prstGeom>
+        </p:spPr>
+      </p:pic>
+      <p:pic>
+        <p:nvPicPr>
+          <p:cNvPr id="2" name="Picture 1"/>
+          <p:cNvPicPr>
+            <a:picLocks noChangeAspect="1"/>
+          </p:cNvPicPr>
+          <p:nvPr/>
+        </p:nvPicPr>
+        <p:blipFill>
+          <a:blip r:embed="rId3">
+            <a:duotone>
+              <a:prstClr val="black"/>
+              <a:schemeClr val="accent2">
+                <a:tint val="45000"/>
+                <a:satMod val="400000"/>
+              </a:schemeClr>
+            </a:duotone>
+            <a:extLst>
+              <a:ext uri="{28A0092B-C50C-407E-A947-70E740481C1C}">
+                <a14:useLocalDpi xmlns:a14="http://schemas.microsoft.com/office/drawing/2010/main" val="0"/>
+              </a:ext>
+            </a:extLst>
+          </a:blip>
+          <a:stretch>
+            <a:fillRect/>
+          </a:stretch>
+        </p:blipFill>
+        <p:spPr>
+          <a:xfrm>
+            <a:off x="741362" y="1210733"/>
+            <a:ext cx="304800" cy="203200"/>
+          </a:xfrm>
+          <a:prstGeom prst="rect">
+            <a:avLst/>
+          </a:prstGeom>
+        </p:spPr>
+      </p:pic>
+      <p:pic>
+        <p:nvPicPr>
+          <p:cNvPr id="3" name="Picture 2"/>
+          <p:cNvPicPr>
+            <a:picLocks noChangeAspect="1"/>
+          </p:cNvPicPr>
+          <p:nvPr/>
+        </p:nvPicPr>
+        <p:blipFill>
+          <a:blip r:embed="rId4">
+            <a:duotone>
+              <a:prstClr val="black"/>
+              <a:schemeClr val="accent2">
+                <a:tint val="45000"/>
+                <a:satMod val="400000"/>
+              </a:schemeClr>
+            </a:duotone>
+            <a:extLst>
+              <a:ext uri="{28A0092B-C50C-407E-A947-70E740481C1C}">
+                <a14:useLocalDpi xmlns:a14="http://schemas.microsoft.com/office/drawing/2010/main" val="0"/>
+              </a:ext>
+            </a:extLst>
+          </a:blip>
+          <a:stretch>
+            <a:fillRect/>
+          </a:stretch>
+        </p:blipFill>
+        <p:spPr>
+          <a:xfrm>
+            <a:off x="1534583" y="1007533"/>
+            <a:ext cx="609600" cy="406400"/>
+          </a:xfrm>
+          <a:prstGeom prst="rect">
+            <a:avLst/>
+          </a:prstGeom>
+        </p:spPr>
+      </p:pic>
+      <p:pic>
+        <p:nvPicPr>
+          <p:cNvPr id="5" name="Picture 4"/>
+          <p:cNvPicPr>
+            <a:picLocks noChangeAspect="1"/>
+          </p:cNvPicPr>
+          <p:nvPr/>
+        </p:nvPicPr>
+        <p:blipFill>
+          <a:blip r:embed="rId5">
+            <a:duotone>
+              <a:prstClr val="black"/>
+              <a:schemeClr val="accent2">
+                <a:tint val="45000"/>
+                <a:satMod val="400000"/>
+              </a:schemeClr>
+            </a:duotone>
+            <a:extLst>
+              <a:ext uri="{28A0092B-C50C-407E-A947-70E740481C1C}">
+                <a14:useLocalDpi xmlns:a14="http://schemas.microsoft.com/office/drawing/2010/main" val="0"/>
+              </a:ext>
+            </a:extLst>
+          </a:blip>
+          <a:stretch>
+            <a:fillRect/>
+          </a:stretch>
+        </p:blipFill>
+        <p:spPr>
+          <a:xfrm>
+            <a:off x="2632604" y="1210733"/>
+            <a:ext cx="304800" cy="203200"/>
+          </a:xfrm>
+          <a:prstGeom prst="rect">
+            <a:avLst/>
+          </a:prstGeom>
+        </p:spPr>
+      </p:pic>
+      <p:pic>
+        <p:nvPicPr>
+          <p:cNvPr id="6" name="Picture 5"/>
+          <p:cNvPicPr>
+            <a:picLocks noChangeAspect="1"/>
+          </p:cNvPicPr>
+          <p:nvPr/>
+        </p:nvPicPr>
+        <p:blipFill>
+          <a:blip r:embed="rId6">
+            <a:duotone>
+              <a:prstClr val="black"/>
+              <a:schemeClr val="accent2">
+                <a:tint val="45000"/>
+                <a:satMod val="400000"/>
+              </a:schemeClr>
+            </a:duotone>
+            <a:extLst>
+              <a:ext uri="{28A0092B-C50C-407E-A947-70E740481C1C}">
+                <a14:useLocalDpi xmlns:a14="http://schemas.microsoft.com/office/drawing/2010/main" val="0"/>
+              </a:ext>
+            </a:extLst>
+          </a:blip>
+          <a:stretch>
+            <a:fillRect/>
+          </a:stretch>
+        </p:blipFill>
+        <p:spPr>
+          <a:xfrm>
+            <a:off x="3425825" y="1007533"/>
+            <a:ext cx="609600" cy="406400"/>
+          </a:xfrm>
+          <a:prstGeom prst="rect">
+            <a:avLst/>
+          </a:prstGeom>
+        </p:spPr>
+      </p:pic>
+      <p:pic>
+        <p:nvPicPr>
+          <p:cNvPr id="7" name="Picture 6"/>
+          <p:cNvPicPr>
+            <a:picLocks noChangeAspect="1"/>
+          </p:cNvPicPr>
+          <p:nvPr/>
+        </p:nvPicPr>
+        <p:blipFill>
+          <a:blip r:embed="rId7">
+            <a:duotone>
+              <a:prstClr val="black"/>
+              <a:schemeClr val="accent6">
+                <a:tint val="45000"/>
+                <a:satMod val="400000"/>
+              </a:schemeClr>
+            </a:duotone>
+            <a:extLst>
+              <a:ext uri="{28A0092B-C50C-407E-A947-70E740481C1C}">
+                <a14:useLocalDpi xmlns:a14="http://schemas.microsoft.com/office/drawing/2010/main" val="0"/>
+              </a:ext>
+            </a:extLst>
+          </a:blip>
+          <a:stretch>
+            <a:fillRect/>
+          </a:stretch>
+        </p:blipFill>
+        <p:spPr>
+          <a:xfrm>
+            <a:off x="741362" y="1913467"/>
+            <a:ext cx="304800" cy="203200"/>
+          </a:xfrm>
+          <a:prstGeom prst="rect">
+            <a:avLst/>
+          </a:prstGeom>
+        </p:spPr>
+      </p:pic>
+      <p:pic>
+        <p:nvPicPr>
+          <p:cNvPr id="8" name="Picture 7"/>
+          <p:cNvPicPr>
+            <a:picLocks noChangeAspect="1"/>
+          </p:cNvPicPr>
+          <p:nvPr/>
+        </p:nvPicPr>
+        <p:blipFill>
+          <a:blip r:embed="rId8">
+            <a:duotone>
+              <a:prstClr val="black"/>
+              <a:schemeClr val="accent6">
+                <a:tint val="45000"/>
+                <a:satMod val="400000"/>
+              </a:schemeClr>
+            </a:duotone>
+            <a:extLst>
+              <a:ext uri="{28A0092B-C50C-407E-A947-70E740481C1C}">
+                <a14:useLocalDpi xmlns:a14="http://schemas.microsoft.com/office/drawing/2010/main" val="0"/>
+              </a:ext>
+            </a:extLst>
+          </a:blip>
+          <a:stretch>
+            <a:fillRect/>
+          </a:stretch>
+        </p:blipFill>
+        <p:spPr>
+          <a:xfrm>
+            <a:off x="1534583" y="1710267"/>
+            <a:ext cx="609600" cy="406400"/>
+          </a:xfrm>
+          <a:prstGeom prst="rect">
+            <a:avLst/>
+          </a:prstGeom>
+        </p:spPr>
+      </p:pic>
+      <p:pic>
+        <p:nvPicPr>
+          <p:cNvPr id="9" name="Picture 8"/>
+          <p:cNvPicPr>
+            <a:picLocks noChangeAspect="1"/>
+          </p:cNvPicPr>
+          <p:nvPr/>
+        </p:nvPicPr>
+        <p:blipFill>
+          <a:blip r:embed="rId9">
+            <a:duotone>
+              <a:prstClr val="black"/>
+              <a:schemeClr val="accent6">
+                <a:tint val="45000"/>
+                <a:satMod val="400000"/>
+              </a:schemeClr>
+            </a:duotone>
+            <a:extLst>
+              <a:ext uri="{28A0092B-C50C-407E-A947-70E740481C1C}">
+                <a14:useLocalDpi xmlns:a14="http://schemas.microsoft.com/office/drawing/2010/main" val="0"/>
+              </a:ext>
+            </a:extLst>
+          </a:blip>
+          <a:stretch>
+            <a:fillRect/>
+          </a:stretch>
+        </p:blipFill>
+        <p:spPr>
+          <a:xfrm>
+            <a:off x="2632604" y="1913467"/>
+            <a:ext cx="304800" cy="203200"/>
+          </a:xfrm>
+          <a:prstGeom prst="rect">
+            <a:avLst/>
+          </a:prstGeom>
+        </p:spPr>
+      </p:pic>
+      <p:pic>
+        <p:nvPicPr>
+          <p:cNvPr id="10" name="Picture 9"/>
+          <p:cNvPicPr>
+            <a:picLocks noChangeAspect="1"/>
+          </p:cNvPicPr>
+          <p:nvPr/>
+        </p:nvPicPr>
+        <p:blipFill>
+          <a:blip r:embed="rId10">
+            <a:duotone>
+              <a:prstClr val="black"/>
+              <a:schemeClr val="accent6">
+                <a:tint val="45000"/>
+                <a:satMod val="400000"/>
+              </a:schemeClr>
+            </a:duotone>
+            <a:extLst>
+              <a:ext uri="{28A0092B-C50C-407E-A947-70E740481C1C}">
+                <a14:useLocalDpi xmlns:a14="http://schemas.microsoft.com/office/drawing/2010/main" val="0"/>
+              </a:ext>
+            </a:extLst>
+          </a:blip>
+          <a:stretch>
+            <a:fillRect/>
+          </a:stretch>
+        </p:blipFill>
+        <p:spPr>
+          <a:xfrm>
+            <a:off x="3425825" y="1710267"/>
+            <a:ext cx="609600" cy="406400"/>
+          </a:xfrm>
+          <a:prstGeom prst="rect">
+            <a:avLst/>
+          </a:prstGeom>
+        </p:spPr>
+      </p:pic>
+      <p:pic>
+        <p:nvPicPr>
+          <p:cNvPr id="11" name="Picture 10"/>
+          <p:cNvPicPr>
+            <a:picLocks noChangeAspect="1"/>
+          </p:cNvPicPr>
+          <p:nvPr/>
+        </p:nvPicPr>
+        <p:blipFill>
+          <a:blip r:embed="rId11">
+            <a:duotone>
+              <a:prstClr val="black"/>
+              <a:schemeClr val="accent5">
+                <a:tint val="45000"/>
+                <a:satMod val="400000"/>
+              </a:schemeClr>
+            </a:duotone>
+            <a:extLst>
+              <a:ext uri="{28A0092B-C50C-407E-A947-70E740481C1C}">
+                <a14:useLocalDpi xmlns:a14="http://schemas.microsoft.com/office/drawing/2010/main" val="0"/>
+              </a:ext>
+            </a:extLst>
+          </a:blip>
+          <a:stretch>
+            <a:fillRect/>
+          </a:stretch>
+        </p:blipFill>
+        <p:spPr>
+          <a:xfrm>
+            <a:off x="741362" y="2616201"/>
+            <a:ext cx="304800" cy="203200"/>
+          </a:xfrm>
+          <a:prstGeom prst="rect">
+            <a:avLst/>
+          </a:prstGeom>
+        </p:spPr>
+      </p:pic>
+      <p:pic>
+        <p:nvPicPr>
+          <p:cNvPr id="12" name="Picture 11"/>
+          <p:cNvPicPr>
+            <a:picLocks noChangeAspect="1"/>
+          </p:cNvPicPr>
+          <p:nvPr/>
+        </p:nvPicPr>
+        <p:blipFill>
+          <a:blip r:embed="rId12">
+            <a:duotone>
+              <a:prstClr val="black"/>
+              <a:schemeClr val="accent5">
+                <a:tint val="45000"/>
+                <a:satMod val="400000"/>
+              </a:schemeClr>
+            </a:duotone>
+            <a:extLst>
+              <a:ext uri="{28A0092B-C50C-407E-A947-70E740481C1C}">
+                <a14:useLocalDpi xmlns:a14="http://schemas.microsoft.com/office/drawing/2010/main" val="0"/>
+              </a:ext>
+            </a:extLst>
+          </a:blip>
+          <a:stretch>
+            <a:fillRect/>
+          </a:stretch>
+        </p:blipFill>
+        <p:spPr>
+          <a:xfrm>
+            <a:off x="1534583" y="2413001"/>
+            <a:ext cx="609600" cy="406400"/>
+          </a:xfrm>
+          <a:prstGeom prst="rect">
+            <a:avLst/>
+          </a:prstGeom>
+        </p:spPr>
+      </p:pic>
+      <p:pic>
+        <p:nvPicPr>
+          <p:cNvPr id="13" name="Picture 12"/>
+          <p:cNvPicPr>
+            <a:picLocks noChangeAspect="1"/>
+          </p:cNvPicPr>
+          <p:nvPr/>
+        </p:nvPicPr>
+        <p:blipFill>
+          <a:blip r:embed="rId13">
+            <a:duotone>
+              <a:prstClr val="black"/>
+              <a:schemeClr val="accent5">
+                <a:tint val="45000"/>
+                <a:satMod val="400000"/>
+              </a:schemeClr>
+            </a:duotone>
+            <a:extLst>
+              <a:ext uri="{28A0092B-C50C-407E-A947-70E740481C1C}">
+                <a14:useLocalDpi xmlns:a14="http://schemas.microsoft.com/office/drawing/2010/main" val="0"/>
+              </a:ext>
+            </a:extLst>
+          </a:blip>
+          <a:stretch>
+            <a:fillRect/>
+          </a:stretch>
+        </p:blipFill>
+        <p:spPr>
+          <a:xfrm>
+            <a:off x="2632604" y="2616201"/>
+            <a:ext cx="304800" cy="203200"/>
+          </a:xfrm>
+          <a:prstGeom prst="rect">
+            <a:avLst/>
+          </a:prstGeom>
+        </p:spPr>
+      </p:pic>
+      <p:pic>
+        <p:nvPicPr>
+          <p:cNvPr id="14" name="Picture 13"/>
+          <p:cNvPicPr>
+            <a:picLocks noChangeAspect="1"/>
+          </p:cNvPicPr>
+          <p:nvPr/>
+        </p:nvPicPr>
+        <p:blipFill>
+          <a:blip r:embed="rId14">
+            <a:duotone>
+              <a:prstClr val="black"/>
+              <a:schemeClr val="accent5">
+                <a:tint val="45000"/>
+                <a:satMod val="400000"/>
+              </a:schemeClr>
+            </a:duotone>
+            <a:extLst>
+              <a:ext uri="{28A0092B-C50C-407E-A947-70E740481C1C}">
+                <a14:useLocalDpi xmlns:a14="http://schemas.microsoft.com/office/drawing/2010/main" val="0"/>
+              </a:ext>
+            </a:extLst>
+          </a:blip>
+          <a:stretch>
+            <a:fillRect/>
+          </a:stretch>
+        </p:blipFill>
+        <p:spPr>
+          <a:xfrm>
+            <a:off x="3425825" y="2413001"/>
+            <a:ext cx="609600" cy="406400"/>
+          </a:xfrm>
+          <a:prstGeom prst="rect">
+            <a:avLst/>
+          </a:prstGeom>
+        </p:spPr>
+      </p:pic>
+      <p:pic>
+        <p:nvPicPr>
+          <p:cNvPr id="15" name="Picture 14"/>
+          <p:cNvPicPr>
+            <a:picLocks noChangeAspect="1"/>
+          </p:cNvPicPr>
+          <p:nvPr/>
+        </p:nvPicPr>
+        <p:blipFill>
+          <a:blip r:embed="rId15">
+            <a:duotone>
+              <a:prstClr val="black"/>
+              <a:schemeClr val="accent1">
+                <a:tint val="45000"/>
+                <a:satMod val="400000"/>
+              </a:schemeClr>
+            </a:duotone>
+            <a:extLst>
+              <a:ext uri="{28A0092B-C50C-407E-A947-70E740481C1C}">
+                <a14:useLocalDpi xmlns:a14="http://schemas.microsoft.com/office/drawing/2010/main" val="0"/>
+              </a:ext>
+            </a:extLst>
+          </a:blip>
+          <a:stretch>
+            <a:fillRect/>
+          </a:stretch>
+        </p:blipFill>
+        <p:spPr>
+          <a:xfrm>
+            <a:off x="703262" y="3632200"/>
+            <a:ext cx="381000" cy="203200"/>
+          </a:xfrm>
+          <a:prstGeom prst="rect">
+            <a:avLst/>
+          </a:prstGeom>
+        </p:spPr>
+      </p:pic>
+      <p:pic>
+        <p:nvPicPr>
+          <p:cNvPr id="16" name="Picture 15"/>
+          <p:cNvPicPr>
+            <a:picLocks noChangeAspect="1"/>
+          </p:cNvPicPr>
+          <p:nvPr/>
+        </p:nvPicPr>
+        <p:blipFill>
+          <a:blip r:embed="rId16">
+            <a:duotone>
+              <a:prstClr val="black"/>
+              <a:schemeClr val="accent1">
+                <a:tint val="45000"/>
+                <a:satMod val="400000"/>
+              </a:schemeClr>
+            </a:duotone>
+            <a:extLst>
+              <a:ext uri="{28A0092B-C50C-407E-A947-70E740481C1C}">
+                <a14:useLocalDpi xmlns:a14="http://schemas.microsoft.com/office/drawing/2010/main" val="0"/>
+              </a:ext>
+            </a:extLst>
+          </a:blip>
+          <a:stretch>
+            <a:fillRect/>
+          </a:stretch>
+        </p:blipFill>
+        <p:spPr>
+          <a:xfrm>
+            <a:off x="1458383" y="3429000"/>
+            <a:ext cx="762000" cy="406400"/>
           </a:xfrm>
           <a:prstGeom prst="rect">
             <a:avLst/>

</xml_diff>

<commit_message>
Updated Pods, LaunchKit, and UI/UX
</commit_message>
<xml_diff>
--- a/Supporting Items/Images/DrinkPoint PowerPoint.pptx
+++ b/Supporting Items/Images/DrinkPoint PowerPoint.pptx
@@ -3868,6 +3868,13 @@
   <p:clrMapOvr>
     <a:masterClrMapping/>
   </p:clrMapOvr>
+  <p:timing>
+    <p:tnLst>
+      <p:par>
+        <p:cTn id="1" dur="indefinite" restart="never" nodeType="tmRoot"/>
+      </p:par>
+    </p:tnLst>
+  </p:timing>
 </p:sld>
 </file>
 
@@ -3918,50 +3925,201 @@
           </a:prstGeom>
         </p:spPr>
       </p:pic>
-      <p:sp>
-        <p:nvSpPr>
-          <p:cNvPr id="5" name="Rounded Rectangle 4"/>
-          <p:cNvSpPr/>
+      <p:grpSp>
+        <p:nvGrpSpPr>
+          <p:cNvPr id="9" name="Group 8"/>
+          <p:cNvGrpSpPr/>
           <p:nvPr/>
-        </p:nvSpPr>
-        <p:spPr>
-          <a:xfrm>
-            <a:off x="6362700" y="3822700"/>
-            <a:ext cx="5588000" cy="2628900"/>
-          </a:xfrm>
-          <a:prstGeom prst="roundRect">
-            <a:avLst/>
-          </a:prstGeom>
-        </p:spPr>
-        <p:style>
-          <a:lnRef idx="2">
-            <a:schemeClr val="accent1">
-              <a:shade val="50000"/>
-            </a:schemeClr>
-          </a:lnRef>
-          <a:fillRef idx="1">
-            <a:schemeClr val="accent1"/>
-          </a:fillRef>
-          <a:effectRef idx="0">
-            <a:schemeClr val="accent1"/>
-          </a:effectRef>
-          <a:fontRef idx="minor">
-            <a:schemeClr val="lt1"/>
-          </a:fontRef>
-        </p:style>
-        <p:txBody>
-          <a:bodyPr rtlCol="0" anchor="ctr"/>
-          <a:lstStyle/>
-          <a:p>
-            <a:pPr algn="ctr"/>
-            <a:r>
-              <a:rPr lang="en-US" dirty="0" smtClean="0"/>
-              <a:t>Binary Bastards</a:t>
-            </a:r>
-            <a:endParaRPr lang="en-US" dirty="0"/>
-          </a:p>
-        </p:txBody>
-      </p:sp>
+        </p:nvGrpSpPr>
+        <p:grpSpPr>
+          <a:xfrm>
+            <a:off x="6451600" y="1663700"/>
+            <a:ext cx="5499100" cy="3238500"/>
+            <a:chOff x="6451600" y="1663700"/>
+            <a:chExt cx="5499100" cy="3238500"/>
+          </a:xfrm>
+        </p:grpSpPr>
+        <p:sp>
+          <p:nvSpPr>
+            <p:cNvPr id="8" name="Rectangle 7"/>
+            <p:cNvSpPr/>
+            <p:nvPr/>
+          </p:nvSpPr>
+          <p:spPr>
+            <a:xfrm>
+              <a:off x="6451600" y="1663700"/>
+              <a:ext cx="5499100" cy="3238500"/>
+            </a:xfrm>
+            <a:prstGeom prst="rect">
+              <a:avLst/>
+            </a:prstGeom>
+          </p:spPr>
+          <p:style>
+            <a:lnRef idx="2">
+              <a:schemeClr val="dk1">
+                <a:shade val="50000"/>
+              </a:schemeClr>
+            </a:lnRef>
+            <a:fillRef idx="1">
+              <a:schemeClr val="dk1"/>
+            </a:fillRef>
+            <a:effectRef idx="0">
+              <a:schemeClr val="dk1"/>
+            </a:effectRef>
+            <a:fontRef idx="minor">
+              <a:schemeClr val="lt1"/>
+            </a:fontRef>
+          </p:style>
+          <p:txBody>
+            <a:bodyPr rtlCol="0" anchor="ctr"/>
+            <a:lstStyle/>
+            <a:p>
+              <a:pPr algn="ctr"/>
+              <a:endParaRPr lang="en-US"/>
+            </a:p>
+          </p:txBody>
+        </p:sp>
+        <p:sp>
+          <p:nvSpPr>
+            <p:cNvPr id="5" name="Rounded Rectangle 4"/>
+            <p:cNvSpPr/>
+            <p:nvPr/>
+          </p:nvSpPr>
+          <p:spPr>
+            <a:xfrm>
+              <a:off x="6597650" y="3644900"/>
+              <a:ext cx="5353050" cy="990600"/>
+            </a:xfrm>
+            <a:prstGeom prst="roundRect">
+              <a:avLst/>
+            </a:prstGeom>
+          </p:spPr>
+          <p:style>
+            <a:lnRef idx="2">
+              <a:schemeClr val="dk1">
+                <a:shade val="50000"/>
+              </a:schemeClr>
+            </a:lnRef>
+            <a:fillRef idx="1">
+              <a:schemeClr val="dk1"/>
+            </a:fillRef>
+            <a:effectRef idx="0">
+              <a:schemeClr val="dk1"/>
+            </a:effectRef>
+            <a:fontRef idx="minor">
+              <a:schemeClr val="lt1"/>
+            </a:fontRef>
+          </p:style>
+          <p:txBody>
+            <a:bodyPr rtlCol="0" anchor="ctr"/>
+            <a:lstStyle/>
+            <a:p>
+              <a:pPr algn="ctr"/>
+              <a:r>
+                <a:rPr lang="en-US" sz="6000" dirty="0" smtClean="0">
+                  <a:solidFill>
+                    <a:srgbClr val="BF8900"/>
+                  </a:solidFill>
+                  <a:latin typeface="England Hand DB" charset="0"/>
+                  <a:ea typeface="England Hand DB" charset="0"/>
+                  <a:cs typeface="England Hand DB" charset="0"/>
+                </a:rPr>
+                <a:t>Binary Bastards</a:t>
+              </a:r>
+              <a:endParaRPr lang="en-US" sz="6000" dirty="0">
+                <a:solidFill>
+                  <a:srgbClr val="BF8900"/>
+                </a:solidFill>
+                <a:latin typeface="England Hand DB" charset="0"/>
+                <a:ea typeface="England Hand DB" charset="0"/>
+                <a:cs typeface="England Hand DB" charset="0"/>
+              </a:endParaRPr>
+            </a:p>
+          </p:txBody>
+        </p:sp>
+        <p:sp>
+          <p:nvSpPr>
+            <p:cNvPr id="7" name="Curved Up Ribbon 6"/>
+            <p:cNvSpPr/>
+            <p:nvPr/>
+          </p:nvSpPr>
+          <p:spPr>
+            <a:xfrm>
+              <a:off x="7524750" y="1899609"/>
+              <a:ext cx="3352800" cy="1295400"/>
+            </a:xfrm>
+            <a:prstGeom prst="ellipseRibbon2">
+              <a:avLst>
+                <a:gd name="adj1" fmla="val 69118"/>
+                <a:gd name="adj2" fmla="val 44697"/>
+                <a:gd name="adj3" fmla="val 12500"/>
+              </a:avLst>
+            </a:prstGeom>
+            <a:noFill/>
+          </p:spPr>
+          <p:style>
+            <a:lnRef idx="2">
+              <a:schemeClr val="accent4">
+                <a:shade val="50000"/>
+              </a:schemeClr>
+            </a:lnRef>
+            <a:fillRef idx="1">
+              <a:schemeClr val="accent4"/>
+            </a:fillRef>
+            <a:effectRef idx="0">
+              <a:schemeClr val="accent4"/>
+            </a:effectRef>
+            <a:fontRef idx="minor">
+              <a:schemeClr val="lt1"/>
+            </a:fontRef>
+          </p:style>
+          <p:txBody>
+            <a:bodyPr rtlCol="0" anchor="ctr"/>
+            <a:lstStyle/>
+            <a:p>
+              <a:pPr algn="ctr"/>
+              <a:endParaRPr lang="en-US"/>
+            </a:p>
+          </p:txBody>
+        </p:sp>
+        <p:pic>
+          <p:nvPicPr>
+            <p:cNvPr id="3" name="Picture 2"/>
+            <p:cNvPicPr>
+              <a:picLocks noChangeAspect="1"/>
+            </p:cNvPicPr>
+            <p:nvPr/>
+          </p:nvPicPr>
+          <p:blipFill>
+            <a:blip r:embed="rId3">
+              <a:duotone>
+                <a:schemeClr val="accent4">
+                  <a:shade val="45000"/>
+                  <a:satMod val="135000"/>
+                </a:schemeClr>
+                <a:prstClr val="white"/>
+              </a:duotone>
+              <a:extLst>
+                <a:ext uri="{28A0092B-C50C-407E-A947-70E740481C1C}">
+                  <a14:useLocalDpi xmlns:a14="http://schemas.microsoft.com/office/drawing/2010/main" val="0"/>
+                </a:ext>
+              </a:extLst>
+            </a:blip>
+            <a:stretch>
+              <a:fillRect/>
+            </a:stretch>
+          </p:blipFill>
+          <p:spPr>
+            <a:xfrm flipH="1">
+              <a:off x="8412480" y="2755900"/>
+              <a:ext cx="1577340" cy="1030618"/>
+            </a:xfrm>
+            <a:prstGeom prst="rect">
+              <a:avLst/>
+            </a:prstGeom>
+          </p:spPr>
+        </p:pic>
+      </p:grpSp>
     </p:spTree>
     <p:extLst>
       <p:ext uri="{BB962C8B-B14F-4D97-AF65-F5344CB8AC3E}">
@@ -3972,6 +4130,13 @@
   <p:clrMapOvr>
     <a:masterClrMapping/>
   </p:clrMapOvr>
+  <p:timing>
+    <p:tnLst>
+      <p:par>
+        <p:cTn id="1" dur="indefinite" restart="never" nodeType="tmRoot"/>
+      </p:par>
+    </p:tnLst>
+  </p:timing>
 </p:sld>
 </file>
 

</xml_diff>

<commit_message>
Adjusted gameplay, added vibrate, replaced label images
</commit_message>
<xml_diff>
--- a/Supporting Items/Images/DrinkPoint PowerPoint.pptx
+++ b/Supporting Items/Images/DrinkPoint PowerPoint.pptx
@@ -5,8 +5,11 @@
     <p:sldMasterId id="2147483648" r:id="rId1"/>
   </p:sldMasterIdLst>
   <p:sldIdLst>
-    <p:sldId id="256" r:id="rId2"/>
-    <p:sldId id="257" r:id="rId3"/>
+    <p:sldId id="257" r:id="rId2"/>
+    <p:sldId id="256" r:id="rId3"/>
+    <p:sldId id="260" r:id="rId4"/>
+    <p:sldId id="259" r:id="rId5"/>
+    <p:sldId id="258" r:id="rId6"/>
   </p:sldIdLst>
   <p:sldSz cx="12192000" cy="6858000"/>
   <p:notesSz cx="6858000" cy="9144000"/>
@@ -255,7 +258,7 @@
           <a:p>
             <a:fld id="{9E764FE3-7391-B940-9C10-F64F800F0F41}" type="datetimeFigureOut">
               <a:rPr lang="en-US" smtClean="0"/>
-              <a:t>6/25/16</a:t>
+              <a:t>6/28/16</a:t>
             </a:fld>
             <a:endParaRPr lang="en-US"/>
           </a:p>
@@ -425,7 +428,7 @@
           <a:p>
             <a:fld id="{9E764FE3-7391-B940-9C10-F64F800F0F41}" type="datetimeFigureOut">
               <a:rPr lang="en-US" smtClean="0"/>
-              <a:t>6/25/16</a:t>
+              <a:t>6/28/16</a:t>
             </a:fld>
             <a:endParaRPr lang="en-US"/>
           </a:p>
@@ -605,7 +608,7 @@
           <a:p>
             <a:fld id="{9E764FE3-7391-B940-9C10-F64F800F0F41}" type="datetimeFigureOut">
               <a:rPr lang="en-US" smtClean="0"/>
-              <a:t>6/25/16</a:t>
+              <a:t>6/28/16</a:t>
             </a:fld>
             <a:endParaRPr lang="en-US"/>
           </a:p>
@@ -775,7 +778,7 @@
           <a:p>
             <a:fld id="{9E764FE3-7391-B940-9C10-F64F800F0F41}" type="datetimeFigureOut">
               <a:rPr lang="en-US" smtClean="0"/>
-              <a:t>6/25/16</a:t>
+              <a:t>6/28/16</a:t>
             </a:fld>
             <a:endParaRPr lang="en-US"/>
           </a:p>
@@ -1021,7 +1024,7 @@
           <a:p>
             <a:fld id="{9E764FE3-7391-B940-9C10-F64F800F0F41}" type="datetimeFigureOut">
               <a:rPr lang="en-US" smtClean="0"/>
-              <a:t>6/25/16</a:t>
+              <a:t>6/28/16</a:t>
             </a:fld>
             <a:endParaRPr lang="en-US"/>
           </a:p>
@@ -1253,7 +1256,7 @@
           <a:p>
             <a:fld id="{9E764FE3-7391-B940-9C10-F64F800F0F41}" type="datetimeFigureOut">
               <a:rPr lang="en-US" smtClean="0"/>
-              <a:t>6/25/16</a:t>
+              <a:t>6/28/16</a:t>
             </a:fld>
             <a:endParaRPr lang="en-US"/>
           </a:p>
@@ -1620,7 +1623,7 @@
           <a:p>
             <a:fld id="{9E764FE3-7391-B940-9C10-F64F800F0F41}" type="datetimeFigureOut">
               <a:rPr lang="en-US" smtClean="0"/>
-              <a:t>6/25/16</a:t>
+              <a:t>6/28/16</a:t>
             </a:fld>
             <a:endParaRPr lang="en-US"/>
           </a:p>
@@ -1738,7 +1741,7 @@
           <a:p>
             <a:fld id="{9E764FE3-7391-B940-9C10-F64F800F0F41}" type="datetimeFigureOut">
               <a:rPr lang="en-US" smtClean="0"/>
-              <a:t>6/25/16</a:t>
+              <a:t>6/28/16</a:t>
             </a:fld>
             <a:endParaRPr lang="en-US"/>
           </a:p>
@@ -1833,7 +1836,7 @@
           <a:p>
             <a:fld id="{9E764FE3-7391-B940-9C10-F64F800F0F41}" type="datetimeFigureOut">
               <a:rPr lang="en-US" smtClean="0"/>
-              <a:t>6/25/16</a:t>
+              <a:t>6/28/16</a:t>
             </a:fld>
             <a:endParaRPr lang="en-US"/>
           </a:p>
@@ -2110,7 +2113,7 @@
           <a:p>
             <a:fld id="{9E764FE3-7391-B940-9C10-F64F800F0F41}" type="datetimeFigureOut">
               <a:rPr lang="en-US" smtClean="0"/>
-              <a:t>6/25/16</a:t>
+              <a:t>6/28/16</a:t>
             </a:fld>
             <a:endParaRPr lang="en-US"/>
           </a:p>
@@ -2363,7 +2366,7 @@
           <a:p>
             <a:fld id="{9E764FE3-7391-B940-9C10-F64F800F0F41}" type="datetimeFigureOut">
               <a:rPr lang="en-US" smtClean="0"/>
-              <a:t>6/25/16</a:t>
+              <a:t>6/28/16</a:t>
             </a:fld>
             <a:endParaRPr lang="en-US"/>
           </a:p>
@@ -2576,7 +2579,7 @@
           <a:p>
             <a:fld id="{9E764FE3-7391-B940-9C10-F64F800F0F41}" type="datetimeFigureOut">
               <a:rPr lang="en-US" smtClean="0"/>
-              <a:t>6/25/16</a:t>
+              <a:t>6/28/16</a:t>
             </a:fld>
             <a:endParaRPr lang="en-US"/>
           </a:p>
@@ -2967,920 +2970,6 @@
 <file path=ppt/slides/slide1.xml><?xml version="1.0" encoding="utf-8"?>
 <p:sld xmlns:a="http://schemas.openxmlformats.org/drawingml/2006/main" xmlns:r="http://schemas.openxmlformats.org/officeDocument/2006/relationships" xmlns:p="http://schemas.openxmlformats.org/presentationml/2006/main">
   <p:cSld>
-    <p:bg>
-      <p:bgPr>
-        <a:solidFill>
-          <a:schemeClr val="tx1"/>
-        </a:solidFill>
-        <a:effectLst/>
-      </p:bgPr>
-    </p:bg>
-    <p:spTree>
-      <p:nvGrpSpPr>
-        <p:cNvPr id="1" name=""/>
-        <p:cNvGrpSpPr/>
-        <p:nvPr/>
-      </p:nvGrpSpPr>
-      <p:grpSpPr>
-        <a:xfrm>
-          <a:off x="0" y="0"/>
-          <a:ext cx="0" cy="0"/>
-          <a:chOff x="0" y="0"/>
-          <a:chExt cx="0" cy="0"/>
-        </a:xfrm>
-      </p:grpSpPr>
-      <p:pic>
-        <p:nvPicPr>
-          <p:cNvPr id="4" name="Picture 3"/>
-          <p:cNvPicPr>
-            <a:picLocks noChangeAspect="1"/>
-          </p:cNvPicPr>
-          <p:nvPr/>
-        </p:nvPicPr>
-        <p:blipFill>
-          <a:blip r:embed="rId2">
-            <a:extLst>
-              <a:ext uri="{28A0092B-C50C-407E-A947-70E740481C1C}">
-                <a14:useLocalDpi xmlns:a14="http://schemas.microsoft.com/office/drawing/2010/main" val="0"/>
-              </a:ext>
-            </a:extLst>
-          </a:blip>
-          <a:stretch>
-            <a:fillRect/>
-          </a:stretch>
-        </p:blipFill>
-        <p:spPr>
-          <a:xfrm>
-            <a:off x="5181600" y="2429934"/>
-            <a:ext cx="1828800" cy="1828800"/>
-          </a:xfrm>
-          <a:prstGeom prst="rect">
-            <a:avLst/>
-          </a:prstGeom>
-        </p:spPr>
-      </p:pic>
-      <p:pic>
-        <p:nvPicPr>
-          <p:cNvPr id="2" name="Picture 1"/>
-          <p:cNvPicPr>
-            <a:picLocks noChangeAspect="1"/>
-          </p:cNvPicPr>
-          <p:nvPr/>
-        </p:nvPicPr>
-        <p:blipFill>
-          <a:blip r:embed="rId3">
-            <a:duotone>
-              <a:prstClr val="black"/>
-              <a:schemeClr val="accent2">
-                <a:tint val="45000"/>
-                <a:satMod val="400000"/>
-              </a:schemeClr>
-            </a:duotone>
-            <a:extLst>
-              <a:ext uri="{28A0092B-C50C-407E-A947-70E740481C1C}">
-                <a14:useLocalDpi xmlns:a14="http://schemas.microsoft.com/office/drawing/2010/main" val="0"/>
-              </a:ext>
-            </a:extLst>
-          </a:blip>
-          <a:stretch>
-            <a:fillRect/>
-          </a:stretch>
-        </p:blipFill>
-        <p:spPr>
-          <a:xfrm>
-            <a:off x="741362" y="1210733"/>
-            <a:ext cx="304800" cy="203200"/>
-          </a:xfrm>
-          <a:prstGeom prst="rect">
-            <a:avLst/>
-          </a:prstGeom>
-        </p:spPr>
-      </p:pic>
-      <p:pic>
-        <p:nvPicPr>
-          <p:cNvPr id="3" name="Picture 2"/>
-          <p:cNvPicPr>
-            <a:picLocks noChangeAspect="1"/>
-          </p:cNvPicPr>
-          <p:nvPr/>
-        </p:nvPicPr>
-        <p:blipFill>
-          <a:blip r:embed="rId4">
-            <a:duotone>
-              <a:prstClr val="black"/>
-              <a:schemeClr val="accent2">
-                <a:tint val="45000"/>
-                <a:satMod val="400000"/>
-              </a:schemeClr>
-            </a:duotone>
-            <a:extLst>
-              <a:ext uri="{28A0092B-C50C-407E-A947-70E740481C1C}">
-                <a14:useLocalDpi xmlns:a14="http://schemas.microsoft.com/office/drawing/2010/main" val="0"/>
-              </a:ext>
-            </a:extLst>
-          </a:blip>
-          <a:stretch>
-            <a:fillRect/>
-          </a:stretch>
-        </p:blipFill>
-        <p:spPr>
-          <a:xfrm>
-            <a:off x="1534583" y="1007533"/>
-            <a:ext cx="609600" cy="406400"/>
-          </a:xfrm>
-          <a:prstGeom prst="rect">
-            <a:avLst/>
-          </a:prstGeom>
-        </p:spPr>
-      </p:pic>
-      <p:pic>
-        <p:nvPicPr>
-          <p:cNvPr id="5" name="Picture 4"/>
-          <p:cNvPicPr>
-            <a:picLocks noChangeAspect="1"/>
-          </p:cNvPicPr>
-          <p:nvPr/>
-        </p:nvPicPr>
-        <p:blipFill>
-          <a:blip r:embed="rId5">
-            <a:duotone>
-              <a:prstClr val="black"/>
-              <a:schemeClr val="accent2">
-                <a:tint val="45000"/>
-                <a:satMod val="400000"/>
-              </a:schemeClr>
-            </a:duotone>
-            <a:extLst>
-              <a:ext uri="{28A0092B-C50C-407E-A947-70E740481C1C}">
-                <a14:useLocalDpi xmlns:a14="http://schemas.microsoft.com/office/drawing/2010/main" val="0"/>
-              </a:ext>
-            </a:extLst>
-          </a:blip>
-          <a:stretch>
-            <a:fillRect/>
-          </a:stretch>
-        </p:blipFill>
-        <p:spPr>
-          <a:xfrm>
-            <a:off x="2632604" y="1210733"/>
-            <a:ext cx="304800" cy="203200"/>
-          </a:xfrm>
-          <a:prstGeom prst="rect">
-            <a:avLst/>
-          </a:prstGeom>
-        </p:spPr>
-      </p:pic>
-      <p:pic>
-        <p:nvPicPr>
-          <p:cNvPr id="6" name="Picture 5"/>
-          <p:cNvPicPr>
-            <a:picLocks noChangeAspect="1"/>
-          </p:cNvPicPr>
-          <p:nvPr/>
-        </p:nvPicPr>
-        <p:blipFill>
-          <a:blip r:embed="rId6">
-            <a:duotone>
-              <a:prstClr val="black"/>
-              <a:schemeClr val="accent2">
-                <a:tint val="45000"/>
-                <a:satMod val="400000"/>
-              </a:schemeClr>
-            </a:duotone>
-            <a:extLst>
-              <a:ext uri="{28A0092B-C50C-407E-A947-70E740481C1C}">
-                <a14:useLocalDpi xmlns:a14="http://schemas.microsoft.com/office/drawing/2010/main" val="0"/>
-              </a:ext>
-            </a:extLst>
-          </a:blip>
-          <a:stretch>
-            <a:fillRect/>
-          </a:stretch>
-        </p:blipFill>
-        <p:spPr>
-          <a:xfrm>
-            <a:off x="3425825" y="1007533"/>
-            <a:ext cx="609600" cy="406400"/>
-          </a:xfrm>
-          <a:prstGeom prst="rect">
-            <a:avLst/>
-          </a:prstGeom>
-        </p:spPr>
-      </p:pic>
-      <p:pic>
-        <p:nvPicPr>
-          <p:cNvPr id="7" name="Picture 6"/>
-          <p:cNvPicPr>
-            <a:picLocks noChangeAspect="1"/>
-          </p:cNvPicPr>
-          <p:nvPr/>
-        </p:nvPicPr>
-        <p:blipFill>
-          <a:blip r:embed="rId7">
-            <a:duotone>
-              <a:prstClr val="black"/>
-              <a:schemeClr val="accent6">
-                <a:tint val="45000"/>
-                <a:satMod val="400000"/>
-              </a:schemeClr>
-            </a:duotone>
-            <a:extLst>
-              <a:ext uri="{28A0092B-C50C-407E-A947-70E740481C1C}">
-                <a14:useLocalDpi xmlns:a14="http://schemas.microsoft.com/office/drawing/2010/main" val="0"/>
-              </a:ext>
-            </a:extLst>
-          </a:blip>
-          <a:stretch>
-            <a:fillRect/>
-          </a:stretch>
-        </p:blipFill>
-        <p:spPr>
-          <a:xfrm>
-            <a:off x="741362" y="1913467"/>
-            <a:ext cx="304800" cy="203200"/>
-          </a:xfrm>
-          <a:prstGeom prst="rect">
-            <a:avLst/>
-          </a:prstGeom>
-        </p:spPr>
-      </p:pic>
-      <p:pic>
-        <p:nvPicPr>
-          <p:cNvPr id="8" name="Picture 7"/>
-          <p:cNvPicPr>
-            <a:picLocks noChangeAspect="1"/>
-          </p:cNvPicPr>
-          <p:nvPr/>
-        </p:nvPicPr>
-        <p:blipFill>
-          <a:blip r:embed="rId8">
-            <a:duotone>
-              <a:prstClr val="black"/>
-              <a:schemeClr val="accent6">
-                <a:tint val="45000"/>
-                <a:satMod val="400000"/>
-              </a:schemeClr>
-            </a:duotone>
-            <a:extLst>
-              <a:ext uri="{28A0092B-C50C-407E-A947-70E740481C1C}">
-                <a14:useLocalDpi xmlns:a14="http://schemas.microsoft.com/office/drawing/2010/main" val="0"/>
-              </a:ext>
-            </a:extLst>
-          </a:blip>
-          <a:stretch>
-            <a:fillRect/>
-          </a:stretch>
-        </p:blipFill>
-        <p:spPr>
-          <a:xfrm>
-            <a:off x="1534583" y="1710267"/>
-            <a:ext cx="609600" cy="406400"/>
-          </a:xfrm>
-          <a:prstGeom prst="rect">
-            <a:avLst/>
-          </a:prstGeom>
-        </p:spPr>
-      </p:pic>
-      <p:pic>
-        <p:nvPicPr>
-          <p:cNvPr id="9" name="Picture 8"/>
-          <p:cNvPicPr>
-            <a:picLocks noChangeAspect="1"/>
-          </p:cNvPicPr>
-          <p:nvPr/>
-        </p:nvPicPr>
-        <p:blipFill>
-          <a:blip r:embed="rId9">
-            <a:duotone>
-              <a:prstClr val="black"/>
-              <a:schemeClr val="accent6">
-                <a:tint val="45000"/>
-                <a:satMod val="400000"/>
-              </a:schemeClr>
-            </a:duotone>
-            <a:extLst>
-              <a:ext uri="{28A0092B-C50C-407E-A947-70E740481C1C}">
-                <a14:useLocalDpi xmlns:a14="http://schemas.microsoft.com/office/drawing/2010/main" val="0"/>
-              </a:ext>
-            </a:extLst>
-          </a:blip>
-          <a:stretch>
-            <a:fillRect/>
-          </a:stretch>
-        </p:blipFill>
-        <p:spPr>
-          <a:xfrm>
-            <a:off x="2632604" y="1913467"/>
-            <a:ext cx="304800" cy="203200"/>
-          </a:xfrm>
-          <a:prstGeom prst="rect">
-            <a:avLst/>
-          </a:prstGeom>
-        </p:spPr>
-      </p:pic>
-      <p:pic>
-        <p:nvPicPr>
-          <p:cNvPr id="10" name="Picture 9"/>
-          <p:cNvPicPr>
-            <a:picLocks noChangeAspect="1"/>
-          </p:cNvPicPr>
-          <p:nvPr/>
-        </p:nvPicPr>
-        <p:blipFill>
-          <a:blip r:embed="rId10">
-            <a:duotone>
-              <a:prstClr val="black"/>
-              <a:schemeClr val="accent6">
-                <a:tint val="45000"/>
-                <a:satMod val="400000"/>
-              </a:schemeClr>
-            </a:duotone>
-            <a:extLst>
-              <a:ext uri="{28A0092B-C50C-407E-A947-70E740481C1C}">
-                <a14:useLocalDpi xmlns:a14="http://schemas.microsoft.com/office/drawing/2010/main" val="0"/>
-              </a:ext>
-            </a:extLst>
-          </a:blip>
-          <a:stretch>
-            <a:fillRect/>
-          </a:stretch>
-        </p:blipFill>
-        <p:spPr>
-          <a:xfrm>
-            <a:off x="3425825" y="1710267"/>
-            <a:ext cx="609600" cy="406400"/>
-          </a:xfrm>
-          <a:prstGeom prst="rect">
-            <a:avLst/>
-          </a:prstGeom>
-        </p:spPr>
-      </p:pic>
-      <p:pic>
-        <p:nvPicPr>
-          <p:cNvPr id="11" name="Picture 10"/>
-          <p:cNvPicPr>
-            <a:picLocks noChangeAspect="1"/>
-          </p:cNvPicPr>
-          <p:nvPr/>
-        </p:nvPicPr>
-        <p:blipFill>
-          <a:blip r:embed="rId11">
-            <a:duotone>
-              <a:prstClr val="black"/>
-              <a:schemeClr val="accent5">
-                <a:tint val="45000"/>
-                <a:satMod val="400000"/>
-              </a:schemeClr>
-            </a:duotone>
-            <a:extLst>
-              <a:ext uri="{28A0092B-C50C-407E-A947-70E740481C1C}">
-                <a14:useLocalDpi xmlns:a14="http://schemas.microsoft.com/office/drawing/2010/main" val="0"/>
-              </a:ext>
-            </a:extLst>
-          </a:blip>
-          <a:stretch>
-            <a:fillRect/>
-          </a:stretch>
-        </p:blipFill>
-        <p:spPr>
-          <a:xfrm>
-            <a:off x="741362" y="2616201"/>
-            <a:ext cx="304800" cy="203200"/>
-          </a:xfrm>
-          <a:prstGeom prst="rect">
-            <a:avLst/>
-          </a:prstGeom>
-        </p:spPr>
-      </p:pic>
-      <p:pic>
-        <p:nvPicPr>
-          <p:cNvPr id="12" name="Picture 11"/>
-          <p:cNvPicPr>
-            <a:picLocks noChangeAspect="1"/>
-          </p:cNvPicPr>
-          <p:nvPr/>
-        </p:nvPicPr>
-        <p:blipFill>
-          <a:blip r:embed="rId12">
-            <a:duotone>
-              <a:prstClr val="black"/>
-              <a:schemeClr val="accent5">
-                <a:tint val="45000"/>
-                <a:satMod val="400000"/>
-              </a:schemeClr>
-            </a:duotone>
-            <a:extLst>
-              <a:ext uri="{28A0092B-C50C-407E-A947-70E740481C1C}">
-                <a14:useLocalDpi xmlns:a14="http://schemas.microsoft.com/office/drawing/2010/main" val="0"/>
-              </a:ext>
-            </a:extLst>
-          </a:blip>
-          <a:stretch>
-            <a:fillRect/>
-          </a:stretch>
-        </p:blipFill>
-        <p:spPr>
-          <a:xfrm>
-            <a:off x="1534583" y="2413001"/>
-            <a:ext cx="609600" cy="406400"/>
-          </a:xfrm>
-          <a:prstGeom prst="rect">
-            <a:avLst/>
-          </a:prstGeom>
-        </p:spPr>
-      </p:pic>
-      <p:pic>
-        <p:nvPicPr>
-          <p:cNvPr id="13" name="Picture 12"/>
-          <p:cNvPicPr>
-            <a:picLocks noChangeAspect="1"/>
-          </p:cNvPicPr>
-          <p:nvPr/>
-        </p:nvPicPr>
-        <p:blipFill>
-          <a:blip r:embed="rId13">
-            <a:duotone>
-              <a:prstClr val="black"/>
-              <a:schemeClr val="accent5">
-                <a:tint val="45000"/>
-                <a:satMod val="400000"/>
-              </a:schemeClr>
-            </a:duotone>
-            <a:extLst>
-              <a:ext uri="{28A0092B-C50C-407E-A947-70E740481C1C}">
-                <a14:useLocalDpi xmlns:a14="http://schemas.microsoft.com/office/drawing/2010/main" val="0"/>
-              </a:ext>
-            </a:extLst>
-          </a:blip>
-          <a:stretch>
-            <a:fillRect/>
-          </a:stretch>
-        </p:blipFill>
-        <p:spPr>
-          <a:xfrm>
-            <a:off x="2632604" y="2616201"/>
-            <a:ext cx="304800" cy="203200"/>
-          </a:xfrm>
-          <a:prstGeom prst="rect">
-            <a:avLst/>
-          </a:prstGeom>
-        </p:spPr>
-      </p:pic>
-      <p:pic>
-        <p:nvPicPr>
-          <p:cNvPr id="14" name="Picture 13"/>
-          <p:cNvPicPr>
-            <a:picLocks noChangeAspect="1"/>
-          </p:cNvPicPr>
-          <p:nvPr/>
-        </p:nvPicPr>
-        <p:blipFill>
-          <a:blip r:embed="rId14">
-            <a:duotone>
-              <a:prstClr val="black"/>
-              <a:schemeClr val="accent5">
-                <a:tint val="45000"/>
-                <a:satMod val="400000"/>
-              </a:schemeClr>
-            </a:duotone>
-            <a:extLst>
-              <a:ext uri="{28A0092B-C50C-407E-A947-70E740481C1C}">
-                <a14:useLocalDpi xmlns:a14="http://schemas.microsoft.com/office/drawing/2010/main" val="0"/>
-              </a:ext>
-            </a:extLst>
-          </a:blip>
-          <a:stretch>
-            <a:fillRect/>
-          </a:stretch>
-        </p:blipFill>
-        <p:spPr>
-          <a:xfrm>
-            <a:off x="3425825" y="2413001"/>
-            <a:ext cx="609600" cy="406400"/>
-          </a:xfrm>
-          <a:prstGeom prst="rect">
-            <a:avLst/>
-          </a:prstGeom>
-        </p:spPr>
-      </p:pic>
-      <p:pic>
-        <p:nvPicPr>
-          <p:cNvPr id="15" name="Picture 14"/>
-          <p:cNvPicPr>
-            <a:picLocks noChangeAspect="1"/>
-          </p:cNvPicPr>
-          <p:nvPr/>
-        </p:nvPicPr>
-        <p:blipFill>
-          <a:blip r:embed="rId15">
-            <a:duotone>
-              <a:prstClr val="black"/>
-              <a:schemeClr val="accent1">
-                <a:tint val="45000"/>
-                <a:satMod val="400000"/>
-              </a:schemeClr>
-            </a:duotone>
-            <a:extLst>
-              <a:ext uri="{28A0092B-C50C-407E-A947-70E740481C1C}">
-                <a14:useLocalDpi xmlns:a14="http://schemas.microsoft.com/office/drawing/2010/main" val="0"/>
-              </a:ext>
-            </a:extLst>
-          </a:blip>
-          <a:stretch>
-            <a:fillRect/>
-          </a:stretch>
-        </p:blipFill>
-        <p:spPr>
-          <a:xfrm>
-            <a:off x="703262" y="3632200"/>
-            <a:ext cx="381000" cy="203200"/>
-          </a:xfrm>
-          <a:prstGeom prst="rect">
-            <a:avLst/>
-          </a:prstGeom>
-        </p:spPr>
-      </p:pic>
-      <p:pic>
-        <p:nvPicPr>
-          <p:cNvPr id="16" name="Picture 15"/>
-          <p:cNvPicPr>
-            <a:picLocks noChangeAspect="1"/>
-          </p:cNvPicPr>
-          <p:nvPr/>
-        </p:nvPicPr>
-        <p:blipFill>
-          <a:blip r:embed="rId16">
-            <a:duotone>
-              <a:prstClr val="black"/>
-              <a:schemeClr val="accent1">
-                <a:tint val="45000"/>
-                <a:satMod val="400000"/>
-              </a:schemeClr>
-            </a:duotone>
-            <a:extLst>
-              <a:ext uri="{28A0092B-C50C-407E-A947-70E740481C1C}">
-                <a14:useLocalDpi xmlns:a14="http://schemas.microsoft.com/office/drawing/2010/main" val="0"/>
-              </a:ext>
-            </a:extLst>
-          </a:blip>
-          <a:stretch>
-            <a:fillRect/>
-          </a:stretch>
-        </p:blipFill>
-        <p:spPr>
-          <a:xfrm>
-            <a:off x="1458383" y="3429000"/>
-            <a:ext cx="762000" cy="406400"/>
-          </a:xfrm>
-          <a:prstGeom prst="rect">
-            <a:avLst/>
-          </a:prstGeom>
-        </p:spPr>
-      </p:pic>
-      <p:pic>
-        <p:nvPicPr>
-          <p:cNvPr id="17" name="Picture 16"/>
-          <p:cNvPicPr>
-            <a:picLocks noChangeAspect="1"/>
-          </p:cNvPicPr>
-          <p:nvPr/>
-        </p:nvPicPr>
-        <p:blipFill>
-          <a:blip r:embed="rId17">
-            <a:extLst>
-              <a:ext uri="{28A0092B-C50C-407E-A947-70E740481C1C}">
-                <a14:useLocalDpi xmlns:a14="http://schemas.microsoft.com/office/drawing/2010/main" val="0"/>
-              </a:ext>
-            </a:extLst>
-          </a:blip>
-          <a:stretch>
-            <a:fillRect/>
-          </a:stretch>
-        </p:blipFill>
-        <p:spPr>
-          <a:xfrm>
-            <a:off x="10820400" y="5448300"/>
-            <a:ext cx="1054100" cy="1054100"/>
-          </a:xfrm>
-          <a:prstGeom prst="rect">
-            <a:avLst/>
-          </a:prstGeom>
-        </p:spPr>
-      </p:pic>
-      <p:pic>
-        <p:nvPicPr>
-          <p:cNvPr id="18" name="Picture 17"/>
-          <p:cNvPicPr>
-            <a:picLocks noChangeAspect="1"/>
-          </p:cNvPicPr>
-          <p:nvPr/>
-        </p:nvPicPr>
-        <p:blipFill>
-          <a:blip r:embed="rId18">
-            <a:extLst>
-              <a:ext uri="{28A0092B-C50C-407E-A947-70E740481C1C}">
-                <a14:useLocalDpi xmlns:a14="http://schemas.microsoft.com/office/drawing/2010/main" val="0"/>
-              </a:ext>
-            </a:extLst>
-          </a:blip>
-          <a:stretch>
-            <a:fillRect/>
-          </a:stretch>
-        </p:blipFill>
-        <p:spPr>
-          <a:xfrm>
-            <a:off x="9683750" y="5448300"/>
-            <a:ext cx="1054100" cy="1054100"/>
-          </a:xfrm>
-          <a:prstGeom prst="rect">
-            <a:avLst/>
-          </a:prstGeom>
-        </p:spPr>
-      </p:pic>
-      <p:pic>
-        <p:nvPicPr>
-          <p:cNvPr id="19" name="Picture 18"/>
-          <p:cNvPicPr>
-            <a:picLocks noChangeAspect="1"/>
-          </p:cNvPicPr>
-          <p:nvPr/>
-        </p:nvPicPr>
-        <p:blipFill>
-          <a:blip r:embed="rId19">
-            <a:extLst>
-              <a:ext uri="{28A0092B-C50C-407E-A947-70E740481C1C}">
-                <a14:useLocalDpi xmlns:a14="http://schemas.microsoft.com/office/drawing/2010/main" val="0"/>
-              </a:ext>
-            </a:extLst>
-          </a:blip>
-          <a:stretch>
-            <a:fillRect/>
-          </a:stretch>
-        </p:blipFill>
-        <p:spPr>
-          <a:xfrm>
-            <a:off x="8293100" y="5448300"/>
-            <a:ext cx="1054100" cy="1054100"/>
-          </a:xfrm>
-          <a:prstGeom prst="rect">
-            <a:avLst/>
-          </a:prstGeom>
-        </p:spPr>
-      </p:pic>
-      <p:pic>
-        <p:nvPicPr>
-          <p:cNvPr id="20" name="Picture 19"/>
-          <p:cNvPicPr>
-            <a:picLocks noChangeAspect="1"/>
-          </p:cNvPicPr>
-          <p:nvPr/>
-        </p:nvPicPr>
-        <p:blipFill>
-          <a:blip r:embed="rId20">
-            <a:extLst>
-              <a:ext uri="{28A0092B-C50C-407E-A947-70E740481C1C}">
-                <a14:useLocalDpi xmlns:a14="http://schemas.microsoft.com/office/drawing/2010/main" val="0"/>
-              </a:ext>
-            </a:extLst>
-          </a:blip>
-          <a:stretch>
-            <a:fillRect/>
-          </a:stretch>
-        </p:blipFill>
-        <p:spPr>
-          <a:xfrm>
-            <a:off x="176212" y="5448300"/>
-            <a:ext cx="1054100" cy="1054100"/>
-          </a:xfrm>
-          <a:prstGeom prst="rect">
-            <a:avLst/>
-          </a:prstGeom>
-        </p:spPr>
-      </p:pic>
-      <p:pic>
-        <p:nvPicPr>
-          <p:cNvPr id="21" name="Picture 20"/>
-          <p:cNvPicPr>
-            <a:picLocks noChangeAspect="1"/>
-          </p:cNvPicPr>
-          <p:nvPr/>
-        </p:nvPicPr>
-        <p:blipFill>
-          <a:blip r:embed="rId21">
-            <a:extLst>
-              <a:ext uri="{28A0092B-C50C-407E-A947-70E740481C1C}">
-                <a14:useLocalDpi xmlns:a14="http://schemas.microsoft.com/office/drawing/2010/main" val="0"/>
-              </a:ext>
-            </a:extLst>
-          </a:blip>
-          <a:stretch>
-            <a:fillRect/>
-          </a:stretch>
-        </p:blipFill>
-        <p:spPr>
-          <a:xfrm>
-            <a:off x="8491770" y="304800"/>
-            <a:ext cx="1710859" cy="1536700"/>
-          </a:xfrm>
-          <a:prstGeom prst="rect">
-            <a:avLst/>
-          </a:prstGeom>
-        </p:spPr>
-      </p:pic>
-      <p:pic>
-        <p:nvPicPr>
-          <p:cNvPr id="22" name="Picture 21"/>
-          <p:cNvPicPr>
-            <a:picLocks noChangeAspect="1"/>
-          </p:cNvPicPr>
-          <p:nvPr/>
-        </p:nvPicPr>
-        <p:blipFill>
-          <a:blip r:embed="rId22">
-            <a:extLst>
-              <a:ext uri="{28A0092B-C50C-407E-A947-70E740481C1C}">
-                <a14:useLocalDpi xmlns:a14="http://schemas.microsoft.com/office/drawing/2010/main" val="0"/>
-              </a:ext>
-            </a:extLst>
-          </a:blip>
-          <a:stretch>
-            <a:fillRect/>
-          </a:stretch>
-        </p:blipFill>
-        <p:spPr>
-          <a:xfrm>
-            <a:off x="6311900" y="300566"/>
-            <a:ext cx="1981200" cy="1555593"/>
-          </a:xfrm>
-          <a:prstGeom prst="rect">
-            <a:avLst/>
-          </a:prstGeom>
-        </p:spPr>
-      </p:pic>
-      <p:pic>
-        <p:nvPicPr>
-          <p:cNvPr id="23" name="Picture 22"/>
-          <p:cNvPicPr>
-            <a:picLocks noChangeAspect="1"/>
-          </p:cNvPicPr>
-          <p:nvPr/>
-        </p:nvPicPr>
-        <p:blipFill>
-          <a:blip r:embed="rId23">
-            <a:extLst>
-              <a:ext uri="{28A0092B-C50C-407E-A947-70E740481C1C}">
-                <a14:useLocalDpi xmlns:a14="http://schemas.microsoft.com/office/drawing/2010/main" val="0"/>
-              </a:ext>
-            </a:extLst>
-          </a:blip>
-          <a:stretch>
-            <a:fillRect/>
-          </a:stretch>
-        </p:blipFill>
-        <p:spPr>
-          <a:xfrm>
-            <a:off x="10308787" y="304800"/>
-            <a:ext cx="1536700" cy="1536700"/>
-          </a:xfrm>
-          <a:prstGeom prst="rect">
-            <a:avLst/>
-          </a:prstGeom>
-        </p:spPr>
-      </p:pic>
-      <p:pic>
-        <p:nvPicPr>
-          <p:cNvPr id="24" name="Picture 23"/>
-          <p:cNvPicPr>
-            <a:picLocks noChangeAspect="1"/>
-          </p:cNvPicPr>
-          <p:nvPr/>
-        </p:nvPicPr>
-        <p:blipFill>
-          <a:blip r:embed="rId24">
-            <a:duotone>
-              <a:schemeClr val="accent5">
-                <a:shade val="45000"/>
-                <a:satMod val="135000"/>
-              </a:schemeClr>
-              <a:prstClr val="white"/>
-            </a:duotone>
-            <a:extLst>
-              <a:ext uri="{28A0092B-C50C-407E-A947-70E740481C1C}">
-                <a14:useLocalDpi xmlns:a14="http://schemas.microsoft.com/office/drawing/2010/main" val="0"/>
-              </a:ext>
-            </a:extLst>
-          </a:blip>
-          <a:stretch>
-            <a:fillRect/>
-          </a:stretch>
-        </p:blipFill>
-        <p:spPr>
-          <a:xfrm>
-            <a:off x="5383976" y="5448299"/>
-            <a:ext cx="1118755" cy="1079501"/>
-          </a:xfrm>
-          <a:prstGeom prst="rect">
-            <a:avLst/>
-          </a:prstGeom>
-        </p:spPr>
-      </p:pic>
-      <p:pic>
-        <p:nvPicPr>
-          <p:cNvPr id="25" name="Picture 24"/>
-          <p:cNvPicPr>
-            <a:picLocks noChangeAspect="1"/>
-          </p:cNvPicPr>
-          <p:nvPr/>
-        </p:nvPicPr>
-        <p:blipFill>
-          <a:blip r:embed="rId25">
-            <a:duotone>
-              <a:schemeClr val="accent5">
-                <a:shade val="45000"/>
-                <a:satMod val="135000"/>
-              </a:schemeClr>
-              <a:prstClr val="white"/>
-            </a:duotone>
-            <a:extLst>
-              <a:ext uri="{28A0092B-C50C-407E-A947-70E740481C1C}">
-                <a14:useLocalDpi xmlns:a14="http://schemas.microsoft.com/office/drawing/2010/main" val="0"/>
-              </a:ext>
-            </a:extLst>
-          </a:blip>
-          <a:stretch>
-            <a:fillRect/>
-          </a:stretch>
-        </p:blipFill>
-        <p:spPr>
-          <a:xfrm>
-            <a:off x="7007706" y="5448299"/>
-            <a:ext cx="780419" cy="1079501"/>
-          </a:xfrm>
-          <a:prstGeom prst="rect">
-            <a:avLst/>
-          </a:prstGeom>
-        </p:spPr>
-      </p:pic>
-      <p:pic>
-        <p:nvPicPr>
-          <p:cNvPr id="26" name="Picture 25"/>
-          <p:cNvPicPr>
-            <a:picLocks noChangeAspect="1"/>
-          </p:cNvPicPr>
-          <p:nvPr/>
-        </p:nvPicPr>
-        <p:blipFill>
-          <a:blip r:embed="rId26">
-            <a:duotone>
-              <a:schemeClr val="accent5">
-                <a:shade val="45000"/>
-                <a:satMod val="135000"/>
-              </a:schemeClr>
-              <a:prstClr val="white"/>
-            </a:duotone>
-            <a:extLst>
-              <a:ext uri="{28A0092B-C50C-407E-A947-70E740481C1C}">
-                <a14:useLocalDpi xmlns:a14="http://schemas.microsoft.com/office/drawing/2010/main" val="0"/>
-              </a:ext>
-            </a:extLst>
-          </a:blip>
-          <a:stretch>
-            <a:fillRect/>
-          </a:stretch>
-        </p:blipFill>
-        <p:spPr>
-          <a:xfrm>
-            <a:off x="8737071" y="2463800"/>
-            <a:ext cx="1665130" cy="1930400"/>
-          </a:xfrm>
-          <a:prstGeom prst="rect">
-            <a:avLst/>
-          </a:prstGeom>
-        </p:spPr>
-      </p:pic>
-    </p:spTree>
-    <p:extLst>
-      <p:ext uri="{BB962C8B-B14F-4D97-AF65-F5344CB8AC3E}">
-        <p14:creationId xmlns:p14="http://schemas.microsoft.com/office/powerpoint/2010/main" val="213951777"/>
-      </p:ext>
-    </p:extLst>
-  </p:cSld>
-  <p:clrMapOvr>
-    <a:masterClrMapping/>
-  </p:clrMapOvr>
-  <p:timing>
-    <p:tnLst>
-      <p:par>
-        <p:cTn id="1" dur="indefinite" restart="never" nodeType="tmRoot"/>
-      </p:par>
-    </p:tnLst>
-  </p:timing>
-</p:sld>
-</file>
-
-<file path=ppt/slides/slide2.xml><?xml version="1.0" encoding="utf-8"?>
-<p:sld xmlns:a="http://schemas.openxmlformats.org/drawingml/2006/main" xmlns:r="http://schemas.openxmlformats.org/officeDocument/2006/relationships" xmlns:p="http://schemas.openxmlformats.org/presentationml/2006/main">
-  <p:cSld>
     <p:spTree>
       <p:nvGrpSpPr>
         <p:cNvPr id="1" name=""/>
@@ -4124,6 +3213,1400 @@
     <p:extLst>
       <p:ext uri="{BB962C8B-B14F-4D97-AF65-F5344CB8AC3E}">
         <p14:creationId xmlns:p14="http://schemas.microsoft.com/office/powerpoint/2010/main" val="547642128"/>
+      </p:ext>
+    </p:extLst>
+  </p:cSld>
+  <p:clrMapOvr>
+    <a:masterClrMapping/>
+  </p:clrMapOvr>
+  <p:timing>
+    <p:tnLst>
+      <p:par>
+        <p:cTn id="1" dur="indefinite" restart="never" nodeType="tmRoot"/>
+      </p:par>
+    </p:tnLst>
+  </p:timing>
+</p:sld>
+</file>
+
+<file path=ppt/slides/slide2.xml><?xml version="1.0" encoding="utf-8"?>
+<p:sld xmlns:a="http://schemas.openxmlformats.org/drawingml/2006/main" xmlns:r="http://schemas.openxmlformats.org/officeDocument/2006/relationships" xmlns:p="http://schemas.openxmlformats.org/presentationml/2006/main">
+  <p:cSld>
+    <p:bg>
+      <p:bgPr>
+        <a:solidFill>
+          <a:schemeClr val="tx1"/>
+        </a:solidFill>
+        <a:effectLst/>
+      </p:bgPr>
+    </p:bg>
+    <p:spTree>
+      <p:nvGrpSpPr>
+        <p:cNvPr id="1" name=""/>
+        <p:cNvGrpSpPr/>
+        <p:nvPr/>
+      </p:nvGrpSpPr>
+      <p:grpSpPr>
+        <a:xfrm>
+          <a:off x="0" y="0"/>
+          <a:ext cx="0" cy="0"/>
+          <a:chOff x="0" y="0"/>
+          <a:chExt cx="0" cy="0"/>
+        </a:xfrm>
+      </p:grpSpPr>
+      <p:pic>
+        <p:nvPicPr>
+          <p:cNvPr id="4" name="Picture 3"/>
+          <p:cNvPicPr>
+            <a:picLocks noChangeAspect="1"/>
+          </p:cNvPicPr>
+          <p:nvPr/>
+        </p:nvPicPr>
+        <p:blipFill>
+          <a:blip r:embed="rId2">
+            <a:extLst>
+              <a:ext uri="{28A0092B-C50C-407E-A947-70E740481C1C}">
+                <a14:useLocalDpi xmlns:a14="http://schemas.microsoft.com/office/drawing/2010/main" val="0"/>
+              </a:ext>
+            </a:extLst>
+          </a:blip>
+          <a:stretch>
+            <a:fillRect/>
+          </a:stretch>
+        </p:blipFill>
+        <p:spPr>
+          <a:xfrm>
+            <a:off x="5181600" y="2429934"/>
+            <a:ext cx="1828800" cy="1828800"/>
+          </a:xfrm>
+          <a:prstGeom prst="rect">
+            <a:avLst/>
+          </a:prstGeom>
+        </p:spPr>
+      </p:pic>
+      <p:pic>
+        <p:nvPicPr>
+          <p:cNvPr id="2" name="Picture 1"/>
+          <p:cNvPicPr>
+            <a:picLocks noChangeAspect="1"/>
+          </p:cNvPicPr>
+          <p:nvPr/>
+        </p:nvPicPr>
+        <p:blipFill>
+          <a:blip r:embed="rId3">
+            <a:duotone>
+              <a:prstClr val="black"/>
+              <a:schemeClr val="accent2">
+                <a:tint val="45000"/>
+                <a:satMod val="400000"/>
+              </a:schemeClr>
+            </a:duotone>
+            <a:extLst>
+              <a:ext uri="{28A0092B-C50C-407E-A947-70E740481C1C}">
+                <a14:useLocalDpi xmlns:a14="http://schemas.microsoft.com/office/drawing/2010/main" val="0"/>
+              </a:ext>
+            </a:extLst>
+          </a:blip>
+          <a:stretch>
+            <a:fillRect/>
+          </a:stretch>
+        </p:blipFill>
+        <p:spPr>
+          <a:xfrm>
+            <a:off x="741362" y="1210733"/>
+            <a:ext cx="304800" cy="203200"/>
+          </a:xfrm>
+          <a:prstGeom prst="rect">
+            <a:avLst/>
+          </a:prstGeom>
+        </p:spPr>
+      </p:pic>
+      <p:pic>
+        <p:nvPicPr>
+          <p:cNvPr id="3" name="Picture 2"/>
+          <p:cNvPicPr>
+            <a:picLocks noChangeAspect="1"/>
+          </p:cNvPicPr>
+          <p:nvPr/>
+        </p:nvPicPr>
+        <p:blipFill>
+          <a:blip r:embed="rId4">
+            <a:duotone>
+              <a:prstClr val="black"/>
+              <a:schemeClr val="accent2">
+                <a:tint val="45000"/>
+                <a:satMod val="400000"/>
+              </a:schemeClr>
+            </a:duotone>
+            <a:extLst>
+              <a:ext uri="{28A0092B-C50C-407E-A947-70E740481C1C}">
+                <a14:useLocalDpi xmlns:a14="http://schemas.microsoft.com/office/drawing/2010/main" val="0"/>
+              </a:ext>
+            </a:extLst>
+          </a:blip>
+          <a:stretch>
+            <a:fillRect/>
+          </a:stretch>
+        </p:blipFill>
+        <p:spPr>
+          <a:xfrm>
+            <a:off x="1534583" y="1007533"/>
+            <a:ext cx="609600" cy="406400"/>
+          </a:xfrm>
+          <a:prstGeom prst="rect">
+            <a:avLst/>
+          </a:prstGeom>
+        </p:spPr>
+      </p:pic>
+      <p:pic>
+        <p:nvPicPr>
+          <p:cNvPr id="5" name="Picture 4"/>
+          <p:cNvPicPr>
+            <a:picLocks noChangeAspect="1"/>
+          </p:cNvPicPr>
+          <p:nvPr/>
+        </p:nvPicPr>
+        <p:blipFill>
+          <a:blip r:embed="rId5">
+            <a:duotone>
+              <a:prstClr val="black"/>
+              <a:schemeClr val="accent2">
+                <a:tint val="45000"/>
+                <a:satMod val="400000"/>
+              </a:schemeClr>
+            </a:duotone>
+            <a:extLst>
+              <a:ext uri="{28A0092B-C50C-407E-A947-70E740481C1C}">
+                <a14:useLocalDpi xmlns:a14="http://schemas.microsoft.com/office/drawing/2010/main" val="0"/>
+              </a:ext>
+            </a:extLst>
+          </a:blip>
+          <a:stretch>
+            <a:fillRect/>
+          </a:stretch>
+        </p:blipFill>
+        <p:spPr>
+          <a:xfrm>
+            <a:off x="2632604" y="1210733"/>
+            <a:ext cx="304800" cy="203200"/>
+          </a:xfrm>
+          <a:prstGeom prst="rect">
+            <a:avLst/>
+          </a:prstGeom>
+        </p:spPr>
+      </p:pic>
+      <p:pic>
+        <p:nvPicPr>
+          <p:cNvPr id="6" name="Picture 5"/>
+          <p:cNvPicPr>
+            <a:picLocks noChangeAspect="1"/>
+          </p:cNvPicPr>
+          <p:nvPr/>
+        </p:nvPicPr>
+        <p:blipFill>
+          <a:blip r:embed="rId6">
+            <a:duotone>
+              <a:prstClr val="black"/>
+              <a:schemeClr val="accent2">
+                <a:tint val="45000"/>
+                <a:satMod val="400000"/>
+              </a:schemeClr>
+            </a:duotone>
+            <a:extLst>
+              <a:ext uri="{28A0092B-C50C-407E-A947-70E740481C1C}">
+                <a14:useLocalDpi xmlns:a14="http://schemas.microsoft.com/office/drawing/2010/main" val="0"/>
+              </a:ext>
+            </a:extLst>
+          </a:blip>
+          <a:stretch>
+            <a:fillRect/>
+          </a:stretch>
+        </p:blipFill>
+        <p:spPr>
+          <a:xfrm>
+            <a:off x="3425825" y="1007533"/>
+            <a:ext cx="609600" cy="406400"/>
+          </a:xfrm>
+          <a:prstGeom prst="rect">
+            <a:avLst/>
+          </a:prstGeom>
+        </p:spPr>
+      </p:pic>
+      <p:pic>
+        <p:nvPicPr>
+          <p:cNvPr id="7" name="Picture 6"/>
+          <p:cNvPicPr>
+            <a:picLocks noChangeAspect="1"/>
+          </p:cNvPicPr>
+          <p:nvPr/>
+        </p:nvPicPr>
+        <p:blipFill>
+          <a:blip r:embed="rId7">
+            <a:duotone>
+              <a:prstClr val="black"/>
+              <a:schemeClr val="accent6">
+                <a:tint val="45000"/>
+                <a:satMod val="400000"/>
+              </a:schemeClr>
+            </a:duotone>
+            <a:extLst>
+              <a:ext uri="{28A0092B-C50C-407E-A947-70E740481C1C}">
+                <a14:useLocalDpi xmlns:a14="http://schemas.microsoft.com/office/drawing/2010/main" val="0"/>
+              </a:ext>
+            </a:extLst>
+          </a:blip>
+          <a:stretch>
+            <a:fillRect/>
+          </a:stretch>
+        </p:blipFill>
+        <p:spPr>
+          <a:xfrm>
+            <a:off x="741362" y="1913467"/>
+            <a:ext cx="304800" cy="203200"/>
+          </a:xfrm>
+          <a:prstGeom prst="rect">
+            <a:avLst/>
+          </a:prstGeom>
+        </p:spPr>
+      </p:pic>
+      <p:pic>
+        <p:nvPicPr>
+          <p:cNvPr id="8" name="Picture 7"/>
+          <p:cNvPicPr>
+            <a:picLocks noChangeAspect="1"/>
+          </p:cNvPicPr>
+          <p:nvPr/>
+        </p:nvPicPr>
+        <p:blipFill>
+          <a:blip r:embed="rId8">
+            <a:duotone>
+              <a:prstClr val="black"/>
+              <a:schemeClr val="accent6">
+                <a:tint val="45000"/>
+                <a:satMod val="400000"/>
+              </a:schemeClr>
+            </a:duotone>
+            <a:extLst>
+              <a:ext uri="{28A0092B-C50C-407E-A947-70E740481C1C}">
+                <a14:useLocalDpi xmlns:a14="http://schemas.microsoft.com/office/drawing/2010/main" val="0"/>
+              </a:ext>
+            </a:extLst>
+          </a:blip>
+          <a:stretch>
+            <a:fillRect/>
+          </a:stretch>
+        </p:blipFill>
+        <p:spPr>
+          <a:xfrm>
+            <a:off x="1534583" y="1710267"/>
+            <a:ext cx="609600" cy="406400"/>
+          </a:xfrm>
+          <a:prstGeom prst="rect">
+            <a:avLst/>
+          </a:prstGeom>
+        </p:spPr>
+      </p:pic>
+      <p:pic>
+        <p:nvPicPr>
+          <p:cNvPr id="9" name="Picture 8"/>
+          <p:cNvPicPr>
+            <a:picLocks noChangeAspect="1"/>
+          </p:cNvPicPr>
+          <p:nvPr/>
+        </p:nvPicPr>
+        <p:blipFill>
+          <a:blip r:embed="rId9">
+            <a:duotone>
+              <a:prstClr val="black"/>
+              <a:schemeClr val="accent6">
+                <a:tint val="45000"/>
+                <a:satMod val="400000"/>
+              </a:schemeClr>
+            </a:duotone>
+            <a:extLst>
+              <a:ext uri="{28A0092B-C50C-407E-A947-70E740481C1C}">
+                <a14:useLocalDpi xmlns:a14="http://schemas.microsoft.com/office/drawing/2010/main" val="0"/>
+              </a:ext>
+            </a:extLst>
+          </a:blip>
+          <a:stretch>
+            <a:fillRect/>
+          </a:stretch>
+        </p:blipFill>
+        <p:spPr>
+          <a:xfrm>
+            <a:off x="2632604" y="1913467"/>
+            <a:ext cx="304800" cy="203200"/>
+          </a:xfrm>
+          <a:prstGeom prst="rect">
+            <a:avLst/>
+          </a:prstGeom>
+        </p:spPr>
+      </p:pic>
+      <p:pic>
+        <p:nvPicPr>
+          <p:cNvPr id="10" name="Picture 9"/>
+          <p:cNvPicPr>
+            <a:picLocks noChangeAspect="1"/>
+          </p:cNvPicPr>
+          <p:nvPr/>
+        </p:nvPicPr>
+        <p:blipFill>
+          <a:blip r:embed="rId10">
+            <a:duotone>
+              <a:prstClr val="black"/>
+              <a:schemeClr val="accent6">
+                <a:tint val="45000"/>
+                <a:satMod val="400000"/>
+              </a:schemeClr>
+            </a:duotone>
+            <a:extLst>
+              <a:ext uri="{28A0092B-C50C-407E-A947-70E740481C1C}">
+                <a14:useLocalDpi xmlns:a14="http://schemas.microsoft.com/office/drawing/2010/main" val="0"/>
+              </a:ext>
+            </a:extLst>
+          </a:blip>
+          <a:stretch>
+            <a:fillRect/>
+          </a:stretch>
+        </p:blipFill>
+        <p:spPr>
+          <a:xfrm>
+            <a:off x="3425825" y="1710267"/>
+            <a:ext cx="609600" cy="406400"/>
+          </a:xfrm>
+          <a:prstGeom prst="rect">
+            <a:avLst/>
+          </a:prstGeom>
+        </p:spPr>
+      </p:pic>
+      <p:pic>
+        <p:nvPicPr>
+          <p:cNvPr id="11" name="Picture 10"/>
+          <p:cNvPicPr>
+            <a:picLocks noChangeAspect="1"/>
+          </p:cNvPicPr>
+          <p:nvPr/>
+        </p:nvPicPr>
+        <p:blipFill>
+          <a:blip r:embed="rId11">
+            <a:duotone>
+              <a:prstClr val="black"/>
+              <a:schemeClr val="accent5">
+                <a:tint val="45000"/>
+                <a:satMod val="400000"/>
+              </a:schemeClr>
+            </a:duotone>
+            <a:extLst>
+              <a:ext uri="{28A0092B-C50C-407E-A947-70E740481C1C}">
+                <a14:useLocalDpi xmlns:a14="http://schemas.microsoft.com/office/drawing/2010/main" val="0"/>
+              </a:ext>
+            </a:extLst>
+          </a:blip>
+          <a:stretch>
+            <a:fillRect/>
+          </a:stretch>
+        </p:blipFill>
+        <p:spPr>
+          <a:xfrm>
+            <a:off x="741362" y="2616201"/>
+            <a:ext cx="304800" cy="203200"/>
+          </a:xfrm>
+          <a:prstGeom prst="rect">
+            <a:avLst/>
+          </a:prstGeom>
+        </p:spPr>
+      </p:pic>
+      <p:pic>
+        <p:nvPicPr>
+          <p:cNvPr id="12" name="Picture 11"/>
+          <p:cNvPicPr>
+            <a:picLocks noChangeAspect="1"/>
+          </p:cNvPicPr>
+          <p:nvPr/>
+        </p:nvPicPr>
+        <p:blipFill>
+          <a:blip r:embed="rId12">
+            <a:duotone>
+              <a:prstClr val="black"/>
+              <a:schemeClr val="accent5">
+                <a:tint val="45000"/>
+                <a:satMod val="400000"/>
+              </a:schemeClr>
+            </a:duotone>
+            <a:extLst>
+              <a:ext uri="{28A0092B-C50C-407E-A947-70E740481C1C}">
+                <a14:useLocalDpi xmlns:a14="http://schemas.microsoft.com/office/drawing/2010/main" val="0"/>
+              </a:ext>
+            </a:extLst>
+          </a:blip>
+          <a:stretch>
+            <a:fillRect/>
+          </a:stretch>
+        </p:blipFill>
+        <p:spPr>
+          <a:xfrm>
+            <a:off x="1534583" y="2413001"/>
+            <a:ext cx="609600" cy="406400"/>
+          </a:xfrm>
+          <a:prstGeom prst="rect">
+            <a:avLst/>
+          </a:prstGeom>
+        </p:spPr>
+      </p:pic>
+      <p:pic>
+        <p:nvPicPr>
+          <p:cNvPr id="13" name="Picture 12"/>
+          <p:cNvPicPr>
+            <a:picLocks noChangeAspect="1"/>
+          </p:cNvPicPr>
+          <p:nvPr/>
+        </p:nvPicPr>
+        <p:blipFill>
+          <a:blip r:embed="rId13">
+            <a:duotone>
+              <a:prstClr val="black"/>
+              <a:schemeClr val="accent5">
+                <a:tint val="45000"/>
+                <a:satMod val="400000"/>
+              </a:schemeClr>
+            </a:duotone>
+            <a:extLst>
+              <a:ext uri="{28A0092B-C50C-407E-A947-70E740481C1C}">
+                <a14:useLocalDpi xmlns:a14="http://schemas.microsoft.com/office/drawing/2010/main" val="0"/>
+              </a:ext>
+            </a:extLst>
+          </a:blip>
+          <a:stretch>
+            <a:fillRect/>
+          </a:stretch>
+        </p:blipFill>
+        <p:spPr>
+          <a:xfrm>
+            <a:off x="2632604" y="2616201"/>
+            <a:ext cx="304800" cy="203200"/>
+          </a:xfrm>
+          <a:prstGeom prst="rect">
+            <a:avLst/>
+          </a:prstGeom>
+        </p:spPr>
+      </p:pic>
+      <p:pic>
+        <p:nvPicPr>
+          <p:cNvPr id="14" name="Picture 13"/>
+          <p:cNvPicPr>
+            <a:picLocks noChangeAspect="1"/>
+          </p:cNvPicPr>
+          <p:nvPr/>
+        </p:nvPicPr>
+        <p:blipFill>
+          <a:blip r:embed="rId14">
+            <a:duotone>
+              <a:prstClr val="black"/>
+              <a:schemeClr val="accent5">
+                <a:tint val="45000"/>
+                <a:satMod val="400000"/>
+              </a:schemeClr>
+            </a:duotone>
+            <a:extLst>
+              <a:ext uri="{28A0092B-C50C-407E-A947-70E740481C1C}">
+                <a14:useLocalDpi xmlns:a14="http://schemas.microsoft.com/office/drawing/2010/main" val="0"/>
+              </a:ext>
+            </a:extLst>
+          </a:blip>
+          <a:stretch>
+            <a:fillRect/>
+          </a:stretch>
+        </p:blipFill>
+        <p:spPr>
+          <a:xfrm>
+            <a:off x="3425825" y="2413001"/>
+            <a:ext cx="609600" cy="406400"/>
+          </a:xfrm>
+          <a:prstGeom prst="rect">
+            <a:avLst/>
+          </a:prstGeom>
+        </p:spPr>
+      </p:pic>
+      <p:pic>
+        <p:nvPicPr>
+          <p:cNvPr id="15" name="Picture 14"/>
+          <p:cNvPicPr>
+            <a:picLocks noChangeAspect="1"/>
+          </p:cNvPicPr>
+          <p:nvPr/>
+        </p:nvPicPr>
+        <p:blipFill>
+          <a:blip r:embed="rId15">
+            <a:duotone>
+              <a:prstClr val="black"/>
+              <a:schemeClr val="accent1">
+                <a:tint val="45000"/>
+                <a:satMod val="400000"/>
+              </a:schemeClr>
+            </a:duotone>
+            <a:extLst>
+              <a:ext uri="{28A0092B-C50C-407E-A947-70E740481C1C}">
+                <a14:useLocalDpi xmlns:a14="http://schemas.microsoft.com/office/drawing/2010/main" val="0"/>
+              </a:ext>
+            </a:extLst>
+          </a:blip>
+          <a:stretch>
+            <a:fillRect/>
+          </a:stretch>
+        </p:blipFill>
+        <p:spPr>
+          <a:xfrm>
+            <a:off x="703262" y="3632200"/>
+            <a:ext cx="381000" cy="203200"/>
+          </a:xfrm>
+          <a:prstGeom prst="rect">
+            <a:avLst/>
+          </a:prstGeom>
+        </p:spPr>
+      </p:pic>
+      <p:pic>
+        <p:nvPicPr>
+          <p:cNvPr id="16" name="Picture 15"/>
+          <p:cNvPicPr>
+            <a:picLocks noChangeAspect="1"/>
+          </p:cNvPicPr>
+          <p:nvPr/>
+        </p:nvPicPr>
+        <p:blipFill>
+          <a:blip r:embed="rId16">
+            <a:duotone>
+              <a:prstClr val="black"/>
+              <a:schemeClr val="accent1">
+                <a:tint val="45000"/>
+                <a:satMod val="400000"/>
+              </a:schemeClr>
+            </a:duotone>
+            <a:extLst>
+              <a:ext uri="{28A0092B-C50C-407E-A947-70E740481C1C}">
+                <a14:useLocalDpi xmlns:a14="http://schemas.microsoft.com/office/drawing/2010/main" val="0"/>
+              </a:ext>
+            </a:extLst>
+          </a:blip>
+          <a:stretch>
+            <a:fillRect/>
+          </a:stretch>
+        </p:blipFill>
+        <p:spPr>
+          <a:xfrm>
+            <a:off x="1458383" y="3429000"/>
+            <a:ext cx="762000" cy="406400"/>
+          </a:xfrm>
+          <a:prstGeom prst="rect">
+            <a:avLst/>
+          </a:prstGeom>
+        </p:spPr>
+      </p:pic>
+      <p:pic>
+        <p:nvPicPr>
+          <p:cNvPr id="17" name="Picture 16"/>
+          <p:cNvPicPr>
+            <a:picLocks noChangeAspect="1"/>
+          </p:cNvPicPr>
+          <p:nvPr/>
+        </p:nvPicPr>
+        <p:blipFill>
+          <a:blip r:embed="rId17">
+            <a:extLst>
+              <a:ext uri="{28A0092B-C50C-407E-A947-70E740481C1C}">
+                <a14:useLocalDpi xmlns:a14="http://schemas.microsoft.com/office/drawing/2010/main" val="0"/>
+              </a:ext>
+            </a:extLst>
+          </a:blip>
+          <a:stretch>
+            <a:fillRect/>
+          </a:stretch>
+        </p:blipFill>
+        <p:spPr>
+          <a:xfrm>
+            <a:off x="10820400" y="5448300"/>
+            <a:ext cx="1054100" cy="1054100"/>
+          </a:xfrm>
+          <a:prstGeom prst="rect">
+            <a:avLst/>
+          </a:prstGeom>
+        </p:spPr>
+      </p:pic>
+      <p:pic>
+        <p:nvPicPr>
+          <p:cNvPr id="18" name="Picture 17"/>
+          <p:cNvPicPr>
+            <a:picLocks noChangeAspect="1"/>
+          </p:cNvPicPr>
+          <p:nvPr/>
+        </p:nvPicPr>
+        <p:blipFill>
+          <a:blip r:embed="rId18">
+            <a:extLst>
+              <a:ext uri="{28A0092B-C50C-407E-A947-70E740481C1C}">
+                <a14:useLocalDpi xmlns:a14="http://schemas.microsoft.com/office/drawing/2010/main" val="0"/>
+              </a:ext>
+            </a:extLst>
+          </a:blip>
+          <a:stretch>
+            <a:fillRect/>
+          </a:stretch>
+        </p:blipFill>
+        <p:spPr>
+          <a:xfrm>
+            <a:off x="9683750" y="5448300"/>
+            <a:ext cx="1054100" cy="1054100"/>
+          </a:xfrm>
+          <a:prstGeom prst="rect">
+            <a:avLst/>
+          </a:prstGeom>
+        </p:spPr>
+      </p:pic>
+      <p:pic>
+        <p:nvPicPr>
+          <p:cNvPr id="19" name="Picture 18"/>
+          <p:cNvPicPr>
+            <a:picLocks noChangeAspect="1"/>
+          </p:cNvPicPr>
+          <p:nvPr/>
+        </p:nvPicPr>
+        <p:blipFill>
+          <a:blip r:embed="rId19">
+            <a:extLst>
+              <a:ext uri="{28A0092B-C50C-407E-A947-70E740481C1C}">
+                <a14:useLocalDpi xmlns:a14="http://schemas.microsoft.com/office/drawing/2010/main" val="0"/>
+              </a:ext>
+            </a:extLst>
+          </a:blip>
+          <a:stretch>
+            <a:fillRect/>
+          </a:stretch>
+        </p:blipFill>
+        <p:spPr>
+          <a:xfrm>
+            <a:off x="8293100" y="5448300"/>
+            <a:ext cx="1054100" cy="1054100"/>
+          </a:xfrm>
+          <a:prstGeom prst="rect">
+            <a:avLst/>
+          </a:prstGeom>
+        </p:spPr>
+      </p:pic>
+      <p:pic>
+        <p:nvPicPr>
+          <p:cNvPr id="20" name="Picture 19"/>
+          <p:cNvPicPr>
+            <a:picLocks noChangeAspect="1"/>
+          </p:cNvPicPr>
+          <p:nvPr/>
+        </p:nvPicPr>
+        <p:blipFill>
+          <a:blip r:embed="rId20">
+            <a:extLst>
+              <a:ext uri="{28A0092B-C50C-407E-A947-70E740481C1C}">
+                <a14:useLocalDpi xmlns:a14="http://schemas.microsoft.com/office/drawing/2010/main" val="0"/>
+              </a:ext>
+            </a:extLst>
+          </a:blip>
+          <a:stretch>
+            <a:fillRect/>
+          </a:stretch>
+        </p:blipFill>
+        <p:spPr>
+          <a:xfrm>
+            <a:off x="176212" y="5448300"/>
+            <a:ext cx="1054100" cy="1054100"/>
+          </a:xfrm>
+          <a:prstGeom prst="rect">
+            <a:avLst/>
+          </a:prstGeom>
+        </p:spPr>
+      </p:pic>
+      <p:pic>
+        <p:nvPicPr>
+          <p:cNvPr id="21" name="Picture 20"/>
+          <p:cNvPicPr>
+            <a:picLocks noChangeAspect="1"/>
+          </p:cNvPicPr>
+          <p:nvPr/>
+        </p:nvPicPr>
+        <p:blipFill>
+          <a:blip r:embed="rId21">
+            <a:extLst>
+              <a:ext uri="{28A0092B-C50C-407E-A947-70E740481C1C}">
+                <a14:useLocalDpi xmlns:a14="http://schemas.microsoft.com/office/drawing/2010/main" val="0"/>
+              </a:ext>
+            </a:extLst>
+          </a:blip>
+          <a:stretch>
+            <a:fillRect/>
+          </a:stretch>
+        </p:blipFill>
+        <p:spPr>
+          <a:xfrm>
+            <a:off x="8491770" y="304800"/>
+            <a:ext cx="1710859" cy="1536700"/>
+          </a:xfrm>
+          <a:prstGeom prst="rect">
+            <a:avLst/>
+          </a:prstGeom>
+        </p:spPr>
+      </p:pic>
+      <p:pic>
+        <p:nvPicPr>
+          <p:cNvPr id="22" name="Picture 21"/>
+          <p:cNvPicPr>
+            <a:picLocks noChangeAspect="1"/>
+          </p:cNvPicPr>
+          <p:nvPr/>
+        </p:nvPicPr>
+        <p:blipFill>
+          <a:blip r:embed="rId22">
+            <a:extLst>
+              <a:ext uri="{28A0092B-C50C-407E-A947-70E740481C1C}">
+                <a14:useLocalDpi xmlns:a14="http://schemas.microsoft.com/office/drawing/2010/main" val="0"/>
+              </a:ext>
+            </a:extLst>
+          </a:blip>
+          <a:stretch>
+            <a:fillRect/>
+          </a:stretch>
+        </p:blipFill>
+        <p:spPr>
+          <a:xfrm>
+            <a:off x="6311900" y="300566"/>
+            <a:ext cx="1981200" cy="1555593"/>
+          </a:xfrm>
+          <a:prstGeom prst="rect">
+            <a:avLst/>
+          </a:prstGeom>
+        </p:spPr>
+      </p:pic>
+      <p:pic>
+        <p:nvPicPr>
+          <p:cNvPr id="23" name="Picture 22"/>
+          <p:cNvPicPr>
+            <a:picLocks noChangeAspect="1"/>
+          </p:cNvPicPr>
+          <p:nvPr/>
+        </p:nvPicPr>
+        <p:blipFill>
+          <a:blip r:embed="rId23">
+            <a:extLst>
+              <a:ext uri="{28A0092B-C50C-407E-A947-70E740481C1C}">
+                <a14:useLocalDpi xmlns:a14="http://schemas.microsoft.com/office/drawing/2010/main" val="0"/>
+              </a:ext>
+            </a:extLst>
+          </a:blip>
+          <a:stretch>
+            <a:fillRect/>
+          </a:stretch>
+        </p:blipFill>
+        <p:spPr>
+          <a:xfrm>
+            <a:off x="10308787" y="304800"/>
+            <a:ext cx="1536700" cy="1536700"/>
+          </a:xfrm>
+          <a:prstGeom prst="rect">
+            <a:avLst/>
+          </a:prstGeom>
+        </p:spPr>
+      </p:pic>
+      <p:pic>
+        <p:nvPicPr>
+          <p:cNvPr id="24" name="Picture 23"/>
+          <p:cNvPicPr>
+            <a:picLocks noChangeAspect="1"/>
+          </p:cNvPicPr>
+          <p:nvPr/>
+        </p:nvPicPr>
+        <p:blipFill>
+          <a:blip r:embed="rId24">
+            <a:duotone>
+              <a:schemeClr val="accent5">
+                <a:shade val="45000"/>
+                <a:satMod val="135000"/>
+              </a:schemeClr>
+              <a:prstClr val="white"/>
+            </a:duotone>
+            <a:extLst>
+              <a:ext uri="{28A0092B-C50C-407E-A947-70E740481C1C}">
+                <a14:useLocalDpi xmlns:a14="http://schemas.microsoft.com/office/drawing/2010/main" val="0"/>
+              </a:ext>
+            </a:extLst>
+          </a:blip>
+          <a:stretch>
+            <a:fillRect/>
+          </a:stretch>
+        </p:blipFill>
+        <p:spPr>
+          <a:xfrm>
+            <a:off x="5383976" y="5448299"/>
+            <a:ext cx="1118755" cy="1079501"/>
+          </a:xfrm>
+          <a:prstGeom prst="rect">
+            <a:avLst/>
+          </a:prstGeom>
+        </p:spPr>
+      </p:pic>
+      <p:pic>
+        <p:nvPicPr>
+          <p:cNvPr id="25" name="Picture 24"/>
+          <p:cNvPicPr>
+            <a:picLocks noChangeAspect="1"/>
+          </p:cNvPicPr>
+          <p:nvPr/>
+        </p:nvPicPr>
+        <p:blipFill>
+          <a:blip r:embed="rId25">
+            <a:duotone>
+              <a:schemeClr val="accent5">
+                <a:shade val="45000"/>
+                <a:satMod val="135000"/>
+              </a:schemeClr>
+              <a:prstClr val="white"/>
+            </a:duotone>
+            <a:extLst>
+              <a:ext uri="{28A0092B-C50C-407E-A947-70E740481C1C}">
+                <a14:useLocalDpi xmlns:a14="http://schemas.microsoft.com/office/drawing/2010/main" val="0"/>
+              </a:ext>
+            </a:extLst>
+          </a:blip>
+          <a:stretch>
+            <a:fillRect/>
+          </a:stretch>
+        </p:blipFill>
+        <p:spPr>
+          <a:xfrm>
+            <a:off x="7007706" y="5448299"/>
+            <a:ext cx="780419" cy="1079501"/>
+          </a:xfrm>
+          <a:prstGeom prst="rect">
+            <a:avLst/>
+          </a:prstGeom>
+        </p:spPr>
+      </p:pic>
+      <p:pic>
+        <p:nvPicPr>
+          <p:cNvPr id="26" name="Picture 25"/>
+          <p:cNvPicPr>
+            <a:picLocks noChangeAspect="1"/>
+          </p:cNvPicPr>
+          <p:nvPr/>
+        </p:nvPicPr>
+        <p:blipFill>
+          <a:blip r:embed="rId26">
+            <a:duotone>
+              <a:schemeClr val="accent5">
+                <a:shade val="45000"/>
+                <a:satMod val="135000"/>
+              </a:schemeClr>
+              <a:prstClr val="white"/>
+            </a:duotone>
+            <a:extLst>
+              <a:ext uri="{28A0092B-C50C-407E-A947-70E740481C1C}">
+                <a14:useLocalDpi xmlns:a14="http://schemas.microsoft.com/office/drawing/2010/main" val="0"/>
+              </a:ext>
+            </a:extLst>
+          </a:blip>
+          <a:stretch>
+            <a:fillRect/>
+          </a:stretch>
+        </p:blipFill>
+        <p:spPr>
+          <a:xfrm>
+            <a:off x="8737071" y="2463800"/>
+            <a:ext cx="1665130" cy="1930400"/>
+          </a:xfrm>
+          <a:prstGeom prst="rect">
+            <a:avLst/>
+          </a:prstGeom>
+        </p:spPr>
+      </p:pic>
+    </p:spTree>
+    <p:extLst>
+      <p:ext uri="{BB962C8B-B14F-4D97-AF65-F5344CB8AC3E}">
+        <p14:creationId xmlns:p14="http://schemas.microsoft.com/office/powerpoint/2010/main" val="213951777"/>
+      </p:ext>
+    </p:extLst>
+  </p:cSld>
+  <p:clrMapOvr>
+    <a:masterClrMapping/>
+  </p:clrMapOvr>
+  <p:timing>
+    <p:tnLst>
+      <p:par>
+        <p:cTn id="1" dur="indefinite" restart="never" nodeType="tmRoot"/>
+      </p:par>
+    </p:tnLst>
+  </p:timing>
+</p:sld>
+</file>
+
+<file path=ppt/slides/slide3.xml><?xml version="1.0" encoding="utf-8"?>
+<p:sld xmlns:a="http://schemas.openxmlformats.org/drawingml/2006/main" xmlns:r="http://schemas.openxmlformats.org/officeDocument/2006/relationships" xmlns:p="http://schemas.openxmlformats.org/presentationml/2006/main">
+  <p:cSld>
+    <p:bg>
+      <p:bgPr>
+        <a:solidFill>
+          <a:schemeClr val="tx1"/>
+        </a:solidFill>
+        <a:effectLst/>
+      </p:bgPr>
+    </p:bg>
+    <p:spTree>
+      <p:nvGrpSpPr>
+        <p:cNvPr id="1" name=""/>
+        <p:cNvGrpSpPr/>
+        <p:nvPr/>
+      </p:nvGrpSpPr>
+      <p:grpSpPr>
+        <a:xfrm>
+          <a:off x="0" y="0"/>
+          <a:ext cx="0" cy="0"/>
+          <a:chOff x="0" y="0"/>
+          <a:chExt cx="0" cy="0"/>
+        </a:xfrm>
+      </p:grpSpPr>
+      <p:pic>
+        <p:nvPicPr>
+          <p:cNvPr id="2" name="Picture 1"/>
+          <p:cNvPicPr>
+            <a:picLocks noChangeAspect="1"/>
+          </p:cNvPicPr>
+          <p:nvPr/>
+        </p:nvPicPr>
+        <p:blipFill>
+          <a:blip r:embed="rId2">
+            <a:extLst>
+              <a:ext uri="{28A0092B-C50C-407E-A947-70E740481C1C}">
+                <a14:useLocalDpi xmlns:a14="http://schemas.microsoft.com/office/drawing/2010/main" val="0"/>
+              </a:ext>
+            </a:extLst>
+          </a:blip>
+          <a:stretch>
+            <a:fillRect/>
+          </a:stretch>
+        </p:blipFill>
+        <p:spPr>
+          <a:xfrm>
+            <a:off x="4191000" y="2743200"/>
+            <a:ext cx="3810000" cy="1371600"/>
+          </a:xfrm>
+          <a:prstGeom prst="rect">
+            <a:avLst/>
+          </a:prstGeom>
+        </p:spPr>
+      </p:pic>
+      <p:sp>
+        <p:nvSpPr>
+          <p:cNvPr id="3" name="Rounded Rectangle 2"/>
+          <p:cNvSpPr/>
+          <p:nvPr/>
+        </p:nvSpPr>
+        <p:spPr>
+          <a:xfrm>
+            <a:off x="4191000" y="2743200"/>
+            <a:ext cx="3810000" cy="1371600"/>
+          </a:xfrm>
+          <a:prstGeom prst="roundRect">
+            <a:avLst/>
+          </a:prstGeom>
+          <a:gradFill flip="none" rotWithShape="1">
+            <a:gsLst>
+              <a:gs pos="0">
+                <a:schemeClr val="accent1">
+                  <a:lumMod val="89000"/>
+                </a:schemeClr>
+              </a:gs>
+              <a:gs pos="23000">
+                <a:schemeClr val="accent1">
+                  <a:lumMod val="89000"/>
+                </a:schemeClr>
+              </a:gs>
+              <a:gs pos="69000">
+                <a:schemeClr val="accent1">
+                  <a:lumMod val="75000"/>
+                </a:schemeClr>
+              </a:gs>
+              <a:gs pos="97000">
+                <a:schemeClr val="accent1">
+                  <a:lumMod val="70000"/>
+                </a:schemeClr>
+              </a:gs>
+            </a:gsLst>
+            <a:path path="circle">
+              <a:fillToRect l="50000" t="50000" r="50000" b="50000"/>
+            </a:path>
+            <a:tileRect/>
+          </a:gradFill>
+          <a:ln w="63500">
+            <a:noFill/>
+          </a:ln>
+          <a:scene3d>
+            <a:camera prst="orthographicFront"/>
+            <a:lightRig rig="threePt" dir="t"/>
+          </a:scene3d>
+          <a:sp3d>
+            <a:bevelT w="114300" prst="artDeco"/>
+          </a:sp3d>
+        </p:spPr>
+        <p:style>
+          <a:lnRef idx="2">
+            <a:schemeClr val="accent1">
+              <a:shade val="50000"/>
+            </a:schemeClr>
+          </a:lnRef>
+          <a:fillRef idx="1">
+            <a:schemeClr val="accent1"/>
+          </a:fillRef>
+          <a:effectRef idx="0">
+            <a:schemeClr val="accent1"/>
+          </a:effectRef>
+          <a:fontRef idx="minor">
+            <a:schemeClr val="lt1"/>
+          </a:fontRef>
+        </p:style>
+        <p:txBody>
+          <a:bodyPr rtlCol="0" anchor="ctr"/>
+          <a:lstStyle/>
+          <a:p>
+            <a:pPr algn="ctr"/>
+            <a:endParaRPr lang="en-US"/>
+          </a:p>
+        </p:txBody>
+      </p:sp>
+    </p:spTree>
+    <p:extLst>
+      <p:ext uri="{BB962C8B-B14F-4D97-AF65-F5344CB8AC3E}">
+        <p14:creationId xmlns:p14="http://schemas.microsoft.com/office/powerpoint/2010/main" val="1916452006"/>
+      </p:ext>
+    </p:extLst>
+  </p:cSld>
+  <p:clrMapOvr>
+    <a:masterClrMapping/>
+  </p:clrMapOvr>
+  <p:timing>
+    <p:tnLst>
+      <p:par>
+        <p:cTn id="1" dur="indefinite" restart="never" nodeType="tmRoot"/>
+      </p:par>
+    </p:tnLst>
+  </p:timing>
+</p:sld>
+</file>
+
+<file path=ppt/slides/slide4.xml><?xml version="1.0" encoding="utf-8"?>
+<p:sld xmlns:a="http://schemas.openxmlformats.org/drawingml/2006/main" xmlns:r="http://schemas.openxmlformats.org/officeDocument/2006/relationships" xmlns:p="http://schemas.openxmlformats.org/presentationml/2006/main">
+  <p:cSld>
+    <p:bg>
+      <p:bgPr>
+        <a:solidFill>
+          <a:schemeClr val="tx1"/>
+        </a:solidFill>
+        <a:effectLst/>
+      </p:bgPr>
+    </p:bg>
+    <p:spTree>
+      <p:nvGrpSpPr>
+        <p:cNvPr id="1" name=""/>
+        <p:cNvGrpSpPr/>
+        <p:nvPr/>
+      </p:nvGrpSpPr>
+      <p:grpSpPr>
+        <a:xfrm>
+          <a:off x="0" y="0"/>
+          <a:ext cx="0" cy="0"/>
+          <a:chOff x="0" y="0"/>
+          <a:chExt cx="0" cy="0"/>
+        </a:xfrm>
+      </p:grpSpPr>
+      <p:sp>
+        <p:nvSpPr>
+          <p:cNvPr id="4" name="Rounded Rectangle 3"/>
+          <p:cNvSpPr/>
+          <p:nvPr/>
+        </p:nvSpPr>
+        <p:spPr>
+          <a:xfrm>
+            <a:off x="0" y="1638300"/>
+            <a:ext cx="12192000" cy="3568700"/>
+          </a:xfrm>
+          <a:prstGeom prst="roundRect">
+            <a:avLst/>
+          </a:prstGeom>
+          <a:gradFill flip="none" rotWithShape="1">
+            <a:gsLst>
+              <a:gs pos="0">
+                <a:schemeClr val="accent6">
+                  <a:lumMod val="89000"/>
+                </a:schemeClr>
+              </a:gs>
+              <a:gs pos="23000">
+                <a:schemeClr val="accent6">
+                  <a:lumMod val="89000"/>
+                </a:schemeClr>
+              </a:gs>
+              <a:gs pos="69000">
+                <a:schemeClr val="accent6">
+                  <a:lumMod val="75000"/>
+                </a:schemeClr>
+              </a:gs>
+              <a:gs pos="97000">
+                <a:schemeClr val="accent6">
+                  <a:lumMod val="70000"/>
+                </a:schemeClr>
+              </a:gs>
+            </a:gsLst>
+            <a:path path="circle">
+              <a:fillToRect l="50000" t="50000" r="50000" b="50000"/>
+            </a:path>
+            <a:tileRect/>
+          </a:gradFill>
+          <a:ln>
+            <a:noFill/>
+          </a:ln>
+          <a:scene3d>
+            <a:camera prst="orthographicFront"/>
+            <a:lightRig rig="threePt" dir="t"/>
+          </a:scene3d>
+          <a:sp3d>
+            <a:bevelT w="114300" prst="artDeco"/>
+          </a:sp3d>
+        </p:spPr>
+        <p:style>
+          <a:lnRef idx="2">
+            <a:schemeClr val="accent1">
+              <a:shade val="50000"/>
+            </a:schemeClr>
+          </a:lnRef>
+          <a:fillRef idx="1">
+            <a:schemeClr val="accent1"/>
+          </a:fillRef>
+          <a:effectRef idx="0">
+            <a:schemeClr val="accent1"/>
+          </a:effectRef>
+          <a:fontRef idx="minor">
+            <a:schemeClr val="lt1"/>
+          </a:fontRef>
+        </p:style>
+        <p:txBody>
+          <a:bodyPr rtlCol="0" anchor="ctr"/>
+          <a:lstStyle/>
+          <a:p>
+            <a:pPr algn="ctr"/>
+            <a:r>
+              <a:rPr lang="en-US" sz="13800" b="1" dirty="0" smtClean="0">
+                <a:effectLst>
+                  <a:innerShdw blurRad="63500" dist="50800" dir="13500000">
+                    <a:prstClr val="black">
+                      <a:alpha val="50000"/>
+                    </a:prstClr>
+                  </a:innerShdw>
+                </a:effectLst>
+                <a:latin typeface="Optima" charset="0"/>
+                <a:ea typeface="Optima" charset="0"/>
+                <a:cs typeface="Optima" charset="0"/>
+              </a:rPr>
+              <a:t>Great Job!</a:t>
+            </a:r>
+            <a:br>
+              <a:rPr lang="en-US" sz="13800" b="1" dirty="0" smtClean="0">
+                <a:effectLst>
+                  <a:innerShdw blurRad="63500" dist="50800" dir="13500000">
+                    <a:prstClr val="black">
+                      <a:alpha val="50000"/>
+                    </a:prstClr>
+                  </a:innerShdw>
+                </a:effectLst>
+                <a:latin typeface="Optima" charset="0"/>
+                <a:ea typeface="Optima" charset="0"/>
+                <a:cs typeface="Optima" charset="0"/>
+              </a:rPr>
+            </a:br>
+            <a:r>
+              <a:rPr lang="en-US" sz="7200" b="1" dirty="0" smtClean="0">
+                <a:effectLst>
+                  <a:innerShdw blurRad="63500" dist="50800" dir="13500000">
+                    <a:prstClr val="black">
+                      <a:alpha val="50000"/>
+                    </a:prstClr>
+                  </a:innerShdw>
+                </a:effectLst>
+                <a:latin typeface="Optima" charset="0"/>
+                <a:ea typeface="Optima" charset="0"/>
+                <a:cs typeface="Optima" charset="0"/>
+              </a:rPr>
+              <a:t>Level Complete</a:t>
+            </a:r>
+            <a:endParaRPr lang="en-US" sz="11500" b="1" dirty="0">
+              <a:effectLst>
+                <a:innerShdw blurRad="63500" dist="50800" dir="13500000">
+                  <a:prstClr val="black">
+                    <a:alpha val="50000"/>
+                  </a:prstClr>
+                </a:innerShdw>
+              </a:effectLst>
+              <a:latin typeface="Optima" charset="0"/>
+              <a:ea typeface="Optima" charset="0"/>
+              <a:cs typeface="Optima" charset="0"/>
+            </a:endParaRPr>
+          </a:p>
+        </p:txBody>
+      </p:sp>
+    </p:spTree>
+    <p:extLst>
+      <p:ext uri="{BB962C8B-B14F-4D97-AF65-F5344CB8AC3E}">
+        <p14:creationId xmlns:p14="http://schemas.microsoft.com/office/powerpoint/2010/main" val="792246136"/>
+      </p:ext>
+    </p:extLst>
+  </p:cSld>
+  <p:clrMapOvr>
+    <a:masterClrMapping/>
+  </p:clrMapOvr>
+  <p:timing>
+    <p:tnLst>
+      <p:par>
+        <p:cTn id="1" dur="indefinite" restart="never" nodeType="tmRoot"/>
+      </p:par>
+    </p:tnLst>
+  </p:timing>
+</p:sld>
+</file>
+
+<file path=ppt/slides/slide5.xml><?xml version="1.0" encoding="utf-8"?>
+<p:sld xmlns:a="http://schemas.openxmlformats.org/drawingml/2006/main" xmlns:r="http://schemas.openxmlformats.org/officeDocument/2006/relationships" xmlns:p="http://schemas.openxmlformats.org/presentationml/2006/main">
+  <p:cSld>
+    <p:bg>
+      <p:bgPr>
+        <a:solidFill>
+          <a:schemeClr val="tx1"/>
+        </a:solidFill>
+        <a:effectLst/>
+      </p:bgPr>
+    </p:bg>
+    <p:spTree>
+      <p:nvGrpSpPr>
+        <p:cNvPr id="1" name=""/>
+        <p:cNvGrpSpPr/>
+        <p:nvPr/>
+      </p:nvGrpSpPr>
+      <p:grpSpPr>
+        <a:xfrm>
+          <a:off x="0" y="0"/>
+          <a:ext cx="0" cy="0"/>
+          <a:chOff x="0" y="0"/>
+          <a:chExt cx="0" cy="0"/>
+        </a:xfrm>
+      </p:grpSpPr>
+      <p:sp>
+        <p:nvSpPr>
+          <p:cNvPr id="2" name="Rounded Rectangle 1"/>
+          <p:cNvSpPr/>
+          <p:nvPr/>
+        </p:nvSpPr>
+        <p:spPr>
+          <a:xfrm>
+            <a:off x="0" y="1638300"/>
+            <a:ext cx="12192000" cy="3568700"/>
+          </a:xfrm>
+          <a:prstGeom prst="roundRect">
+            <a:avLst/>
+          </a:prstGeom>
+          <a:gradFill flip="none" rotWithShape="1">
+            <a:gsLst>
+              <a:gs pos="0">
+                <a:schemeClr val="accent4">
+                  <a:lumMod val="89000"/>
+                </a:schemeClr>
+              </a:gs>
+              <a:gs pos="23000">
+                <a:schemeClr val="accent4">
+                  <a:lumMod val="89000"/>
+                </a:schemeClr>
+              </a:gs>
+              <a:gs pos="69000">
+                <a:schemeClr val="accent4">
+                  <a:lumMod val="75000"/>
+                </a:schemeClr>
+              </a:gs>
+              <a:gs pos="97000">
+                <a:schemeClr val="accent4">
+                  <a:lumMod val="70000"/>
+                </a:schemeClr>
+              </a:gs>
+            </a:gsLst>
+            <a:path path="rect">
+              <a:fillToRect l="100000" t="100000"/>
+            </a:path>
+            <a:tileRect r="-100000" b="-100000"/>
+          </a:gradFill>
+          <a:ln>
+            <a:noFill/>
+          </a:ln>
+          <a:scene3d>
+            <a:camera prst="orthographicFront"/>
+            <a:lightRig rig="threePt" dir="t"/>
+          </a:scene3d>
+          <a:sp3d>
+            <a:bevelT w="114300" prst="artDeco"/>
+          </a:sp3d>
+        </p:spPr>
+        <p:style>
+          <a:lnRef idx="2">
+            <a:schemeClr val="accent1">
+              <a:shade val="50000"/>
+            </a:schemeClr>
+          </a:lnRef>
+          <a:fillRef idx="1">
+            <a:schemeClr val="accent1"/>
+          </a:fillRef>
+          <a:effectRef idx="0">
+            <a:schemeClr val="accent1"/>
+          </a:effectRef>
+          <a:fontRef idx="minor">
+            <a:schemeClr val="lt1"/>
+          </a:fontRef>
+        </p:style>
+        <p:txBody>
+          <a:bodyPr rtlCol="0" anchor="ctr"/>
+          <a:lstStyle/>
+          <a:p>
+            <a:pPr algn="ctr"/>
+            <a:r>
+              <a:rPr lang="en-US" sz="16600" b="1" dirty="0" smtClean="0">
+                <a:effectLst>
+                  <a:innerShdw blurRad="63500" dist="50800" dir="13500000">
+                    <a:prstClr val="black">
+                      <a:alpha val="50000"/>
+                    </a:prstClr>
+                  </a:innerShdw>
+                </a:effectLst>
+                <a:latin typeface="Optima" charset="0"/>
+                <a:ea typeface="Optima" charset="0"/>
+                <a:cs typeface="Optima" charset="0"/>
+              </a:rPr>
+              <a:t>Game Over!</a:t>
+            </a:r>
+            <a:endParaRPr lang="en-US" sz="16600" b="1" dirty="0">
+              <a:effectLst>
+                <a:innerShdw blurRad="63500" dist="50800" dir="13500000">
+                  <a:prstClr val="black">
+                    <a:alpha val="50000"/>
+                  </a:prstClr>
+                </a:innerShdw>
+              </a:effectLst>
+              <a:latin typeface="Optima" charset="0"/>
+              <a:ea typeface="Optima" charset="0"/>
+              <a:cs typeface="Optima" charset="0"/>
+            </a:endParaRPr>
+          </a:p>
+        </p:txBody>
+      </p:sp>
+    </p:spTree>
+    <p:extLst>
+      <p:ext uri="{BB962C8B-B14F-4D97-AF65-F5344CB8AC3E}">
+        <p14:creationId xmlns:p14="http://schemas.microsoft.com/office/powerpoint/2010/main" val="955258619"/>
       </p:ext>
     </p:extLst>
   </p:cSld>

</xml_diff>

<commit_message>
Adjusted sound effects and labels
</commit_message>
<xml_diff>
--- a/Supporting Items/Images/DrinkPoint PowerPoint.pptx
+++ b/Supporting Items/Images/DrinkPoint PowerPoint.pptx
@@ -5,8 +5,11 @@
     <p:sldMasterId id="2147483648" r:id="rId1"/>
   </p:sldMasterIdLst>
   <p:sldIdLst>
-    <p:sldId id="256" r:id="rId2"/>
-    <p:sldId id="257" r:id="rId3"/>
+    <p:sldId id="257" r:id="rId2"/>
+    <p:sldId id="256" r:id="rId3"/>
+    <p:sldId id="260" r:id="rId4"/>
+    <p:sldId id="259" r:id="rId5"/>
+    <p:sldId id="258" r:id="rId6"/>
   </p:sldIdLst>
   <p:sldSz cx="12192000" cy="6858000"/>
   <p:notesSz cx="6858000" cy="9144000"/>
@@ -255,7 +258,7 @@
           <a:p>
             <a:fld id="{9E764FE3-7391-B940-9C10-F64F800F0F41}" type="datetimeFigureOut">
               <a:rPr lang="en-US" smtClean="0"/>
-              <a:t>6/25/16</a:t>
+              <a:t>6/28/16</a:t>
             </a:fld>
             <a:endParaRPr lang="en-US"/>
           </a:p>
@@ -425,7 +428,7 @@
           <a:p>
             <a:fld id="{9E764FE3-7391-B940-9C10-F64F800F0F41}" type="datetimeFigureOut">
               <a:rPr lang="en-US" smtClean="0"/>
-              <a:t>6/25/16</a:t>
+              <a:t>6/28/16</a:t>
             </a:fld>
             <a:endParaRPr lang="en-US"/>
           </a:p>
@@ -605,7 +608,7 @@
           <a:p>
             <a:fld id="{9E764FE3-7391-B940-9C10-F64F800F0F41}" type="datetimeFigureOut">
               <a:rPr lang="en-US" smtClean="0"/>
-              <a:t>6/25/16</a:t>
+              <a:t>6/28/16</a:t>
             </a:fld>
             <a:endParaRPr lang="en-US"/>
           </a:p>
@@ -775,7 +778,7 @@
           <a:p>
             <a:fld id="{9E764FE3-7391-B940-9C10-F64F800F0F41}" type="datetimeFigureOut">
               <a:rPr lang="en-US" smtClean="0"/>
-              <a:t>6/25/16</a:t>
+              <a:t>6/28/16</a:t>
             </a:fld>
             <a:endParaRPr lang="en-US"/>
           </a:p>
@@ -1021,7 +1024,7 @@
           <a:p>
             <a:fld id="{9E764FE3-7391-B940-9C10-F64F800F0F41}" type="datetimeFigureOut">
               <a:rPr lang="en-US" smtClean="0"/>
-              <a:t>6/25/16</a:t>
+              <a:t>6/28/16</a:t>
             </a:fld>
             <a:endParaRPr lang="en-US"/>
           </a:p>
@@ -1253,7 +1256,7 @@
           <a:p>
             <a:fld id="{9E764FE3-7391-B940-9C10-F64F800F0F41}" type="datetimeFigureOut">
               <a:rPr lang="en-US" smtClean="0"/>
-              <a:t>6/25/16</a:t>
+              <a:t>6/28/16</a:t>
             </a:fld>
             <a:endParaRPr lang="en-US"/>
           </a:p>
@@ -1620,7 +1623,7 @@
           <a:p>
             <a:fld id="{9E764FE3-7391-B940-9C10-F64F800F0F41}" type="datetimeFigureOut">
               <a:rPr lang="en-US" smtClean="0"/>
-              <a:t>6/25/16</a:t>
+              <a:t>6/28/16</a:t>
             </a:fld>
             <a:endParaRPr lang="en-US"/>
           </a:p>
@@ -1738,7 +1741,7 @@
           <a:p>
             <a:fld id="{9E764FE3-7391-B940-9C10-F64F800F0F41}" type="datetimeFigureOut">
               <a:rPr lang="en-US" smtClean="0"/>
-              <a:t>6/25/16</a:t>
+              <a:t>6/28/16</a:t>
             </a:fld>
             <a:endParaRPr lang="en-US"/>
           </a:p>
@@ -1833,7 +1836,7 @@
           <a:p>
             <a:fld id="{9E764FE3-7391-B940-9C10-F64F800F0F41}" type="datetimeFigureOut">
               <a:rPr lang="en-US" smtClean="0"/>
-              <a:t>6/25/16</a:t>
+              <a:t>6/28/16</a:t>
             </a:fld>
             <a:endParaRPr lang="en-US"/>
           </a:p>
@@ -2110,7 +2113,7 @@
           <a:p>
             <a:fld id="{9E764FE3-7391-B940-9C10-F64F800F0F41}" type="datetimeFigureOut">
               <a:rPr lang="en-US" smtClean="0"/>
-              <a:t>6/25/16</a:t>
+              <a:t>6/28/16</a:t>
             </a:fld>
             <a:endParaRPr lang="en-US"/>
           </a:p>
@@ -2363,7 +2366,7 @@
           <a:p>
             <a:fld id="{9E764FE3-7391-B940-9C10-F64F800F0F41}" type="datetimeFigureOut">
               <a:rPr lang="en-US" smtClean="0"/>
-              <a:t>6/25/16</a:t>
+              <a:t>6/28/16</a:t>
             </a:fld>
             <a:endParaRPr lang="en-US"/>
           </a:p>
@@ -2576,7 +2579,7 @@
           <a:p>
             <a:fld id="{9E764FE3-7391-B940-9C10-F64F800F0F41}" type="datetimeFigureOut">
               <a:rPr lang="en-US" smtClean="0"/>
-              <a:t>6/25/16</a:t>
+              <a:t>6/28/16</a:t>
             </a:fld>
             <a:endParaRPr lang="en-US"/>
           </a:p>
@@ -2967,920 +2970,6 @@
 <file path=ppt/slides/slide1.xml><?xml version="1.0" encoding="utf-8"?>
 <p:sld xmlns:a="http://schemas.openxmlformats.org/drawingml/2006/main" xmlns:r="http://schemas.openxmlformats.org/officeDocument/2006/relationships" xmlns:p="http://schemas.openxmlformats.org/presentationml/2006/main">
   <p:cSld>
-    <p:bg>
-      <p:bgPr>
-        <a:solidFill>
-          <a:schemeClr val="tx1"/>
-        </a:solidFill>
-        <a:effectLst/>
-      </p:bgPr>
-    </p:bg>
-    <p:spTree>
-      <p:nvGrpSpPr>
-        <p:cNvPr id="1" name=""/>
-        <p:cNvGrpSpPr/>
-        <p:nvPr/>
-      </p:nvGrpSpPr>
-      <p:grpSpPr>
-        <a:xfrm>
-          <a:off x="0" y="0"/>
-          <a:ext cx="0" cy="0"/>
-          <a:chOff x="0" y="0"/>
-          <a:chExt cx="0" cy="0"/>
-        </a:xfrm>
-      </p:grpSpPr>
-      <p:pic>
-        <p:nvPicPr>
-          <p:cNvPr id="4" name="Picture 3"/>
-          <p:cNvPicPr>
-            <a:picLocks noChangeAspect="1"/>
-          </p:cNvPicPr>
-          <p:nvPr/>
-        </p:nvPicPr>
-        <p:blipFill>
-          <a:blip r:embed="rId2">
-            <a:extLst>
-              <a:ext uri="{28A0092B-C50C-407E-A947-70E740481C1C}">
-                <a14:useLocalDpi xmlns:a14="http://schemas.microsoft.com/office/drawing/2010/main" val="0"/>
-              </a:ext>
-            </a:extLst>
-          </a:blip>
-          <a:stretch>
-            <a:fillRect/>
-          </a:stretch>
-        </p:blipFill>
-        <p:spPr>
-          <a:xfrm>
-            <a:off x="5181600" y="2429934"/>
-            <a:ext cx="1828800" cy="1828800"/>
-          </a:xfrm>
-          <a:prstGeom prst="rect">
-            <a:avLst/>
-          </a:prstGeom>
-        </p:spPr>
-      </p:pic>
-      <p:pic>
-        <p:nvPicPr>
-          <p:cNvPr id="2" name="Picture 1"/>
-          <p:cNvPicPr>
-            <a:picLocks noChangeAspect="1"/>
-          </p:cNvPicPr>
-          <p:nvPr/>
-        </p:nvPicPr>
-        <p:blipFill>
-          <a:blip r:embed="rId3">
-            <a:duotone>
-              <a:prstClr val="black"/>
-              <a:schemeClr val="accent2">
-                <a:tint val="45000"/>
-                <a:satMod val="400000"/>
-              </a:schemeClr>
-            </a:duotone>
-            <a:extLst>
-              <a:ext uri="{28A0092B-C50C-407E-A947-70E740481C1C}">
-                <a14:useLocalDpi xmlns:a14="http://schemas.microsoft.com/office/drawing/2010/main" val="0"/>
-              </a:ext>
-            </a:extLst>
-          </a:blip>
-          <a:stretch>
-            <a:fillRect/>
-          </a:stretch>
-        </p:blipFill>
-        <p:spPr>
-          <a:xfrm>
-            <a:off x="741362" y="1210733"/>
-            <a:ext cx="304800" cy="203200"/>
-          </a:xfrm>
-          <a:prstGeom prst="rect">
-            <a:avLst/>
-          </a:prstGeom>
-        </p:spPr>
-      </p:pic>
-      <p:pic>
-        <p:nvPicPr>
-          <p:cNvPr id="3" name="Picture 2"/>
-          <p:cNvPicPr>
-            <a:picLocks noChangeAspect="1"/>
-          </p:cNvPicPr>
-          <p:nvPr/>
-        </p:nvPicPr>
-        <p:blipFill>
-          <a:blip r:embed="rId4">
-            <a:duotone>
-              <a:prstClr val="black"/>
-              <a:schemeClr val="accent2">
-                <a:tint val="45000"/>
-                <a:satMod val="400000"/>
-              </a:schemeClr>
-            </a:duotone>
-            <a:extLst>
-              <a:ext uri="{28A0092B-C50C-407E-A947-70E740481C1C}">
-                <a14:useLocalDpi xmlns:a14="http://schemas.microsoft.com/office/drawing/2010/main" val="0"/>
-              </a:ext>
-            </a:extLst>
-          </a:blip>
-          <a:stretch>
-            <a:fillRect/>
-          </a:stretch>
-        </p:blipFill>
-        <p:spPr>
-          <a:xfrm>
-            <a:off x="1534583" y="1007533"/>
-            <a:ext cx="609600" cy="406400"/>
-          </a:xfrm>
-          <a:prstGeom prst="rect">
-            <a:avLst/>
-          </a:prstGeom>
-        </p:spPr>
-      </p:pic>
-      <p:pic>
-        <p:nvPicPr>
-          <p:cNvPr id="5" name="Picture 4"/>
-          <p:cNvPicPr>
-            <a:picLocks noChangeAspect="1"/>
-          </p:cNvPicPr>
-          <p:nvPr/>
-        </p:nvPicPr>
-        <p:blipFill>
-          <a:blip r:embed="rId5">
-            <a:duotone>
-              <a:prstClr val="black"/>
-              <a:schemeClr val="accent2">
-                <a:tint val="45000"/>
-                <a:satMod val="400000"/>
-              </a:schemeClr>
-            </a:duotone>
-            <a:extLst>
-              <a:ext uri="{28A0092B-C50C-407E-A947-70E740481C1C}">
-                <a14:useLocalDpi xmlns:a14="http://schemas.microsoft.com/office/drawing/2010/main" val="0"/>
-              </a:ext>
-            </a:extLst>
-          </a:blip>
-          <a:stretch>
-            <a:fillRect/>
-          </a:stretch>
-        </p:blipFill>
-        <p:spPr>
-          <a:xfrm>
-            <a:off x="2632604" y="1210733"/>
-            <a:ext cx="304800" cy="203200"/>
-          </a:xfrm>
-          <a:prstGeom prst="rect">
-            <a:avLst/>
-          </a:prstGeom>
-        </p:spPr>
-      </p:pic>
-      <p:pic>
-        <p:nvPicPr>
-          <p:cNvPr id="6" name="Picture 5"/>
-          <p:cNvPicPr>
-            <a:picLocks noChangeAspect="1"/>
-          </p:cNvPicPr>
-          <p:nvPr/>
-        </p:nvPicPr>
-        <p:blipFill>
-          <a:blip r:embed="rId6">
-            <a:duotone>
-              <a:prstClr val="black"/>
-              <a:schemeClr val="accent2">
-                <a:tint val="45000"/>
-                <a:satMod val="400000"/>
-              </a:schemeClr>
-            </a:duotone>
-            <a:extLst>
-              <a:ext uri="{28A0092B-C50C-407E-A947-70E740481C1C}">
-                <a14:useLocalDpi xmlns:a14="http://schemas.microsoft.com/office/drawing/2010/main" val="0"/>
-              </a:ext>
-            </a:extLst>
-          </a:blip>
-          <a:stretch>
-            <a:fillRect/>
-          </a:stretch>
-        </p:blipFill>
-        <p:spPr>
-          <a:xfrm>
-            <a:off x="3425825" y="1007533"/>
-            <a:ext cx="609600" cy="406400"/>
-          </a:xfrm>
-          <a:prstGeom prst="rect">
-            <a:avLst/>
-          </a:prstGeom>
-        </p:spPr>
-      </p:pic>
-      <p:pic>
-        <p:nvPicPr>
-          <p:cNvPr id="7" name="Picture 6"/>
-          <p:cNvPicPr>
-            <a:picLocks noChangeAspect="1"/>
-          </p:cNvPicPr>
-          <p:nvPr/>
-        </p:nvPicPr>
-        <p:blipFill>
-          <a:blip r:embed="rId7">
-            <a:duotone>
-              <a:prstClr val="black"/>
-              <a:schemeClr val="accent6">
-                <a:tint val="45000"/>
-                <a:satMod val="400000"/>
-              </a:schemeClr>
-            </a:duotone>
-            <a:extLst>
-              <a:ext uri="{28A0092B-C50C-407E-A947-70E740481C1C}">
-                <a14:useLocalDpi xmlns:a14="http://schemas.microsoft.com/office/drawing/2010/main" val="0"/>
-              </a:ext>
-            </a:extLst>
-          </a:blip>
-          <a:stretch>
-            <a:fillRect/>
-          </a:stretch>
-        </p:blipFill>
-        <p:spPr>
-          <a:xfrm>
-            <a:off x="741362" y="1913467"/>
-            <a:ext cx="304800" cy="203200"/>
-          </a:xfrm>
-          <a:prstGeom prst="rect">
-            <a:avLst/>
-          </a:prstGeom>
-        </p:spPr>
-      </p:pic>
-      <p:pic>
-        <p:nvPicPr>
-          <p:cNvPr id="8" name="Picture 7"/>
-          <p:cNvPicPr>
-            <a:picLocks noChangeAspect="1"/>
-          </p:cNvPicPr>
-          <p:nvPr/>
-        </p:nvPicPr>
-        <p:blipFill>
-          <a:blip r:embed="rId8">
-            <a:duotone>
-              <a:prstClr val="black"/>
-              <a:schemeClr val="accent6">
-                <a:tint val="45000"/>
-                <a:satMod val="400000"/>
-              </a:schemeClr>
-            </a:duotone>
-            <a:extLst>
-              <a:ext uri="{28A0092B-C50C-407E-A947-70E740481C1C}">
-                <a14:useLocalDpi xmlns:a14="http://schemas.microsoft.com/office/drawing/2010/main" val="0"/>
-              </a:ext>
-            </a:extLst>
-          </a:blip>
-          <a:stretch>
-            <a:fillRect/>
-          </a:stretch>
-        </p:blipFill>
-        <p:spPr>
-          <a:xfrm>
-            <a:off x="1534583" y="1710267"/>
-            <a:ext cx="609600" cy="406400"/>
-          </a:xfrm>
-          <a:prstGeom prst="rect">
-            <a:avLst/>
-          </a:prstGeom>
-        </p:spPr>
-      </p:pic>
-      <p:pic>
-        <p:nvPicPr>
-          <p:cNvPr id="9" name="Picture 8"/>
-          <p:cNvPicPr>
-            <a:picLocks noChangeAspect="1"/>
-          </p:cNvPicPr>
-          <p:nvPr/>
-        </p:nvPicPr>
-        <p:blipFill>
-          <a:blip r:embed="rId9">
-            <a:duotone>
-              <a:prstClr val="black"/>
-              <a:schemeClr val="accent6">
-                <a:tint val="45000"/>
-                <a:satMod val="400000"/>
-              </a:schemeClr>
-            </a:duotone>
-            <a:extLst>
-              <a:ext uri="{28A0092B-C50C-407E-A947-70E740481C1C}">
-                <a14:useLocalDpi xmlns:a14="http://schemas.microsoft.com/office/drawing/2010/main" val="0"/>
-              </a:ext>
-            </a:extLst>
-          </a:blip>
-          <a:stretch>
-            <a:fillRect/>
-          </a:stretch>
-        </p:blipFill>
-        <p:spPr>
-          <a:xfrm>
-            <a:off x="2632604" y="1913467"/>
-            <a:ext cx="304800" cy="203200"/>
-          </a:xfrm>
-          <a:prstGeom prst="rect">
-            <a:avLst/>
-          </a:prstGeom>
-        </p:spPr>
-      </p:pic>
-      <p:pic>
-        <p:nvPicPr>
-          <p:cNvPr id="10" name="Picture 9"/>
-          <p:cNvPicPr>
-            <a:picLocks noChangeAspect="1"/>
-          </p:cNvPicPr>
-          <p:nvPr/>
-        </p:nvPicPr>
-        <p:blipFill>
-          <a:blip r:embed="rId10">
-            <a:duotone>
-              <a:prstClr val="black"/>
-              <a:schemeClr val="accent6">
-                <a:tint val="45000"/>
-                <a:satMod val="400000"/>
-              </a:schemeClr>
-            </a:duotone>
-            <a:extLst>
-              <a:ext uri="{28A0092B-C50C-407E-A947-70E740481C1C}">
-                <a14:useLocalDpi xmlns:a14="http://schemas.microsoft.com/office/drawing/2010/main" val="0"/>
-              </a:ext>
-            </a:extLst>
-          </a:blip>
-          <a:stretch>
-            <a:fillRect/>
-          </a:stretch>
-        </p:blipFill>
-        <p:spPr>
-          <a:xfrm>
-            <a:off x="3425825" y="1710267"/>
-            <a:ext cx="609600" cy="406400"/>
-          </a:xfrm>
-          <a:prstGeom prst="rect">
-            <a:avLst/>
-          </a:prstGeom>
-        </p:spPr>
-      </p:pic>
-      <p:pic>
-        <p:nvPicPr>
-          <p:cNvPr id="11" name="Picture 10"/>
-          <p:cNvPicPr>
-            <a:picLocks noChangeAspect="1"/>
-          </p:cNvPicPr>
-          <p:nvPr/>
-        </p:nvPicPr>
-        <p:blipFill>
-          <a:blip r:embed="rId11">
-            <a:duotone>
-              <a:prstClr val="black"/>
-              <a:schemeClr val="accent5">
-                <a:tint val="45000"/>
-                <a:satMod val="400000"/>
-              </a:schemeClr>
-            </a:duotone>
-            <a:extLst>
-              <a:ext uri="{28A0092B-C50C-407E-A947-70E740481C1C}">
-                <a14:useLocalDpi xmlns:a14="http://schemas.microsoft.com/office/drawing/2010/main" val="0"/>
-              </a:ext>
-            </a:extLst>
-          </a:blip>
-          <a:stretch>
-            <a:fillRect/>
-          </a:stretch>
-        </p:blipFill>
-        <p:spPr>
-          <a:xfrm>
-            <a:off x="741362" y="2616201"/>
-            <a:ext cx="304800" cy="203200"/>
-          </a:xfrm>
-          <a:prstGeom prst="rect">
-            <a:avLst/>
-          </a:prstGeom>
-        </p:spPr>
-      </p:pic>
-      <p:pic>
-        <p:nvPicPr>
-          <p:cNvPr id="12" name="Picture 11"/>
-          <p:cNvPicPr>
-            <a:picLocks noChangeAspect="1"/>
-          </p:cNvPicPr>
-          <p:nvPr/>
-        </p:nvPicPr>
-        <p:blipFill>
-          <a:blip r:embed="rId12">
-            <a:duotone>
-              <a:prstClr val="black"/>
-              <a:schemeClr val="accent5">
-                <a:tint val="45000"/>
-                <a:satMod val="400000"/>
-              </a:schemeClr>
-            </a:duotone>
-            <a:extLst>
-              <a:ext uri="{28A0092B-C50C-407E-A947-70E740481C1C}">
-                <a14:useLocalDpi xmlns:a14="http://schemas.microsoft.com/office/drawing/2010/main" val="0"/>
-              </a:ext>
-            </a:extLst>
-          </a:blip>
-          <a:stretch>
-            <a:fillRect/>
-          </a:stretch>
-        </p:blipFill>
-        <p:spPr>
-          <a:xfrm>
-            <a:off x="1534583" y="2413001"/>
-            <a:ext cx="609600" cy="406400"/>
-          </a:xfrm>
-          <a:prstGeom prst="rect">
-            <a:avLst/>
-          </a:prstGeom>
-        </p:spPr>
-      </p:pic>
-      <p:pic>
-        <p:nvPicPr>
-          <p:cNvPr id="13" name="Picture 12"/>
-          <p:cNvPicPr>
-            <a:picLocks noChangeAspect="1"/>
-          </p:cNvPicPr>
-          <p:nvPr/>
-        </p:nvPicPr>
-        <p:blipFill>
-          <a:blip r:embed="rId13">
-            <a:duotone>
-              <a:prstClr val="black"/>
-              <a:schemeClr val="accent5">
-                <a:tint val="45000"/>
-                <a:satMod val="400000"/>
-              </a:schemeClr>
-            </a:duotone>
-            <a:extLst>
-              <a:ext uri="{28A0092B-C50C-407E-A947-70E740481C1C}">
-                <a14:useLocalDpi xmlns:a14="http://schemas.microsoft.com/office/drawing/2010/main" val="0"/>
-              </a:ext>
-            </a:extLst>
-          </a:blip>
-          <a:stretch>
-            <a:fillRect/>
-          </a:stretch>
-        </p:blipFill>
-        <p:spPr>
-          <a:xfrm>
-            <a:off x="2632604" y="2616201"/>
-            <a:ext cx="304800" cy="203200"/>
-          </a:xfrm>
-          <a:prstGeom prst="rect">
-            <a:avLst/>
-          </a:prstGeom>
-        </p:spPr>
-      </p:pic>
-      <p:pic>
-        <p:nvPicPr>
-          <p:cNvPr id="14" name="Picture 13"/>
-          <p:cNvPicPr>
-            <a:picLocks noChangeAspect="1"/>
-          </p:cNvPicPr>
-          <p:nvPr/>
-        </p:nvPicPr>
-        <p:blipFill>
-          <a:blip r:embed="rId14">
-            <a:duotone>
-              <a:prstClr val="black"/>
-              <a:schemeClr val="accent5">
-                <a:tint val="45000"/>
-                <a:satMod val="400000"/>
-              </a:schemeClr>
-            </a:duotone>
-            <a:extLst>
-              <a:ext uri="{28A0092B-C50C-407E-A947-70E740481C1C}">
-                <a14:useLocalDpi xmlns:a14="http://schemas.microsoft.com/office/drawing/2010/main" val="0"/>
-              </a:ext>
-            </a:extLst>
-          </a:blip>
-          <a:stretch>
-            <a:fillRect/>
-          </a:stretch>
-        </p:blipFill>
-        <p:spPr>
-          <a:xfrm>
-            <a:off x="3425825" y="2413001"/>
-            <a:ext cx="609600" cy="406400"/>
-          </a:xfrm>
-          <a:prstGeom prst="rect">
-            <a:avLst/>
-          </a:prstGeom>
-        </p:spPr>
-      </p:pic>
-      <p:pic>
-        <p:nvPicPr>
-          <p:cNvPr id="15" name="Picture 14"/>
-          <p:cNvPicPr>
-            <a:picLocks noChangeAspect="1"/>
-          </p:cNvPicPr>
-          <p:nvPr/>
-        </p:nvPicPr>
-        <p:blipFill>
-          <a:blip r:embed="rId15">
-            <a:duotone>
-              <a:prstClr val="black"/>
-              <a:schemeClr val="accent1">
-                <a:tint val="45000"/>
-                <a:satMod val="400000"/>
-              </a:schemeClr>
-            </a:duotone>
-            <a:extLst>
-              <a:ext uri="{28A0092B-C50C-407E-A947-70E740481C1C}">
-                <a14:useLocalDpi xmlns:a14="http://schemas.microsoft.com/office/drawing/2010/main" val="0"/>
-              </a:ext>
-            </a:extLst>
-          </a:blip>
-          <a:stretch>
-            <a:fillRect/>
-          </a:stretch>
-        </p:blipFill>
-        <p:spPr>
-          <a:xfrm>
-            <a:off x="703262" y="3632200"/>
-            <a:ext cx="381000" cy="203200"/>
-          </a:xfrm>
-          <a:prstGeom prst="rect">
-            <a:avLst/>
-          </a:prstGeom>
-        </p:spPr>
-      </p:pic>
-      <p:pic>
-        <p:nvPicPr>
-          <p:cNvPr id="16" name="Picture 15"/>
-          <p:cNvPicPr>
-            <a:picLocks noChangeAspect="1"/>
-          </p:cNvPicPr>
-          <p:nvPr/>
-        </p:nvPicPr>
-        <p:blipFill>
-          <a:blip r:embed="rId16">
-            <a:duotone>
-              <a:prstClr val="black"/>
-              <a:schemeClr val="accent1">
-                <a:tint val="45000"/>
-                <a:satMod val="400000"/>
-              </a:schemeClr>
-            </a:duotone>
-            <a:extLst>
-              <a:ext uri="{28A0092B-C50C-407E-A947-70E740481C1C}">
-                <a14:useLocalDpi xmlns:a14="http://schemas.microsoft.com/office/drawing/2010/main" val="0"/>
-              </a:ext>
-            </a:extLst>
-          </a:blip>
-          <a:stretch>
-            <a:fillRect/>
-          </a:stretch>
-        </p:blipFill>
-        <p:spPr>
-          <a:xfrm>
-            <a:off x="1458383" y="3429000"/>
-            <a:ext cx="762000" cy="406400"/>
-          </a:xfrm>
-          <a:prstGeom prst="rect">
-            <a:avLst/>
-          </a:prstGeom>
-        </p:spPr>
-      </p:pic>
-      <p:pic>
-        <p:nvPicPr>
-          <p:cNvPr id="17" name="Picture 16"/>
-          <p:cNvPicPr>
-            <a:picLocks noChangeAspect="1"/>
-          </p:cNvPicPr>
-          <p:nvPr/>
-        </p:nvPicPr>
-        <p:blipFill>
-          <a:blip r:embed="rId17">
-            <a:extLst>
-              <a:ext uri="{28A0092B-C50C-407E-A947-70E740481C1C}">
-                <a14:useLocalDpi xmlns:a14="http://schemas.microsoft.com/office/drawing/2010/main" val="0"/>
-              </a:ext>
-            </a:extLst>
-          </a:blip>
-          <a:stretch>
-            <a:fillRect/>
-          </a:stretch>
-        </p:blipFill>
-        <p:spPr>
-          <a:xfrm>
-            <a:off x="10820400" y="5448300"/>
-            <a:ext cx="1054100" cy="1054100"/>
-          </a:xfrm>
-          <a:prstGeom prst="rect">
-            <a:avLst/>
-          </a:prstGeom>
-        </p:spPr>
-      </p:pic>
-      <p:pic>
-        <p:nvPicPr>
-          <p:cNvPr id="18" name="Picture 17"/>
-          <p:cNvPicPr>
-            <a:picLocks noChangeAspect="1"/>
-          </p:cNvPicPr>
-          <p:nvPr/>
-        </p:nvPicPr>
-        <p:blipFill>
-          <a:blip r:embed="rId18">
-            <a:extLst>
-              <a:ext uri="{28A0092B-C50C-407E-A947-70E740481C1C}">
-                <a14:useLocalDpi xmlns:a14="http://schemas.microsoft.com/office/drawing/2010/main" val="0"/>
-              </a:ext>
-            </a:extLst>
-          </a:blip>
-          <a:stretch>
-            <a:fillRect/>
-          </a:stretch>
-        </p:blipFill>
-        <p:spPr>
-          <a:xfrm>
-            <a:off x="9683750" y="5448300"/>
-            <a:ext cx="1054100" cy="1054100"/>
-          </a:xfrm>
-          <a:prstGeom prst="rect">
-            <a:avLst/>
-          </a:prstGeom>
-        </p:spPr>
-      </p:pic>
-      <p:pic>
-        <p:nvPicPr>
-          <p:cNvPr id="19" name="Picture 18"/>
-          <p:cNvPicPr>
-            <a:picLocks noChangeAspect="1"/>
-          </p:cNvPicPr>
-          <p:nvPr/>
-        </p:nvPicPr>
-        <p:blipFill>
-          <a:blip r:embed="rId19">
-            <a:extLst>
-              <a:ext uri="{28A0092B-C50C-407E-A947-70E740481C1C}">
-                <a14:useLocalDpi xmlns:a14="http://schemas.microsoft.com/office/drawing/2010/main" val="0"/>
-              </a:ext>
-            </a:extLst>
-          </a:blip>
-          <a:stretch>
-            <a:fillRect/>
-          </a:stretch>
-        </p:blipFill>
-        <p:spPr>
-          <a:xfrm>
-            <a:off x="8293100" y="5448300"/>
-            <a:ext cx="1054100" cy="1054100"/>
-          </a:xfrm>
-          <a:prstGeom prst="rect">
-            <a:avLst/>
-          </a:prstGeom>
-        </p:spPr>
-      </p:pic>
-      <p:pic>
-        <p:nvPicPr>
-          <p:cNvPr id="20" name="Picture 19"/>
-          <p:cNvPicPr>
-            <a:picLocks noChangeAspect="1"/>
-          </p:cNvPicPr>
-          <p:nvPr/>
-        </p:nvPicPr>
-        <p:blipFill>
-          <a:blip r:embed="rId20">
-            <a:extLst>
-              <a:ext uri="{28A0092B-C50C-407E-A947-70E740481C1C}">
-                <a14:useLocalDpi xmlns:a14="http://schemas.microsoft.com/office/drawing/2010/main" val="0"/>
-              </a:ext>
-            </a:extLst>
-          </a:blip>
-          <a:stretch>
-            <a:fillRect/>
-          </a:stretch>
-        </p:blipFill>
-        <p:spPr>
-          <a:xfrm>
-            <a:off x="176212" y="5448300"/>
-            <a:ext cx="1054100" cy="1054100"/>
-          </a:xfrm>
-          <a:prstGeom prst="rect">
-            <a:avLst/>
-          </a:prstGeom>
-        </p:spPr>
-      </p:pic>
-      <p:pic>
-        <p:nvPicPr>
-          <p:cNvPr id="21" name="Picture 20"/>
-          <p:cNvPicPr>
-            <a:picLocks noChangeAspect="1"/>
-          </p:cNvPicPr>
-          <p:nvPr/>
-        </p:nvPicPr>
-        <p:blipFill>
-          <a:blip r:embed="rId21">
-            <a:extLst>
-              <a:ext uri="{28A0092B-C50C-407E-A947-70E740481C1C}">
-                <a14:useLocalDpi xmlns:a14="http://schemas.microsoft.com/office/drawing/2010/main" val="0"/>
-              </a:ext>
-            </a:extLst>
-          </a:blip>
-          <a:stretch>
-            <a:fillRect/>
-          </a:stretch>
-        </p:blipFill>
-        <p:spPr>
-          <a:xfrm>
-            <a:off x="8491770" y="304800"/>
-            <a:ext cx="1710859" cy="1536700"/>
-          </a:xfrm>
-          <a:prstGeom prst="rect">
-            <a:avLst/>
-          </a:prstGeom>
-        </p:spPr>
-      </p:pic>
-      <p:pic>
-        <p:nvPicPr>
-          <p:cNvPr id="22" name="Picture 21"/>
-          <p:cNvPicPr>
-            <a:picLocks noChangeAspect="1"/>
-          </p:cNvPicPr>
-          <p:nvPr/>
-        </p:nvPicPr>
-        <p:blipFill>
-          <a:blip r:embed="rId22">
-            <a:extLst>
-              <a:ext uri="{28A0092B-C50C-407E-A947-70E740481C1C}">
-                <a14:useLocalDpi xmlns:a14="http://schemas.microsoft.com/office/drawing/2010/main" val="0"/>
-              </a:ext>
-            </a:extLst>
-          </a:blip>
-          <a:stretch>
-            <a:fillRect/>
-          </a:stretch>
-        </p:blipFill>
-        <p:spPr>
-          <a:xfrm>
-            <a:off x="6311900" y="300566"/>
-            <a:ext cx="1981200" cy="1555593"/>
-          </a:xfrm>
-          <a:prstGeom prst="rect">
-            <a:avLst/>
-          </a:prstGeom>
-        </p:spPr>
-      </p:pic>
-      <p:pic>
-        <p:nvPicPr>
-          <p:cNvPr id="23" name="Picture 22"/>
-          <p:cNvPicPr>
-            <a:picLocks noChangeAspect="1"/>
-          </p:cNvPicPr>
-          <p:nvPr/>
-        </p:nvPicPr>
-        <p:blipFill>
-          <a:blip r:embed="rId23">
-            <a:extLst>
-              <a:ext uri="{28A0092B-C50C-407E-A947-70E740481C1C}">
-                <a14:useLocalDpi xmlns:a14="http://schemas.microsoft.com/office/drawing/2010/main" val="0"/>
-              </a:ext>
-            </a:extLst>
-          </a:blip>
-          <a:stretch>
-            <a:fillRect/>
-          </a:stretch>
-        </p:blipFill>
-        <p:spPr>
-          <a:xfrm>
-            <a:off x="10308787" y="304800"/>
-            <a:ext cx="1536700" cy="1536700"/>
-          </a:xfrm>
-          <a:prstGeom prst="rect">
-            <a:avLst/>
-          </a:prstGeom>
-        </p:spPr>
-      </p:pic>
-      <p:pic>
-        <p:nvPicPr>
-          <p:cNvPr id="24" name="Picture 23"/>
-          <p:cNvPicPr>
-            <a:picLocks noChangeAspect="1"/>
-          </p:cNvPicPr>
-          <p:nvPr/>
-        </p:nvPicPr>
-        <p:blipFill>
-          <a:blip r:embed="rId24">
-            <a:duotone>
-              <a:schemeClr val="accent5">
-                <a:shade val="45000"/>
-                <a:satMod val="135000"/>
-              </a:schemeClr>
-              <a:prstClr val="white"/>
-            </a:duotone>
-            <a:extLst>
-              <a:ext uri="{28A0092B-C50C-407E-A947-70E740481C1C}">
-                <a14:useLocalDpi xmlns:a14="http://schemas.microsoft.com/office/drawing/2010/main" val="0"/>
-              </a:ext>
-            </a:extLst>
-          </a:blip>
-          <a:stretch>
-            <a:fillRect/>
-          </a:stretch>
-        </p:blipFill>
-        <p:spPr>
-          <a:xfrm>
-            <a:off x="5383976" y="5448299"/>
-            <a:ext cx="1118755" cy="1079501"/>
-          </a:xfrm>
-          <a:prstGeom prst="rect">
-            <a:avLst/>
-          </a:prstGeom>
-        </p:spPr>
-      </p:pic>
-      <p:pic>
-        <p:nvPicPr>
-          <p:cNvPr id="25" name="Picture 24"/>
-          <p:cNvPicPr>
-            <a:picLocks noChangeAspect="1"/>
-          </p:cNvPicPr>
-          <p:nvPr/>
-        </p:nvPicPr>
-        <p:blipFill>
-          <a:blip r:embed="rId25">
-            <a:duotone>
-              <a:schemeClr val="accent5">
-                <a:shade val="45000"/>
-                <a:satMod val="135000"/>
-              </a:schemeClr>
-              <a:prstClr val="white"/>
-            </a:duotone>
-            <a:extLst>
-              <a:ext uri="{28A0092B-C50C-407E-A947-70E740481C1C}">
-                <a14:useLocalDpi xmlns:a14="http://schemas.microsoft.com/office/drawing/2010/main" val="0"/>
-              </a:ext>
-            </a:extLst>
-          </a:blip>
-          <a:stretch>
-            <a:fillRect/>
-          </a:stretch>
-        </p:blipFill>
-        <p:spPr>
-          <a:xfrm>
-            <a:off x="7007706" y="5448299"/>
-            <a:ext cx="780419" cy="1079501"/>
-          </a:xfrm>
-          <a:prstGeom prst="rect">
-            <a:avLst/>
-          </a:prstGeom>
-        </p:spPr>
-      </p:pic>
-      <p:pic>
-        <p:nvPicPr>
-          <p:cNvPr id="26" name="Picture 25"/>
-          <p:cNvPicPr>
-            <a:picLocks noChangeAspect="1"/>
-          </p:cNvPicPr>
-          <p:nvPr/>
-        </p:nvPicPr>
-        <p:blipFill>
-          <a:blip r:embed="rId26">
-            <a:duotone>
-              <a:schemeClr val="accent5">
-                <a:shade val="45000"/>
-                <a:satMod val="135000"/>
-              </a:schemeClr>
-              <a:prstClr val="white"/>
-            </a:duotone>
-            <a:extLst>
-              <a:ext uri="{28A0092B-C50C-407E-A947-70E740481C1C}">
-                <a14:useLocalDpi xmlns:a14="http://schemas.microsoft.com/office/drawing/2010/main" val="0"/>
-              </a:ext>
-            </a:extLst>
-          </a:blip>
-          <a:stretch>
-            <a:fillRect/>
-          </a:stretch>
-        </p:blipFill>
-        <p:spPr>
-          <a:xfrm>
-            <a:off x="8737071" y="2463800"/>
-            <a:ext cx="1665130" cy="1930400"/>
-          </a:xfrm>
-          <a:prstGeom prst="rect">
-            <a:avLst/>
-          </a:prstGeom>
-        </p:spPr>
-      </p:pic>
-    </p:spTree>
-    <p:extLst>
-      <p:ext uri="{BB962C8B-B14F-4D97-AF65-F5344CB8AC3E}">
-        <p14:creationId xmlns:p14="http://schemas.microsoft.com/office/powerpoint/2010/main" val="213951777"/>
-      </p:ext>
-    </p:extLst>
-  </p:cSld>
-  <p:clrMapOvr>
-    <a:masterClrMapping/>
-  </p:clrMapOvr>
-  <p:timing>
-    <p:tnLst>
-      <p:par>
-        <p:cTn id="1" dur="indefinite" restart="never" nodeType="tmRoot"/>
-      </p:par>
-    </p:tnLst>
-  </p:timing>
-</p:sld>
-</file>
-
-<file path=ppt/slides/slide2.xml><?xml version="1.0" encoding="utf-8"?>
-<p:sld xmlns:a="http://schemas.openxmlformats.org/drawingml/2006/main" xmlns:r="http://schemas.openxmlformats.org/officeDocument/2006/relationships" xmlns:p="http://schemas.openxmlformats.org/presentationml/2006/main">
-  <p:cSld>
     <p:spTree>
       <p:nvGrpSpPr>
         <p:cNvPr id="1" name=""/>
@@ -4124,6 +3213,1400 @@
     <p:extLst>
       <p:ext uri="{BB962C8B-B14F-4D97-AF65-F5344CB8AC3E}">
         <p14:creationId xmlns:p14="http://schemas.microsoft.com/office/powerpoint/2010/main" val="547642128"/>
+      </p:ext>
+    </p:extLst>
+  </p:cSld>
+  <p:clrMapOvr>
+    <a:masterClrMapping/>
+  </p:clrMapOvr>
+  <p:timing>
+    <p:tnLst>
+      <p:par>
+        <p:cTn id="1" dur="indefinite" restart="never" nodeType="tmRoot"/>
+      </p:par>
+    </p:tnLst>
+  </p:timing>
+</p:sld>
+</file>
+
+<file path=ppt/slides/slide2.xml><?xml version="1.0" encoding="utf-8"?>
+<p:sld xmlns:a="http://schemas.openxmlformats.org/drawingml/2006/main" xmlns:r="http://schemas.openxmlformats.org/officeDocument/2006/relationships" xmlns:p="http://schemas.openxmlformats.org/presentationml/2006/main">
+  <p:cSld>
+    <p:bg>
+      <p:bgPr>
+        <a:solidFill>
+          <a:schemeClr val="tx1"/>
+        </a:solidFill>
+        <a:effectLst/>
+      </p:bgPr>
+    </p:bg>
+    <p:spTree>
+      <p:nvGrpSpPr>
+        <p:cNvPr id="1" name=""/>
+        <p:cNvGrpSpPr/>
+        <p:nvPr/>
+      </p:nvGrpSpPr>
+      <p:grpSpPr>
+        <a:xfrm>
+          <a:off x="0" y="0"/>
+          <a:ext cx="0" cy="0"/>
+          <a:chOff x="0" y="0"/>
+          <a:chExt cx="0" cy="0"/>
+        </a:xfrm>
+      </p:grpSpPr>
+      <p:pic>
+        <p:nvPicPr>
+          <p:cNvPr id="4" name="Picture 3"/>
+          <p:cNvPicPr>
+            <a:picLocks noChangeAspect="1"/>
+          </p:cNvPicPr>
+          <p:nvPr/>
+        </p:nvPicPr>
+        <p:blipFill>
+          <a:blip r:embed="rId2">
+            <a:extLst>
+              <a:ext uri="{28A0092B-C50C-407E-A947-70E740481C1C}">
+                <a14:useLocalDpi xmlns:a14="http://schemas.microsoft.com/office/drawing/2010/main" val="0"/>
+              </a:ext>
+            </a:extLst>
+          </a:blip>
+          <a:stretch>
+            <a:fillRect/>
+          </a:stretch>
+        </p:blipFill>
+        <p:spPr>
+          <a:xfrm>
+            <a:off x="5181600" y="2429934"/>
+            <a:ext cx="1828800" cy="1828800"/>
+          </a:xfrm>
+          <a:prstGeom prst="rect">
+            <a:avLst/>
+          </a:prstGeom>
+        </p:spPr>
+      </p:pic>
+      <p:pic>
+        <p:nvPicPr>
+          <p:cNvPr id="2" name="Picture 1"/>
+          <p:cNvPicPr>
+            <a:picLocks noChangeAspect="1"/>
+          </p:cNvPicPr>
+          <p:nvPr/>
+        </p:nvPicPr>
+        <p:blipFill>
+          <a:blip r:embed="rId3">
+            <a:duotone>
+              <a:prstClr val="black"/>
+              <a:schemeClr val="accent2">
+                <a:tint val="45000"/>
+                <a:satMod val="400000"/>
+              </a:schemeClr>
+            </a:duotone>
+            <a:extLst>
+              <a:ext uri="{28A0092B-C50C-407E-A947-70E740481C1C}">
+                <a14:useLocalDpi xmlns:a14="http://schemas.microsoft.com/office/drawing/2010/main" val="0"/>
+              </a:ext>
+            </a:extLst>
+          </a:blip>
+          <a:stretch>
+            <a:fillRect/>
+          </a:stretch>
+        </p:blipFill>
+        <p:spPr>
+          <a:xfrm>
+            <a:off x="741362" y="1210733"/>
+            <a:ext cx="304800" cy="203200"/>
+          </a:xfrm>
+          <a:prstGeom prst="rect">
+            <a:avLst/>
+          </a:prstGeom>
+        </p:spPr>
+      </p:pic>
+      <p:pic>
+        <p:nvPicPr>
+          <p:cNvPr id="3" name="Picture 2"/>
+          <p:cNvPicPr>
+            <a:picLocks noChangeAspect="1"/>
+          </p:cNvPicPr>
+          <p:nvPr/>
+        </p:nvPicPr>
+        <p:blipFill>
+          <a:blip r:embed="rId4">
+            <a:duotone>
+              <a:prstClr val="black"/>
+              <a:schemeClr val="accent2">
+                <a:tint val="45000"/>
+                <a:satMod val="400000"/>
+              </a:schemeClr>
+            </a:duotone>
+            <a:extLst>
+              <a:ext uri="{28A0092B-C50C-407E-A947-70E740481C1C}">
+                <a14:useLocalDpi xmlns:a14="http://schemas.microsoft.com/office/drawing/2010/main" val="0"/>
+              </a:ext>
+            </a:extLst>
+          </a:blip>
+          <a:stretch>
+            <a:fillRect/>
+          </a:stretch>
+        </p:blipFill>
+        <p:spPr>
+          <a:xfrm>
+            <a:off x="1534583" y="1007533"/>
+            <a:ext cx="609600" cy="406400"/>
+          </a:xfrm>
+          <a:prstGeom prst="rect">
+            <a:avLst/>
+          </a:prstGeom>
+        </p:spPr>
+      </p:pic>
+      <p:pic>
+        <p:nvPicPr>
+          <p:cNvPr id="5" name="Picture 4"/>
+          <p:cNvPicPr>
+            <a:picLocks noChangeAspect="1"/>
+          </p:cNvPicPr>
+          <p:nvPr/>
+        </p:nvPicPr>
+        <p:blipFill>
+          <a:blip r:embed="rId5">
+            <a:duotone>
+              <a:prstClr val="black"/>
+              <a:schemeClr val="accent2">
+                <a:tint val="45000"/>
+                <a:satMod val="400000"/>
+              </a:schemeClr>
+            </a:duotone>
+            <a:extLst>
+              <a:ext uri="{28A0092B-C50C-407E-A947-70E740481C1C}">
+                <a14:useLocalDpi xmlns:a14="http://schemas.microsoft.com/office/drawing/2010/main" val="0"/>
+              </a:ext>
+            </a:extLst>
+          </a:blip>
+          <a:stretch>
+            <a:fillRect/>
+          </a:stretch>
+        </p:blipFill>
+        <p:spPr>
+          <a:xfrm>
+            <a:off x="2632604" y="1210733"/>
+            <a:ext cx="304800" cy="203200"/>
+          </a:xfrm>
+          <a:prstGeom prst="rect">
+            <a:avLst/>
+          </a:prstGeom>
+        </p:spPr>
+      </p:pic>
+      <p:pic>
+        <p:nvPicPr>
+          <p:cNvPr id="6" name="Picture 5"/>
+          <p:cNvPicPr>
+            <a:picLocks noChangeAspect="1"/>
+          </p:cNvPicPr>
+          <p:nvPr/>
+        </p:nvPicPr>
+        <p:blipFill>
+          <a:blip r:embed="rId6">
+            <a:duotone>
+              <a:prstClr val="black"/>
+              <a:schemeClr val="accent2">
+                <a:tint val="45000"/>
+                <a:satMod val="400000"/>
+              </a:schemeClr>
+            </a:duotone>
+            <a:extLst>
+              <a:ext uri="{28A0092B-C50C-407E-A947-70E740481C1C}">
+                <a14:useLocalDpi xmlns:a14="http://schemas.microsoft.com/office/drawing/2010/main" val="0"/>
+              </a:ext>
+            </a:extLst>
+          </a:blip>
+          <a:stretch>
+            <a:fillRect/>
+          </a:stretch>
+        </p:blipFill>
+        <p:spPr>
+          <a:xfrm>
+            <a:off x="3425825" y="1007533"/>
+            <a:ext cx="609600" cy="406400"/>
+          </a:xfrm>
+          <a:prstGeom prst="rect">
+            <a:avLst/>
+          </a:prstGeom>
+        </p:spPr>
+      </p:pic>
+      <p:pic>
+        <p:nvPicPr>
+          <p:cNvPr id="7" name="Picture 6"/>
+          <p:cNvPicPr>
+            <a:picLocks noChangeAspect="1"/>
+          </p:cNvPicPr>
+          <p:nvPr/>
+        </p:nvPicPr>
+        <p:blipFill>
+          <a:blip r:embed="rId7">
+            <a:duotone>
+              <a:prstClr val="black"/>
+              <a:schemeClr val="accent6">
+                <a:tint val="45000"/>
+                <a:satMod val="400000"/>
+              </a:schemeClr>
+            </a:duotone>
+            <a:extLst>
+              <a:ext uri="{28A0092B-C50C-407E-A947-70E740481C1C}">
+                <a14:useLocalDpi xmlns:a14="http://schemas.microsoft.com/office/drawing/2010/main" val="0"/>
+              </a:ext>
+            </a:extLst>
+          </a:blip>
+          <a:stretch>
+            <a:fillRect/>
+          </a:stretch>
+        </p:blipFill>
+        <p:spPr>
+          <a:xfrm>
+            <a:off x="741362" y="1913467"/>
+            <a:ext cx="304800" cy="203200"/>
+          </a:xfrm>
+          <a:prstGeom prst="rect">
+            <a:avLst/>
+          </a:prstGeom>
+        </p:spPr>
+      </p:pic>
+      <p:pic>
+        <p:nvPicPr>
+          <p:cNvPr id="8" name="Picture 7"/>
+          <p:cNvPicPr>
+            <a:picLocks noChangeAspect="1"/>
+          </p:cNvPicPr>
+          <p:nvPr/>
+        </p:nvPicPr>
+        <p:blipFill>
+          <a:blip r:embed="rId8">
+            <a:duotone>
+              <a:prstClr val="black"/>
+              <a:schemeClr val="accent6">
+                <a:tint val="45000"/>
+                <a:satMod val="400000"/>
+              </a:schemeClr>
+            </a:duotone>
+            <a:extLst>
+              <a:ext uri="{28A0092B-C50C-407E-A947-70E740481C1C}">
+                <a14:useLocalDpi xmlns:a14="http://schemas.microsoft.com/office/drawing/2010/main" val="0"/>
+              </a:ext>
+            </a:extLst>
+          </a:blip>
+          <a:stretch>
+            <a:fillRect/>
+          </a:stretch>
+        </p:blipFill>
+        <p:spPr>
+          <a:xfrm>
+            <a:off x="1534583" y="1710267"/>
+            <a:ext cx="609600" cy="406400"/>
+          </a:xfrm>
+          <a:prstGeom prst="rect">
+            <a:avLst/>
+          </a:prstGeom>
+        </p:spPr>
+      </p:pic>
+      <p:pic>
+        <p:nvPicPr>
+          <p:cNvPr id="9" name="Picture 8"/>
+          <p:cNvPicPr>
+            <a:picLocks noChangeAspect="1"/>
+          </p:cNvPicPr>
+          <p:nvPr/>
+        </p:nvPicPr>
+        <p:blipFill>
+          <a:blip r:embed="rId9">
+            <a:duotone>
+              <a:prstClr val="black"/>
+              <a:schemeClr val="accent6">
+                <a:tint val="45000"/>
+                <a:satMod val="400000"/>
+              </a:schemeClr>
+            </a:duotone>
+            <a:extLst>
+              <a:ext uri="{28A0092B-C50C-407E-A947-70E740481C1C}">
+                <a14:useLocalDpi xmlns:a14="http://schemas.microsoft.com/office/drawing/2010/main" val="0"/>
+              </a:ext>
+            </a:extLst>
+          </a:blip>
+          <a:stretch>
+            <a:fillRect/>
+          </a:stretch>
+        </p:blipFill>
+        <p:spPr>
+          <a:xfrm>
+            <a:off x="2632604" y="1913467"/>
+            <a:ext cx="304800" cy="203200"/>
+          </a:xfrm>
+          <a:prstGeom prst="rect">
+            <a:avLst/>
+          </a:prstGeom>
+        </p:spPr>
+      </p:pic>
+      <p:pic>
+        <p:nvPicPr>
+          <p:cNvPr id="10" name="Picture 9"/>
+          <p:cNvPicPr>
+            <a:picLocks noChangeAspect="1"/>
+          </p:cNvPicPr>
+          <p:nvPr/>
+        </p:nvPicPr>
+        <p:blipFill>
+          <a:blip r:embed="rId10">
+            <a:duotone>
+              <a:prstClr val="black"/>
+              <a:schemeClr val="accent6">
+                <a:tint val="45000"/>
+                <a:satMod val="400000"/>
+              </a:schemeClr>
+            </a:duotone>
+            <a:extLst>
+              <a:ext uri="{28A0092B-C50C-407E-A947-70E740481C1C}">
+                <a14:useLocalDpi xmlns:a14="http://schemas.microsoft.com/office/drawing/2010/main" val="0"/>
+              </a:ext>
+            </a:extLst>
+          </a:blip>
+          <a:stretch>
+            <a:fillRect/>
+          </a:stretch>
+        </p:blipFill>
+        <p:spPr>
+          <a:xfrm>
+            <a:off x="3425825" y="1710267"/>
+            <a:ext cx="609600" cy="406400"/>
+          </a:xfrm>
+          <a:prstGeom prst="rect">
+            <a:avLst/>
+          </a:prstGeom>
+        </p:spPr>
+      </p:pic>
+      <p:pic>
+        <p:nvPicPr>
+          <p:cNvPr id="11" name="Picture 10"/>
+          <p:cNvPicPr>
+            <a:picLocks noChangeAspect="1"/>
+          </p:cNvPicPr>
+          <p:nvPr/>
+        </p:nvPicPr>
+        <p:blipFill>
+          <a:blip r:embed="rId11">
+            <a:duotone>
+              <a:prstClr val="black"/>
+              <a:schemeClr val="accent5">
+                <a:tint val="45000"/>
+                <a:satMod val="400000"/>
+              </a:schemeClr>
+            </a:duotone>
+            <a:extLst>
+              <a:ext uri="{28A0092B-C50C-407E-A947-70E740481C1C}">
+                <a14:useLocalDpi xmlns:a14="http://schemas.microsoft.com/office/drawing/2010/main" val="0"/>
+              </a:ext>
+            </a:extLst>
+          </a:blip>
+          <a:stretch>
+            <a:fillRect/>
+          </a:stretch>
+        </p:blipFill>
+        <p:spPr>
+          <a:xfrm>
+            <a:off x="741362" y="2616201"/>
+            <a:ext cx="304800" cy="203200"/>
+          </a:xfrm>
+          <a:prstGeom prst="rect">
+            <a:avLst/>
+          </a:prstGeom>
+        </p:spPr>
+      </p:pic>
+      <p:pic>
+        <p:nvPicPr>
+          <p:cNvPr id="12" name="Picture 11"/>
+          <p:cNvPicPr>
+            <a:picLocks noChangeAspect="1"/>
+          </p:cNvPicPr>
+          <p:nvPr/>
+        </p:nvPicPr>
+        <p:blipFill>
+          <a:blip r:embed="rId12">
+            <a:duotone>
+              <a:prstClr val="black"/>
+              <a:schemeClr val="accent5">
+                <a:tint val="45000"/>
+                <a:satMod val="400000"/>
+              </a:schemeClr>
+            </a:duotone>
+            <a:extLst>
+              <a:ext uri="{28A0092B-C50C-407E-A947-70E740481C1C}">
+                <a14:useLocalDpi xmlns:a14="http://schemas.microsoft.com/office/drawing/2010/main" val="0"/>
+              </a:ext>
+            </a:extLst>
+          </a:blip>
+          <a:stretch>
+            <a:fillRect/>
+          </a:stretch>
+        </p:blipFill>
+        <p:spPr>
+          <a:xfrm>
+            <a:off x="1534583" y="2413001"/>
+            <a:ext cx="609600" cy="406400"/>
+          </a:xfrm>
+          <a:prstGeom prst="rect">
+            <a:avLst/>
+          </a:prstGeom>
+        </p:spPr>
+      </p:pic>
+      <p:pic>
+        <p:nvPicPr>
+          <p:cNvPr id="13" name="Picture 12"/>
+          <p:cNvPicPr>
+            <a:picLocks noChangeAspect="1"/>
+          </p:cNvPicPr>
+          <p:nvPr/>
+        </p:nvPicPr>
+        <p:blipFill>
+          <a:blip r:embed="rId13">
+            <a:duotone>
+              <a:prstClr val="black"/>
+              <a:schemeClr val="accent5">
+                <a:tint val="45000"/>
+                <a:satMod val="400000"/>
+              </a:schemeClr>
+            </a:duotone>
+            <a:extLst>
+              <a:ext uri="{28A0092B-C50C-407E-A947-70E740481C1C}">
+                <a14:useLocalDpi xmlns:a14="http://schemas.microsoft.com/office/drawing/2010/main" val="0"/>
+              </a:ext>
+            </a:extLst>
+          </a:blip>
+          <a:stretch>
+            <a:fillRect/>
+          </a:stretch>
+        </p:blipFill>
+        <p:spPr>
+          <a:xfrm>
+            <a:off x="2632604" y="2616201"/>
+            <a:ext cx="304800" cy="203200"/>
+          </a:xfrm>
+          <a:prstGeom prst="rect">
+            <a:avLst/>
+          </a:prstGeom>
+        </p:spPr>
+      </p:pic>
+      <p:pic>
+        <p:nvPicPr>
+          <p:cNvPr id="14" name="Picture 13"/>
+          <p:cNvPicPr>
+            <a:picLocks noChangeAspect="1"/>
+          </p:cNvPicPr>
+          <p:nvPr/>
+        </p:nvPicPr>
+        <p:blipFill>
+          <a:blip r:embed="rId14">
+            <a:duotone>
+              <a:prstClr val="black"/>
+              <a:schemeClr val="accent5">
+                <a:tint val="45000"/>
+                <a:satMod val="400000"/>
+              </a:schemeClr>
+            </a:duotone>
+            <a:extLst>
+              <a:ext uri="{28A0092B-C50C-407E-A947-70E740481C1C}">
+                <a14:useLocalDpi xmlns:a14="http://schemas.microsoft.com/office/drawing/2010/main" val="0"/>
+              </a:ext>
+            </a:extLst>
+          </a:blip>
+          <a:stretch>
+            <a:fillRect/>
+          </a:stretch>
+        </p:blipFill>
+        <p:spPr>
+          <a:xfrm>
+            <a:off x="3425825" y="2413001"/>
+            <a:ext cx="609600" cy="406400"/>
+          </a:xfrm>
+          <a:prstGeom prst="rect">
+            <a:avLst/>
+          </a:prstGeom>
+        </p:spPr>
+      </p:pic>
+      <p:pic>
+        <p:nvPicPr>
+          <p:cNvPr id="15" name="Picture 14"/>
+          <p:cNvPicPr>
+            <a:picLocks noChangeAspect="1"/>
+          </p:cNvPicPr>
+          <p:nvPr/>
+        </p:nvPicPr>
+        <p:blipFill>
+          <a:blip r:embed="rId15">
+            <a:duotone>
+              <a:prstClr val="black"/>
+              <a:schemeClr val="accent1">
+                <a:tint val="45000"/>
+                <a:satMod val="400000"/>
+              </a:schemeClr>
+            </a:duotone>
+            <a:extLst>
+              <a:ext uri="{28A0092B-C50C-407E-A947-70E740481C1C}">
+                <a14:useLocalDpi xmlns:a14="http://schemas.microsoft.com/office/drawing/2010/main" val="0"/>
+              </a:ext>
+            </a:extLst>
+          </a:blip>
+          <a:stretch>
+            <a:fillRect/>
+          </a:stretch>
+        </p:blipFill>
+        <p:spPr>
+          <a:xfrm>
+            <a:off x="703262" y="3632200"/>
+            <a:ext cx="381000" cy="203200"/>
+          </a:xfrm>
+          <a:prstGeom prst="rect">
+            <a:avLst/>
+          </a:prstGeom>
+        </p:spPr>
+      </p:pic>
+      <p:pic>
+        <p:nvPicPr>
+          <p:cNvPr id="16" name="Picture 15"/>
+          <p:cNvPicPr>
+            <a:picLocks noChangeAspect="1"/>
+          </p:cNvPicPr>
+          <p:nvPr/>
+        </p:nvPicPr>
+        <p:blipFill>
+          <a:blip r:embed="rId16">
+            <a:duotone>
+              <a:prstClr val="black"/>
+              <a:schemeClr val="accent1">
+                <a:tint val="45000"/>
+                <a:satMod val="400000"/>
+              </a:schemeClr>
+            </a:duotone>
+            <a:extLst>
+              <a:ext uri="{28A0092B-C50C-407E-A947-70E740481C1C}">
+                <a14:useLocalDpi xmlns:a14="http://schemas.microsoft.com/office/drawing/2010/main" val="0"/>
+              </a:ext>
+            </a:extLst>
+          </a:blip>
+          <a:stretch>
+            <a:fillRect/>
+          </a:stretch>
+        </p:blipFill>
+        <p:spPr>
+          <a:xfrm>
+            <a:off x="1458383" y="3429000"/>
+            <a:ext cx="762000" cy="406400"/>
+          </a:xfrm>
+          <a:prstGeom prst="rect">
+            <a:avLst/>
+          </a:prstGeom>
+        </p:spPr>
+      </p:pic>
+      <p:pic>
+        <p:nvPicPr>
+          <p:cNvPr id="17" name="Picture 16"/>
+          <p:cNvPicPr>
+            <a:picLocks noChangeAspect="1"/>
+          </p:cNvPicPr>
+          <p:nvPr/>
+        </p:nvPicPr>
+        <p:blipFill>
+          <a:blip r:embed="rId17">
+            <a:extLst>
+              <a:ext uri="{28A0092B-C50C-407E-A947-70E740481C1C}">
+                <a14:useLocalDpi xmlns:a14="http://schemas.microsoft.com/office/drawing/2010/main" val="0"/>
+              </a:ext>
+            </a:extLst>
+          </a:blip>
+          <a:stretch>
+            <a:fillRect/>
+          </a:stretch>
+        </p:blipFill>
+        <p:spPr>
+          <a:xfrm>
+            <a:off x="10820400" y="5448300"/>
+            <a:ext cx="1054100" cy="1054100"/>
+          </a:xfrm>
+          <a:prstGeom prst="rect">
+            <a:avLst/>
+          </a:prstGeom>
+        </p:spPr>
+      </p:pic>
+      <p:pic>
+        <p:nvPicPr>
+          <p:cNvPr id="18" name="Picture 17"/>
+          <p:cNvPicPr>
+            <a:picLocks noChangeAspect="1"/>
+          </p:cNvPicPr>
+          <p:nvPr/>
+        </p:nvPicPr>
+        <p:blipFill>
+          <a:blip r:embed="rId18">
+            <a:extLst>
+              <a:ext uri="{28A0092B-C50C-407E-A947-70E740481C1C}">
+                <a14:useLocalDpi xmlns:a14="http://schemas.microsoft.com/office/drawing/2010/main" val="0"/>
+              </a:ext>
+            </a:extLst>
+          </a:blip>
+          <a:stretch>
+            <a:fillRect/>
+          </a:stretch>
+        </p:blipFill>
+        <p:spPr>
+          <a:xfrm>
+            <a:off x="9683750" y="5448300"/>
+            <a:ext cx="1054100" cy="1054100"/>
+          </a:xfrm>
+          <a:prstGeom prst="rect">
+            <a:avLst/>
+          </a:prstGeom>
+        </p:spPr>
+      </p:pic>
+      <p:pic>
+        <p:nvPicPr>
+          <p:cNvPr id="19" name="Picture 18"/>
+          <p:cNvPicPr>
+            <a:picLocks noChangeAspect="1"/>
+          </p:cNvPicPr>
+          <p:nvPr/>
+        </p:nvPicPr>
+        <p:blipFill>
+          <a:blip r:embed="rId19">
+            <a:extLst>
+              <a:ext uri="{28A0092B-C50C-407E-A947-70E740481C1C}">
+                <a14:useLocalDpi xmlns:a14="http://schemas.microsoft.com/office/drawing/2010/main" val="0"/>
+              </a:ext>
+            </a:extLst>
+          </a:blip>
+          <a:stretch>
+            <a:fillRect/>
+          </a:stretch>
+        </p:blipFill>
+        <p:spPr>
+          <a:xfrm>
+            <a:off x="8293100" y="5448300"/>
+            <a:ext cx="1054100" cy="1054100"/>
+          </a:xfrm>
+          <a:prstGeom prst="rect">
+            <a:avLst/>
+          </a:prstGeom>
+        </p:spPr>
+      </p:pic>
+      <p:pic>
+        <p:nvPicPr>
+          <p:cNvPr id="20" name="Picture 19"/>
+          <p:cNvPicPr>
+            <a:picLocks noChangeAspect="1"/>
+          </p:cNvPicPr>
+          <p:nvPr/>
+        </p:nvPicPr>
+        <p:blipFill>
+          <a:blip r:embed="rId20">
+            <a:extLst>
+              <a:ext uri="{28A0092B-C50C-407E-A947-70E740481C1C}">
+                <a14:useLocalDpi xmlns:a14="http://schemas.microsoft.com/office/drawing/2010/main" val="0"/>
+              </a:ext>
+            </a:extLst>
+          </a:blip>
+          <a:stretch>
+            <a:fillRect/>
+          </a:stretch>
+        </p:blipFill>
+        <p:spPr>
+          <a:xfrm>
+            <a:off x="176212" y="5448300"/>
+            <a:ext cx="1054100" cy="1054100"/>
+          </a:xfrm>
+          <a:prstGeom prst="rect">
+            <a:avLst/>
+          </a:prstGeom>
+        </p:spPr>
+      </p:pic>
+      <p:pic>
+        <p:nvPicPr>
+          <p:cNvPr id="21" name="Picture 20"/>
+          <p:cNvPicPr>
+            <a:picLocks noChangeAspect="1"/>
+          </p:cNvPicPr>
+          <p:nvPr/>
+        </p:nvPicPr>
+        <p:blipFill>
+          <a:blip r:embed="rId21">
+            <a:extLst>
+              <a:ext uri="{28A0092B-C50C-407E-A947-70E740481C1C}">
+                <a14:useLocalDpi xmlns:a14="http://schemas.microsoft.com/office/drawing/2010/main" val="0"/>
+              </a:ext>
+            </a:extLst>
+          </a:blip>
+          <a:stretch>
+            <a:fillRect/>
+          </a:stretch>
+        </p:blipFill>
+        <p:spPr>
+          <a:xfrm>
+            <a:off x="8491770" y="304800"/>
+            <a:ext cx="1710859" cy="1536700"/>
+          </a:xfrm>
+          <a:prstGeom prst="rect">
+            <a:avLst/>
+          </a:prstGeom>
+        </p:spPr>
+      </p:pic>
+      <p:pic>
+        <p:nvPicPr>
+          <p:cNvPr id="22" name="Picture 21"/>
+          <p:cNvPicPr>
+            <a:picLocks noChangeAspect="1"/>
+          </p:cNvPicPr>
+          <p:nvPr/>
+        </p:nvPicPr>
+        <p:blipFill>
+          <a:blip r:embed="rId22">
+            <a:extLst>
+              <a:ext uri="{28A0092B-C50C-407E-A947-70E740481C1C}">
+                <a14:useLocalDpi xmlns:a14="http://schemas.microsoft.com/office/drawing/2010/main" val="0"/>
+              </a:ext>
+            </a:extLst>
+          </a:blip>
+          <a:stretch>
+            <a:fillRect/>
+          </a:stretch>
+        </p:blipFill>
+        <p:spPr>
+          <a:xfrm>
+            <a:off x="6311900" y="300566"/>
+            <a:ext cx="1981200" cy="1555593"/>
+          </a:xfrm>
+          <a:prstGeom prst="rect">
+            <a:avLst/>
+          </a:prstGeom>
+        </p:spPr>
+      </p:pic>
+      <p:pic>
+        <p:nvPicPr>
+          <p:cNvPr id="23" name="Picture 22"/>
+          <p:cNvPicPr>
+            <a:picLocks noChangeAspect="1"/>
+          </p:cNvPicPr>
+          <p:nvPr/>
+        </p:nvPicPr>
+        <p:blipFill>
+          <a:blip r:embed="rId23">
+            <a:extLst>
+              <a:ext uri="{28A0092B-C50C-407E-A947-70E740481C1C}">
+                <a14:useLocalDpi xmlns:a14="http://schemas.microsoft.com/office/drawing/2010/main" val="0"/>
+              </a:ext>
+            </a:extLst>
+          </a:blip>
+          <a:stretch>
+            <a:fillRect/>
+          </a:stretch>
+        </p:blipFill>
+        <p:spPr>
+          <a:xfrm>
+            <a:off x="10308787" y="304800"/>
+            <a:ext cx="1536700" cy="1536700"/>
+          </a:xfrm>
+          <a:prstGeom prst="rect">
+            <a:avLst/>
+          </a:prstGeom>
+        </p:spPr>
+      </p:pic>
+      <p:pic>
+        <p:nvPicPr>
+          <p:cNvPr id="24" name="Picture 23"/>
+          <p:cNvPicPr>
+            <a:picLocks noChangeAspect="1"/>
+          </p:cNvPicPr>
+          <p:nvPr/>
+        </p:nvPicPr>
+        <p:blipFill>
+          <a:blip r:embed="rId24">
+            <a:duotone>
+              <a:schemeClr val="accent5">
+                <a:shade val="45000"/>
+                <a:satMod val="135000"/>
+              </a:schemeClr>
+              <a:prstClr val="white"/>
+            </a:duotone>
+            <a:extLst>
+              <a:ext uri="{28A0092B-C50C-407E-A947-70E740481C1C}">
+                <a14:useLocalDpi xmlns:a14="http://schemas.microsoft.com/office/drawing/2010/main" val="0"/>
+              </a:ext>
+            </a:extLst>
+          </a:blip>
+          <a:stretch>
+            <a:fillRect/>
+          </a:stretch>
+        </p:blipFill>
+        <p:spPr>
+          <a:xfrm>
+            <a:off x="5383976" y="5448299"/>
+            <a:ext cx="1118755" cy="1079501"/>
+          </a:xfrm>
+          <a:prstGeom prst="rect">
+            <a:avLst/>
+          </a:prstGeom>
+        </p:spPr>
+      </p:pic>
+      <p:pic>
+        <p:nvPicPr>
+          <p:cNvPr id="25" name="Picture 24"/>
+          <p:cNvPicPr>
+            <a:picLocks noChangeAspect="1"/>
+          </p:cNvPicPr>
+          <p:nvPr/>
+        </p:nvPicPr>
+        <p:blipFill>
+          <a:blip r:embed="rId25">
+            <a:duotone>
+              <a:schemeClr val="accent5">
+                <a:shade val="45000"/>
+                <a:satMod val="135000"/>
+              </a:schemeClr>
+              <a:prstClr val="white"/>
+            </a:duotone>
+            <a:extLst>
+              <a:ext uri="{28A0092B-C50C-407E-A947-70E740481C1C}">
+                <a14:useLocalDpi xmlns:a14="http://schemas.microsoft.com/office/drawing/2010/main" val="0"/>
+              </a:ext>
+            </a:extLst>
+          </a:blip>
+          <a:stretch>
+            <a:fillRect/>
+          </a:stretch>
+        </p:blipFill>
+        <p:spPr>
+          <a:xfrm>
+            <a:off x="7007706" y="5448299"/>
+            <a:ext cx="780419" cy="1079501"/>
+          </a:xfrm>
+          <a:prstGeom prst="rect">
+            <a:avLst/>
+          </a:prstGeom>
+        </p:spPr>
+      </p:pic>
+      <p:pic>
+        <p:nvPicPr>
+          <p:cNvPr id="26" name="Picture 25"/>
+          <p:cNvPicPr>
+            <a:picLocks noChangeAspect="1"/>
+          </p:cNvPicPr>
+          <p:nvPr/>
+        </p:nvPicPr>
+        <p:blipFill>
+          <a:blip r:embed="rId26">
+            <a:duotone>
+              <a:schemeClr val="accent5">
+                <a:shade val="45000"/>
+                <a:satMod val="135000"/>
+              </a:schemeClr>
+              <a:prstClr val="white"/>
+            </a:duotone>
+            <a:extLst>
+              <a:ext uri="{28A0092B-C50C-407E-A947-70E740481C1C}">
+                <a14:useLocalDpi xmlns:a14="http://schemas.microsoft.com/office/drawing/2010/main" val="0"/>
+              </a:ext>
+            </a:extLst>
+          </a:blip>
+          <a:stretch>
+            <a:fillRect/>
+          </a:stretch>
+        </p:blipFill>
+        <p:spPr>
+          <a:xfrm>
+            <a:off x="8737071" y="2463800"/>
+            <a:ext cx="1665130" cy="1930400"/>
+          </a:xfrm>
+          <a:prstGeom prst="rect">
+            <a:avLst/>
+          </a:prstGeom>
+        </p:spPr>
+      </p:pic>
+    </p:spTree>
+    <p:extLst>
+      <p:ext uri="{BB962C8B-B14F-4D97-AF65-F5344CB8AC3E}">
+        <p14:creationId xmlns:p14="http://schemas.microsoft.com/office/powerpoint/2010/main" val="213951777"/>
+      </p:ext>
+    </p:extLst>
+  </p:cSld>
+  <p:clrMapOvr>
+    <a:masterClrMapping/>
+  </p:clrMapOvr>
+  <p:timing>
+    <p:tnLst>
+      <p:par>
+        <p:cTn id="1" dur="indefinite" restart="never" nodeType="tmRoot"/>
+      </p:par>
+    </p:tnLst>
+  </p:timing>
+</p:sld>
+</file>
+
+<file path=ppt/slides/slide3.xml><?xml version="1.0" encoding="utf-8"?>
+<p:sld xmlns:a="http://schemas.openxmlformats.org/drawingml/2006/main" xmlns:r="http://schemas.openxmlformats.org/officeDocument/2006/relationships" xmlns:p="http://schemas.openxmlformats.org/presentationml/2006/main">
+  <p:cSld>
+    <p:bg>
+      <p:bgPr>
+        <a:solidFill>
+          <a:schemeClr val="tx1"/>
+        </a:solidFill>
+        <a:effectLst/>
+      </p:bgPr>
+    </p:bg>
+    <p:spTree>
+      <p:nvGrpSpPr>
+        <p:cNvPr id="1" name=""/>
+        <p:cNvGrpSpPr/>
+        <p:nvPr/>
+      </p:nvGrpSpPr>
+      <p:grpSpPr>
+        <a:xfrm>
+          <a:off x="0" y="0"/>
+          <a:ext cx="0" cy="0"/>
+          <a:chOff x="0" y="0"/>
+          <a:chExt cx="0" cy="0"/>
+        </a:xfrm>
+      </p:grpSpPr>
+      <p:pic>
+        <p:nvPicPr>
+          <p:cNvPr id="2" name="Picture 1"/>
+          <p:cNvPicPr>
+            <a:picLocks noChangeAspect="1"/>
+          </p:cNvPicPr>
+          <p:nvPr/>
+        </p:nvPicPr>
+        <p:blipFill>
+          <a:blip r:embed="rId2">
+            <a:extLst>
+              <a:ext uri="{28A0092B-C50C-407E-A947-70E740481C1C}">
+                <a14:useLocalDpi xmlns:a14="http://schemas.microsoft.com/office/drawing/2010/main" val="0"/>
+              </a:ext>
+            </a:extLst>
+          </a:blip>
+          <a:stretch>
+            <a:fillRect/>
+          </a:stretch>
+        </p:blipFill>
+        <p:spPr>
+          <a:xfrm>
+            <a:off x="4191000" y="2743200"/>
+            <a:ext cx="3810000" cy="1371600"/>
+          </a:xfrm>
+          <a:prstGeom prst="rect">
+            <a:avLst/>
+          </a:prstGeom>
+        </p:spPr>
+      </p:pic>
+      <p:sp>
+        <p:nvSpPr>
+          <p:cNvPr id="3" name="Rounded Rectangle 2"/>
+          <p:cNvSpPr/>
+          <p:nvPr/>
+        </p:nvSpPr>
+        <p:spPr>
+          <a:xfrm>
+            <a:off x="4191000" y="2743200"/>
+            <a:ext cx="3810000" cy="1371600"/>
+          </a:xfrm>
+          <a:prstGeom prst="roundRect">
+            <a:avLst/>
+          </a:prstGeom>
+          <a:gradFill flip="none" rotWithShape="1">
+            <a:gsLst>
+              <a:gs pos="0">
+                <a:schemeClr val="accent1">
+                  <a:lumMod val="89000"/>
+                </a:schemeClr>
+              </a:gs>
+              <a:gs pos="23000">
+                <a:schemeClr val="accent1">
+                  <a:lumMod val="89000"/>
+                </a:schemeClr>
+              </a:gs>
+              <a:gs pos="69000">
+                <a:schemeClr val="accent1">
+                  <a:lumMod val="75000"/>
+                </a:schemeClr>
+              </a:gs>
+              <a:gs pos="97000">
+                <a:schemeClr val="accent1">
+                  <a:lumMod val="70000"/>
+                </a:schemeClr>
+              </a:gs>
+            </a:gsLst>
+            <a:path path="circle">
+              <a:fillToRect l="50000" t="50000" r="50000" b="50000"/>
+            </a:path>
+            <a:tileRect/>
+          </a:gradFill>
+          <a:ln w="63500">
+            <a:noFill/>
+          </a:ln>
+          <a:scene3d>
+            <a:camera prst="orthographicFront"/>
+            <a:lightRig rig="threePt" dir="t"/>
+          </a:scene3d>
+          <a:sp3d>
+            <a:bevelT w="114300" prst="artDeco"/>
+          </a:sp3d>
+        </p:spPr>
+        <p:style>
+          <a:lnRef idx="2">
+            <a:schemeClr val="accent1">
+              <a:shade val="50000"/>
+            </a:schemeClr>
+          </a:lnRef>
+          <a:fillRef idx="1">
+            <a:schemeClr val="accent1"/>
+          </a:fillRef>
+          <a:effectRef idx="0">
+            <a:schemeClr val="accent1"/>
+          </a:effectRef>
+          <a:fontRef idx="minor">
+            <a:schemeClr val="lt1"/>
+          </a:fontRef>
+        </p:style>
+        <p:txBody>
+          <a:bodyPr rtlCol="0" anchor="ctr"/>
+          <a:lstStyle/>
+          <a:p>
+            <a:pPr algn="ctr"/>
+            <a:endParaRPr lang="en-US"/>
+          </a:p>
+        </p:txBody>
+      </p:sp>
+    </p:spTree>
+    <p:extLst>
+      <p:ext uri="{BB962C8B-B14F-4D97-AF65-F5344CB8AC3E}">
+        <p14:creationId xmlns:p14="http://schemas.microsoft.com/office/powerpoint/2010/main" val="1916452006"/>
+      </p:ext>
+    </p:extLst>
+  </p:cSld>
+  <p:clrMapOvr>
+    <a:masterClrMapping/>
+  </p:clrMapOvr>
+  <p:timing>
+    <p:tnLst>
+      <p:par>
+        <p:cTn id="1" dur="indefinite" restart="never" nodeType="tmRoot"/>
+      </p:par>
+    </p:tnLst>
+  </p:timing>
+</p:sld>
+</file>
+
+<file path=ppt/slides/slide4.xml><?xml version="1.0" encoding="utf-8"?>
+<p:sld xmlns:a="http://schemas.openxmlformats.org/drawingml/2006/main" xmlns:r="http://schemas.openxmlformats.org/officeDocument/2006/relationships" xmlns:p="http://schemas.openxmlformats.org/presentationml/2006/main">
+  <p:cSld>
+    <p:bg>
+      <p:bgPr>
+        <a:solidFill>
+          <a:schemeClr val="tx1"/>
+        </a:solidFill>
+        <a:effectLst/>
+      </p:bgPr>
+    </p:bg>
+    <p:spTree>
+      <p:nvGrpSpPr>
+        <p:cNvPr id="1" name=""/>
+        <p:cNvGrpSpPr/>
+        <p:nvPr/>
+      </p:nvGrpSpPr>
+      <p:grpSpPr>
+        <a:xfrm>
+          <a:off x="0" y="0"/>
+          <a:ext cx="0" cy="0"/>
+          <a:chOff x="0" y="0"/>
+          <a:chExt cx="0" cy="0"/>
+        </a:xfrm>
+      </p:grpSpPr>
+      <p:sp>
+        <p:nvSpPr>
+          <p:cNvPr id="4" name="Rounded Rectangle 3"/>
+          <p:cNvSpPr/>
+          <p:nvPr/>
+        </p:nvSpPr>
+        <p:spPr>
+          <a:xfrm>
+            <a:off x="0" y="1638300"/>
+            <a:ext cx="12192000" cy="3568700"/>
+          </a:xfrm>
+          <a:prstGeom prst="roundRect">
+            <a:avLst/>
+          </a:prstGeom>
+          <a:gradFill flip="none" rotWithShape="1">
+            <a:gsLst>
+              <a:gs pos="0">
+                <a:schemeClr val="accent6">
+                  <a:lumMod val="89000"/>
+                </a:schemeClr>
+              </a:gs>
+              <a:gs pos="23000">
+                <a:schemeClr val="accent6">
+                  <a:lumMod val="89000"/>
+                </a:schemeClr>
+              </a:gs>
+              <a:gs pos="69000">
+                <a:schemeClr val="accent6">
+                  <a:lumMod val="75000"/>
+                </a:schemeClr>
+              </a:gs>
+              <a:gs pos="97000">
+                <a:schemeClr val="accent6">
+                  <a:lumMod val="70000"/>
+                </a:schemeClr>
+              </a:gs>
+            </a:gsLst>
+            <a:path path="circle">
+              <a:fillToRect l="50000" t="50000" r="50000" b="50000"/>
+            </a:path>
+            <a:tileRect/>
+          </a:gradFill>
+          <a:ln>
+            <a:noFill/>
+          </a:ln>
+          <a:scene3d>
+            <a:camera prst="orthographicFront"/>
+            <a:lightRig rig="threePt" dir="t"/>
+          </a:scene3d>
+          <a:sp3d>
+            <a:bevelT w="114300" prst="artDeco"/>
+          </a:sp3d>
+        </p:spPr>
+        <p:style>
+          <a:lnRef idx="2">
+            <a:schemeClr val="accent1">
+              <a:shade val="50000"/>
+            </a:schemeClr>
+          </a:lnRef>
+          <a:fillRef idx="1">
+            <a:schemeClr val="accent1"/>
+          </a:fillRef>
+          <a:effectRef idx="0">
+            <a:schemeClr val="accent1"/>
+          </a:effectRef>
+          <a:fontRef idx="minor">
+            <a:schemeClr val="lt1"/>
+          </a:fontRef>
+        </p:style>
+        <p:txBody>
+          <a:bodyPr rtlCol="0" anchor="ctr"/>
+          <a:lstStyle/>
+          <a:p>
+            <a:pPr algn="ctr"/>
+            <a:r>
+              <a:rPr lang="en-US" sz="13800" b="1" dirty="0" smtClean="0">
+                <a:effectLst>
+                  <a:innerShdw blurRad="63500" dist="50800" dir="13500000">
+                    <a:prstClr val="black">
+                      <a:alpha val="50000"/>
+                    </a:prstClr>
+                  </a:innerShdw>
+                </a:effectLst>
+                <a:latin typeface="Optima" charset="0"/>
+                <a:ea typeface="Optima" charset="0"/>
+                <a:cs typeface="Optima" charset="0"/>
+              </a:rPr>
+              <a:t>Great Job!</a:t>
+            </a:r>
+            <a:br>
+              <a:rPr lang="en-US" sz="13800" b="1" dirty="0" smtClean="0">
+                <a:effectLst>
+                  <a:innerShdw blurRad="63500" dist="50800" dir="13500000">
+                    <a:prstClr val="black">
+                      <a:alpha val="50000"/>
+                    </a:prstClr>
+                  </a:innerShdw>
+                </a:effectLst>
+                <a:latin typeface="Optima" charset="0"/>
+                <a:ea typeface="Optima" charset="0"/>
+                <a:cs typeface="Optima" charset="0"/>
+              </a:rPr>
+            </a:br>
+            <a:r>
+              <a:rPr lang="en-US" sz="7200" b="1" dirty="0" smtClean="0">
+                <a:effectLst>
+                  <a:innerShdw blurRad="63500" dist="50800" dir="13500000">
+                    <a:prstClr val="black">
+                      <a:alpha val="50000"/>
+                    </a:prstClr>
+                  </a:innerShdw>
+                </a:effectLst>
+                <a:latin typeface="Optima" charset="0"/>
+                <a:ea typeface="Optima" charset="0"/>
+                <a:cs typeface="Optima" charset="0"/>
+              </a:rPr>
+              <a:t>Level Complete</a:t>
+            </a:r>
+            <a:endParaRPr lang="en-US" sz="11500" b="1" dirty="0">
+              <a:effectLst>
+                <a:innerShdw blurRad="63500" dist="50800" dir="13500000">
+                  <a:prstClr val="black">
+                    <a:alpha val="50000"/>
+                  </a:prstClr>
+                </a:innerShdw>
+              </a:effectLst>
+              <a:latin typeface="Optima" charset="0"/>
+              <a:ea typeface="Optima" charset="0"/>
+              <a:cs typeface="Optima" charset="0"/>
+            </a:endParaRPr>
+          </a:p>
+        </p:txBody>
+      </p:sp>
+    </p:spTree>
+    <p:extLst>
+      <p:ext uri="{BB962C8B-B14F-4D97-AF65-F5344CB8AC3E}">
+        <p14:creationId xmlns:p14="http://schemas.microsoft.com/office/powerpoint/2010/main" val="792246136"/>
+      </p:ext>
+    </p:extLst>
+  </p:cSld>
+  <p:clrMapOvr>
+    <a:masterClrMapping/>
+  </p:clrMapOvr>
+  <p:timing>
+    <p:tnLst>
+      <p:par>
+        <p:cTn id="1" dur="indefinite" restart="never" nodeType="tmRoot"/>
+      </p:par>
+    </p:tnLst>
+  </p:timing>
+</p:sld>
+</file>
+
+<file path=ppt/slides/slide5.xml><?xml version="1.0" encoding="utf-8"?>
+<p:sld xmlns:a="http://schemas.openxmlformats.org/drawingml/2006/main" xmlns:r="http://schemas.openxmlformats.org/officeDocument/2006/relationships" xmlns:p="http://schemas.openxmlformats.org/presentationml/2006/main">
+  <p:cSld>
+    <p:bg>
+      <p:bgPr>
+        <a:solidFill>
+          <a:schemeClr val="tx1"/>
+        </a:solidFill>
+        <a:effectLst/>
+      </p:bgPr>
+    </p:bg>
+    <p:spTree>
+      <p:nvGrpSpPr>
+        <p:cNvPr id="1" name=""/>
+        <p:cNvGrpSpPr/>
+        <p:nvPr/>
+      </p:nvGrpSpPr>
+      <p:grpSpPr>
+        <a:xfrm>
+          <a:off x="0" y="0"/>
+          <a:ext cx="0" cy="0"/>
+          <a:chOff x="0" y="0"/>
+          <a:chExt cx="0" cy="0"/>
+        </a:xfrm>
+      </p:grpSpPr>
+      <p:sp>
+        <p:nvSpPr>
+          <p:cNvPr id="2" name="Rounded Rectangle 1"/>
+          <p:cNvSpPr/>
+          <p:nvPr/>
+        </p:nvSpPr>
+        <p:spPr>
+          <a:xfrm>
+            <a:off x="0" y="1638300"/>
+            <a:ext cx="12192000" cy="3568700"/>
+          </a:xfrm>
+          <a:prstGeom prst="roundRect">
+            <a:avLst/>
+          </a:prstGeom>
+          <a:gradFill flip="none" rotWithShape="1">
+            <a:gsLst>
+              <a:gs pos="0">
+                <a:schemeClr val="accent4">
+                  <a:lumMod val="89000"/>
+                </a:schemeClr>
+              </a:gs>
+              <a:gs pos="23000">
+                <a:schemeClr val="accent4">
+                  <a:lumMod val="89000"/>
+                </a:schemeClr>
+              </a:gs>
+              <a:gs pos="69000">
+                <a:schemeClr val="accent4">
+                  <a:lumMod val="75000"/>
+                </a:schemeClr>
+              </a:gs>
+              <a:gs pos="97000">
+                <a:schemeClr val="accent4">
+                  <a:lumMod val="70000"/>
+                </a:schemeClr>
+              </a:gs>
+            </a:gsLst>
+            <a:path path="rect">
+              <a:fillToRect l="100000" t="100000"/>
+            </a:path>
+            <a:tileRect r="-100000" b="-100000"/>
+          </a:gradFill>
+          <a:ln>
+            <a:noFill/>
+          </a:ln>
+          <a:scene3d>
+            <a:camera prst="orthographicFront"/>
+            <a:lightRig rig="threePt" dir="t"/>
+          </a:scene3d>
+          <a:sp3d>
+            <a:bevelT w="114300" prst="artDeco"/>
+          </a:sp3d>
+        </p:spPr>
+        <p:style>
+          <a:lnRef idx="2">
+            <a:schemeClr val="accent1">
+              <a:shade val="50000"/>
+            </a:schemeClr>
+          </a:lnRef>
+          <a:fillRef idx="1">
+            <a:schemeClr val="accent1"/>
+          </a:fillRef>
+          <a:effectRef idx="0">
+            <a:schemeClr val="accent1"/>
+          </a:effectRef>
+          <a:fontRef idx="minor">
+            <a:schemeClr val="lt1"/>
+          </a:fontRef>
+        </p:style>
+        <p:txBody>
+          <a:bodyPr rtlCol="0" anchor="ctr"/>
+          <a:lstStyle/>
+          <a:p>
+            <a:pPr algn="ctr"/>
+            <a:r>
+              <a:rPr lang="en-US" sz="16600" b="1" dirty="0" smtClean="0">
+                <a:effectLst>
+                  <a:innerShdw blurRad="63500" dist="50800" dir="13500000">
+                    <a:prstClr val="black">
+                      <a:alpha val="50000"/>
+                    </a:prstClr>
+                  </a:innerShdw>
+                </a:effectLst>
+                <a:latin typeface="Optima" charset="0"/>
+                <a:ea typeface="Optima" charset="0"/>
+                <a:cs typeface="Optima" charset="0"/>
+              </a:rPr>
+              <a:t>Game Over!</a:t>
+            </a:r>
+            <a:endParaRPr lang="en-US" sz="16600" b="1" dirty="0">
+              <a:effectLst>
+                <a:innerShdw blurRad="63500" dist="50800" dir="13500000">
+                  <a:prstClr val="black">
+                    <a:alpha val="50000"/>
+                  </a:prstClr>
+                </a:innerShdw>
+              </a:effectLst>
+              <a:latin typeface="Optima" charset="0"/>
+              <a:ea typeface="Optima" charset="0"/>
+              <a:cs typeface="Optima" charset="0"/>
+            </a:endParaRPr>
+          </a:p>
+        </p:txBody>
+      </p:sp>
+    </p:spTree>
+    <p:extLst>
+      <p:ext uri="{BB962C8B-B14F-4D97-AF65-F5344CB8AC3E}">
+        <p14:creationId xmlns:p14="http://schemas.microsoft.com/office/powerpoint/2010/main" val="955258619"/>
       </p:ext>
     </p:extLst>
   </p:cSld>

</xml_diff>

<commit_message>
Added music helper, replaced icons
</commit_message>
<xml_diff>
--- a/Supporting Items/Images/DrinkPoint PowerPoint.pptx
+++ b/Supporting Items/Images/DrinkPoint PowerPoint.pptx
@@ -8,8 +8,9 @@
     <p:sldId id="257" r:id="rId2"/>
     <p:sldId id="256" r:id="rId3"/>
     <p:sldId id="260" r:id="rId4"/>
-    <p:sldId id="259" r:id="rId5"/>
-    <p:sldId id="258" r:id="rId6"/>
+    <p:sldId id="261" r:id="rId5"/>
+    <p:sldId id="259" r:id="rId6"/>
+    <p:sldId id="258" r:id="rId7"/>
   </p:sldIdLst>
   <p:sldSz cx="12192000" cy="6858000"/>
   <p:notesSz cx="6858000" cy="9144000"/>
@@ -258,7 +259,7 @@
           <a:p>
             <a:fld id="{9E764FE3-7391-B940-9C10-F64F800F0F41}" type="datetimeFigureOut">
               <a:rPr lang="en-US" smtClean="0"/>
-              <a:t>6/28/16</a:t>
+              <a:t>6/29/16</a:t>
             </a:fld>
             <a:endParaRPr lang="en-US"/>
           </a:p>
@@ -428,7 +429,7 @@
           <a:p>
             <a:fld id="{9E764FE3-7391-B940-9C10-F64F800F0F41}" type="datetimeFigureOut">
               <a:rPr lang="en-US" smtClean="0"/>
-              <a:t>6/28/16</a:t>
+              <a:t>6/29/16</a:t>
             </a:fld>
             <a:endParaRPr lang="en-US"/>
           </a:p>
@@ -608,7 +609,7 @@
           <a:p>
             <a:fld id="{9E764FE3-7391-B940-9C10-F64F800F0F41}" type="datetimeFigureOut">
               <a:rPr lang="en-US" smtClean="0"/>
-              <a:t>6/28/16</a:t>
+              <a:t>6/29/16</a:t>
             </a:fld>
             <a:endParaRPr lang="en-US"/>
           </a:p>
@@ -778,7 +779,7 @@
           <a:p>
             <a:fld id="{9E764FE3-7391-B940-9C10-F64F800F0F41}" type="datetimeFigureOut">
               <a:rPr lang="en-US" smtClean="0"/>
-              <a:t>6/28/16</a:t>
+              <a:t>6/29/16</a:t>
             </a:fld>
             <a:endParaRPr lang="en-US"/>
           </a:p>
@@ -1024,7 +1025,7 @@
           <a:p>
             <a:fld id="{9E764FE3-7391-B940-9C10-F64F800F0F41}" type="datetimeFigureOut">
               <a:rPr lang="en-US" smtClean="0"/>
-              <a:t>6/28/16</a:t>
+              <a:t>6/29/16</a:t>
             </a:fld>
             <a:endParaRPr lang="en-US"/>
           </a:p>
@@ -1256,7 +1257,7 @@
           <a:p>
             <a:fld id="{9E764FE3-7391-B940-9C10-F64F800F0F41}" type="datetimeFigureOut">
               <a:rPr lang="en-US" smtClean="0"/>
-              <a:t>6/28/16</a:t>
+              <a:t>6/29/16</a:t>
             </a:fld>
             <a:endParaRPr lang="en-US"/>
           </a:p>
@@ -1623,7 +1624,7 @@
           <a:p>
             <a:fld id="{9E764FE3-7391-B940-9C10-F64F800F0F41}" type="datetimeFigureOut">
               <a:rPr lang="en-US" smtClean="0"/>
-              <a:t>6/28/16</a:t>
+              <a:t>6/29/16</a:t>
             </a:fld>
             <a:endParaRPr lang="en-US"/>
           </a:p>
@@ -1741,7 +1742,7 @@
           <a:p>
             <a:fld id="{9E764FE3-7391-B940-9C10-F64F800F0F41}" type="datetimeFigureOut">
               <a:rPr lang="en-US" smtClean="0"/>
-              <a:t>6/28/16</a:t>
+              <a:t>6/29/16</a:t>
             </a:fld>
             <a:endParaRPr lang="en-US"/>
           </a:p>
@@ -1836,7 +1837,7 @@
           <a:p>
             <a:fld id="{9E764FE3-7391-B940-9C10-F64F800F0F41}" type="datetimeFigureOut">
               <a:rPr lang="en-US" smtClean="0"/>
-              <a:t>6/28/16</a:t>
+              <a:t>6/29/16</a:t>
             </a:fld>
             <a:endParaRPr lang="en-US"/>
           </a:p>
@@ -2113,7 +2114,7 @@
           <a:p>
             <a:fld id="{9E764FE3-7391-B940-9C10-F64F800F0F41}" type="datetimeFigureOut">
               <a:rPr lang="en-US" smtClean="0"/>
-              <a:t>6/28/16</a:t>
+              <a:t>6/29/16</a:t>
             </a:fld>
             <a:endParaRPr lang="en-US"/>
           </a:p>
@@ -2366,7 +2367,7 @@
           <a:p>
             <a:fld id="{9E764FE3-7391-B940-9C10-F64F800F0F41}" type="datetimeFigureOut">
               <a:rPr lang="en-US" smtClean="0"/>
-              <a:t>6/28/16</a:t>
+              <a:t>6/29/16</a:t>
             </a:fld>
             <a:endParaRPr lang="en-US"/>
           </a:p>
@@ -2579,7 +2580,7 @@
           <a:p>
             <a:fld id="{9E764FE3-7391-B940-9C10-F64F800F0F41}" type="datetimeFigureOut">
               <a:rPr lang="en-US" smtClean="0"/>
-              <a:t>6/28/16</a:t>
+              <a:t>6/29/16</a:t>
             </a:fld>
             <a:endParaRPr lang="en-US"/>
           </a:p>
@@ -4170,7 +4171,7 @@
       </p:grpSpPr>
       <p:pic>
         <p:nvPicPr>
-          <p:cNvPr id="2" name="Picture 1"/>
+          <p:cNvPr id="4" name="Picture 3"/>
           <p:cNvPicPr>
             <a:picLocks noChangeAspect="1"/>
           </p:cNvPicPr>
@@ -4178,6 +4179,13 @@
         </p:nvPicPr>
         <p:blipFill>
           <a:blip r:embed="rId2">
+            <a:duotone>
+              <a:schemeClr val="accent5">
+                <a:shade val="45000"/>
+                <a:satMod val="135000"/>
+              </a:schemeClr>
+              <a:prstClr val="white"/>
+            </a:duotone>
             <a:extLst>
               <a:ext uri="{28A0092B-C50C-407E-A947-70E740481C1C}">
                 <a14:useLocalDpi xmlns:a14="http://schemas.microsoft.com/office/drawing/2010/main" val="0"/>
@@ -4190,92 +4198,15 @@
         </p:blipFill>
         <p:spPr>
           <a:xfrm>
-            <a:off x="4191000" y="2743200"/>
-            <a:ext cx="3810000" cy="1371600"/>
+            <a:off x="3416300" y="0"/>
+            <a:ext cx="5359232" cy="6858000"/>
           </a:xfrm>
           <a:prstGeom prst="rect">
             <a:avLst/>
           </a:prstGeom>
+          <a:effectLst/>
         </p:spPr>
       </p:pic>
-      <p:sp>
-        <p:nvSpPr>
-          <p:cNvPr id="3" name="Rounded Rectangle 2"/>
-          <p:cNvSpPr/>
-          <p:nvPr/>
-        </p:nvSpPr>
-        <p:spPr>
-          <a:xfrm>
-            <a:off x="4191000" y="2743200"/>
-            <a:ext cx="3810000" cy="1371600"/>
-          </a:xfrm>
-          <a:prstGeom prst="roundRect">
-            <a:avLst/>
-          </a:prstGeom>
-          <a:gradFill flip="none" rotWithShape="1">
-            <a:gsLst>
-              <a:gs pos="0">
-                <a:schemeClr val="accent1">
-                  <a:lumMod val="89000"/>
-                </a:schemeClr>
-              </a:gs>
-              <a:gs pos="23000">
-                <a:schemeClr val="accent1">
-                  <a:lumMod val="89000"/>
-                </a:schemeClr>
-              </a:gs>
-              <a:gs pos="69000">
-                <a:schemeClr val="accent1">
-                  <a:lumMod val="75000"/>
-                </a:schemeClr>
-              </a:gs>
-              <a:gs pos="97000">
-                <a:schemeClr val="accent1">
-                  <a:lumMod val="70000"/>
-                </a:schemeClr>
-              </a:gs>
-            </a:gsLst>
-            <a:path path="circle">
-              <a:fillToRect l="50000" t="50000" r="50000" b="50000"/>
-            </a:path>
-            <a:tileRect/>
-          </a:gradFill>
-          <a:ln w="63500">
-            <a:noFill/>
-          </a:ln>
-          <a:scene3d>
-            <a:camera prst="orthographicFront"/>
-            <a:lightRig rig="threePt" dir="t"/>
-          </a:scene3d>
-          <a:sp3d>
-            <a:bevelT w="114300" prst="artDeco"/>
-          </a:sp3d>
-        </p:spPr>
-        <p:style>
-          <a:lnRef idx="2">
-            <a:schemeClr val="accent1">
-              <a:shade val="50000"/>
-            </a:schemeClr>
-          </a:lnRef>
-          <a:fillRef idx="1">
-            <a:schemeClr val="accent1"/>
-          </a:fillRef>
-          <a:effectRef idx="0">
-            <a:schemeClr val="accent1"/>
-          </a:effectRef>
-          <a:fontRef idx="minor">
-            <a:schemeClr val="lt1"/>
-          </a:fontRef>
-        </p:style>
-        <p:txBody>
-          <a:bodyPr rtlCol="0" anchor="ctr"/>
-          <a:lstStyle/>
-          <a:p>
-            <a:pPr algn="ctr"/>
-            <a:endParaRPr lang="en-US"/>
-          </a:p>
-        </p:txBody>
-      </p:sp>
     </p:spTree>
     <p:extLst>
       <p:ext uri="{BB962C8B-B14F-4D97-AF65-F5344CB8AC3E}">
@@ -4321,6 +4252,159 @@
           <a:chExt cx="0" cy="0"/>
         </a:xfrm>
       </p:grpSpPr>
+      <p:pic>
+        <p:nvPicPr>
+          <p:cNvPr id="2" name="Picture 1"/>
+          <p:cNvPicPr>
+            <a:picLocks noChangeAspect="1"/>
+          </p:cNvPicPr>
+          <p:nvPr/>
+        </p:nvPicPr>
+        <p:blipFill>
+          <a:blip r:embed="rId2">
+            <a:extLst>
+              <a:ext uri="{28A0092B-C50C-407E-A947-70E740481C1C}">
+                <a14:useLocalDpi xmlns:a14="http://schemas.microsoft.com/office/drawing/2010/main" val="0"/>
+              </a:ext>
+            </a:extLst>
+          </a:blip>
+          <a:stretch>
+            <a:fillRect/>
+          </a:stretch>
+        </p:blipFill>
+        <p:spPr>
+          <a:xfrm>
+            <a:off x="4191000" y="2743200"/>
+            <a:ext cx="3810000" cy="1371600"/>
+          </a:xfrm>
+          <a:prstGeom prst="rect">
+            <a:avLst/>
+          </a:prstGeom>
+        </p:spPr>
+      </p:pic>
+      <p:sp>
+        <p:nvSpPr>
+          <p:cNvPr id="3" name="Rounded Rectangle 2"/>
+          <p:cNvSpPr/>
+          <p:nvPr/>
+        </p:nvSpPr>
+        <p:spPr>
+          <a:xfrm>
+            <a:off x="4191000" y="2743200"/>
+            <a:ext cx="3810000" cy="1371600"/>
+          </a:xfrm>
+          <a:prstGeom prst="roundRect">
+            <a:avLst/>
+          </a:prstGeom>
+          <a:gradFill flip="none" rotWithShape="1">
+            <a:gsLst>
+              <a:gs pos="0">
+                <a:schemeClr val="accent1">
+                  <a:lumMod val="89000"/>
+                </a:schemeClr>
+              </a:gs>
+              <a:gs pos="23000">
+                <a:schemeClr val="accent1">
+                  <a:lumMod val="89000"/>
+                </a:schemeClr>
+              </a:gs>
+              <a:gs pos="69000">
+                <a:schemeClr val="accent1">
+                  <a:lumMod val="75000"/>
+                </a:schemeClr>
+              </a:gs>
+              <a:gs pos="97000">
+                <a:schemeClr val="accent1">
+                  <a:lumMod val="70000"/>
+                </a:schemeClr>
+              </a:gs>
+            </a:gsLst>
+            <a:path path="circle">
+              <a:fillToRect l="50000" t="50000" r="50000" b="50000"/>
+            </a:path>
+            <a:tileRect/>
+          </a:gradFill>
+          <a:ln w="63500">
+            <a:noFill/>
+          </a:ln>
+          <a:scene3d>
+            <a:camera prst="orthographicFront"/>
+            <a:lightRig rig="threePt" dir="t"/>
+          </a:scene3d>
+          <a:sp3d>
+            <a:bevelT w="114300" prst="artDeco"/>
+          </a:sp3d>
+        </p:spPr>
+        <p:style>
+          <a:lnRef idx="2">
+            <a:schemeClr val="accent1">
+              <a:shade val="50000"/>
+            </a:schemeClr>
+          </a:lnRef>
+          <a:fillRef idx="1">
+            <a:schemeClr val="accent1"/>
+          </a:fillRef>
+          <a:effectRef idx="0">
+            <a:schemeClr val="accent1"/>
+          </a:effectRef>
+          <a:fontRef idx="minor">
+            <a:schemeClr val="lt1"/>
+          </a:fontRef>
+        </p:style>
+        <p:txBody>
+          <a:bodyPr rtlCol="0" anchor="ctr"/>
+          <a:lstStyle/>
+          <a:p>
+            <a:pPr algn="ctr"/>
+            <a:endParaRPr lang="en-US"/>
+          </a:p>
+        </p:txBody>
+      </p:sp>
+    </p:spTree>
+    <p:extLst>
+      <p:ext uri="{BB962C8B-B14F-4D97-AF65-F5344CB8AC3E}">
+        <p14:creationId xmlns:p14="http://schemas.microsoft.com/office/powerpoint/2010/main" val="1813574447"/>
+      </p:ext>
+    </p:extLst>
+  </p:cSld>
+  <p:clrMapOvr>
+    <a:masterClrMapping/>
+  </p:clrMapOvr>
+  <p:timing>
+    <p:tnLst>
+      <p:par>
+        <p:cTn id="1" dur="indefinite" restart="never" nodeType="tmRoot"/>
+      </p:par>
+    </p:tnLst>
+  </p:timing>
+</p:sld>
+</file>
+
+<file path=ppt/slides/slide5.xml><?xml version="1.0" encoding="utf-8"?>
+<p:sld xmlns:a="http://schemas.openxmlformats.org/drawingml/2006/main" xmlns:r="http://schemas.openxmlformats.org/officeDocument/2006/relationships" xmlns:p="http://schemas.openxmlformats.org/presentationml/2006/main">
+  <p:cSld>
+    <p:bg>
+      <p:bgPr>
+        <a:solidFill>
+          <a:schemeClr val="tx1"/>
+        </a:solidFill>
+        <a:effectLst/>
+      </p:bgPr>
+    </p:bg>
+    <p:spTree>
+      <p:nvGrpSpPr>
+        <p:cNvPr id="1" name=""/>
+        <p:cNvGrpSpPr/>
+        <p:nvPr/>
+      </p:nvGrpSpPr>
+      <p:grpSpPr>
+        <a:xfrm>
+          <a:off x="0" y="0"/>
+          <a:ext cx="0" cy="0"/>
+          <a:chOff x="0" y="0"/>
+          <a:chExt cx="0" cy="0"/>
+        </a:xfrm>
+      </p:grpSpPr>
       <p:sp>
         <p:nvSpPr>
           <p:cNvPr id="4" name="Rounded Rectangle 3"/>
@@ -4474,7 +4558,7 @@
 </p:sld>
 </file>
 
-<file path=ppt/slides/slide5.xml><?xml version="1.0" encoding="utf-8"?>
+<file path=ppt/slides/slide6.xml><?xml version="1.0" encoding="utf-8"?>
 <p:sld xmlns:a="http://schemas.openxmlformats.org/drawingml/2006/main" xmlns:r="http://schemas.openxmlformats.org/officeDocument/2006/relationships" xmlns:p="http://schemas.openxmlformats.org/presentationml/2006/main">
   <p:cSld>
     <p:bg>

</xml_diff>